<commit_message>
Minor bugfixes discovered during day2
</commit_message>
<xml_diff>
--- a/2016/week1__recap_and_warmup_slides.pptx
+++ b/2016/week1__recap_and_warmup_slides.pptx
@@ -5,19 +5,20 @@
     <p:sldMasterId id="2147483650" r:id="rId1"/>
   </p:sldMasterIdLst>
   <p:notesMasterIdLst>
-    <p:notesMasterId r:id="rId9"/>
+    <p:notesMasterId r:id="rId10"/>
   </p:notesMasterIdLst>
   <p:handoutMasterIdLst>
-    <p:handoutMasterId r:id="rId10"/>
+    <p:handoutMasterId r:id="rId11"/>
   </p:handoutMasterIdLst>
   <p:sldIdLst>
     <p:sldId id="454" r:id="rId2"/>
     <p:sldId id="463" r:id="rId3"/>
-    <p:sldId id="464" r:id="rId4"/>
-    <p:sldId id="455" r:id="rId5"/>
-    <p:sldId id="456" r:id="rId6"/>
-    <p:sldId id="457" r:id="rId7"/>
-    <p:sldId id="458" r:id="rId8"/>
+    <p:sldId id="456" r:id="rId4"/>
+    <p:sldId id="457" r:id="rId5"/>
+    <p:sldId id="465" r:id="rId6"/>
+    <p:sldId id="464" r:id="rId7"/>
+    <p:sldId id="455" r:id="rId8"/>
+    <p:sldId id="458" r:id="rId9"/>
   </p:sldIdLst>
   <p:sldSz cx="9144000" cy="6858000" type="screen4x3"/>
   <p:notesSz cx="7099300" cy="10234613"/>
@@ -193,10 +194,11 @@
           <p14:sldIdLst>
             <p14:sldId id="454"/>
             <p14:sldId id="463"/>
+            <p14:sldId id="456"/>
+            <p14:sldId id="457"/>
+            <p14:sldId id="465"/>
             <p14:sldId id="464"/>
             <p14:sldId id="455"/>
-            <p14:sldId id="456"/>
-            <p14:sldId id="457"/>
             <p14:sldId id="458"/>
           </p14:sldIdLst>
         </p14:section>
@@ -1855,6 +1857,1061 @@
 </p:notesMaster>
 </file>
 
+<file path=ppt/notesSlides/notesSlide1.xml><?xml version="1.0" encoding="utf-8"?>
+<p:notes xmlns:a="http://schemas.openxmlformats.org/drawingml/2006/main" xmlns:r="http://schemas.openxmlformats.org/officeDocument/2006/relationships" xmlns:p="http://schemas.openxmlformats.org/presentationml/2006/main">
+  <p:cSld>
+    <p:spTree>
+      <p:nvGrpSpPr>
+        <p:cNvPr id="1" name=""/>
+        <p:cNvGrpSpPr/>
+        <p:nvPr/>
+      </p:nvGrpSpPr>
+      <p:grpSpPr>
+        <a:xfrm>
+          <a:off x="0" y="0"/>
+          <a:ext cx="0" cy="0"/>
+          <a:chOff x="0" y="0"/>
+          <a:chExt cx="0" cy="0"/>
+        </a:xfrm>
+      </p:grpSpPr>
+      <p:sp>
+        <p:nvSpPr>
+          <p:cNvPr id="2" name="Folienbildplatzhalter 1"/>
+          <p:cNvSpPr>
+            <a:spLocks noGrp="1" noRot="1" noChangeAspect="1"/>
+          </p:cNvSpPr>
+          <p:nvPr>
+            <p:ph type="sldImg"/>
+          </p:nvPr>
+        </p:nvSpPr>
+        <p:spPr/>
+      </p:sp>
+      <p:sp>
+        <p:nvSpPr>
+          <p:cNvPr id="3" name="Notizenplatzhalter 2"/>
+          <p:cNvSpPr>
+            <a:spLocks noGrp="1"/>
+          </p:cNvSpPr>
+          <p:nvPr>
+            <p:ph type="body" idx="1"/>
+          </p:nvPr>
+        </p:nvSpPr>
+        <p:spPr/>
+        <p:txBody>
+          <a:bodyPr/>
+          <a:lstStyle/>
+          <a:p>
+            <a:r>
+              <a:rPr lang="en-US" smtClean="0"/>
+              <a:t>Lösung:</a:t>
+            </a:r>
+            <a:r>
+              <a:rPr lang="en-US" baseline="0" smtClean="0"/>
+              <a:t> #include von .cpp-Datei -&gt; Verletzung von One Definition Rule</a:t>
+            </a:r>
+            <a:endParaRPr lang="en-US"/>
+          </a:p>
+        </p:txBody>
+      </p:sp>
+      <p:sp>
+        <p:nvSpPr>
+          <p:cNvPr id="4" name="Datumsplatzhalter 3"/>
+          <p:cNvSpPr>
+            <a:spLocks noGrp="1"/>
+          </p:cNvSpPr>
+          <p:nvPr>
+            <p:ph type="dt" idx="10"/>
+          </p:nvPr>
+        </p:nvSpPr>
+        <p:spPr/>
+        <p:txBody>
+          <a:bodyPr/>
+          <a:lstStyle/>
+          <a:p>
+            <a:pPr>
+              <a:defRPr/>
+            </a:pPr>
+            <a:r>
+              <a:rPr lang="en-US" smtClean="0"/>
+              <a:t>November 19, 2007</a:t>
+            </a:r>
+            <a:endParaRPr lang="en-US"/>
+          </a:p>
+        </p:txBody>
+      </p:sp>
+      <p:sp>
+        <p:nvSpPr>
+          <p:cNvPr id="5" name="Fußzeilenplatzhalter 4"/>
+          <p:cNvSpPr>
+            <a:spLocks noGrp="1"/>
+          </p:cNvSpPr>
+          <p:nvPr>
+            <p:ph type="ftr" idx="11"/>
+          </p:nvPr>
+        </p:nvSpPr>
+        <p:spPr/>
+        <p:txBody>
+          <a:bodyPr/>
+          <a:lstStyle/>
+          <a:p>
+            <a:pPr>
+              <a:defRPr/>
+            </a:pPr>
+            <a:r>
+              <a:rPr lang="en-US" smtClean="0"/>
+              <a:t>|  </a:t>
+            </a:r>
+            <a:endParaRPr lang="en-US"/>
+          </a:p>
+        </p:txBody>
+      </p:sp>
+      <p:sp>
+        <p:nvSpPr>
+          <p:cNvPr id="6" name="Foliennummernplatzhalter 5"/>
+          <p:cNvSpPr>
+            <a:spLocks noGrp="1"/>
+          </p:cNvSpPr>
+          <p:nvPr>
+            <p:ph type="sldNum" idx="12"/>
+          </p:nvPr>
+        </p:nvSpPr>
+        <p:spPr/>
+        <p:txBody>
+          <a:bodyPr/>
+          <a:lstStyle/>
+          <a:p>
+            <a:pPr>
+              <a:defRPr/>
+            </a:pPr>
+            <a:r>
+              <a:rPr lang="en-US" smtClean="0"/>
+              <a:t>|  </a:t>
+            </a:r>
+            <a:fld id="{1AC4CB2F-BC5A-454C-A55C-75DB3FC15FD2}" type="slidenum">
+              <a:rPr lang="en-US" smtClean="0"/>
+              <a:pPr>
+                <a:defRPr/>
+              </a:pPr>
+              <a:t>3</a:t>
+            </a:fld>
+            <a:endParaRPr lang="en-US"/>
+          </a:p>
+        </p:txBody>
+      </p:sp>
+    </p:spTree>
+    <p:extLst>
+      <p:ext uri="{BB962C8B-B14F-4D97-AF65-F5344CB8AC3E}">
+        <p14:creationId xmlns:p14="http://schemas.microsoft.com/office/powerpoint/2010/main" val="322378034"/>
+      </p:ext>
+    </p:extLst>
+  </p:cSld>
+  <p:clrMapOvr>
+    <a:masterClrMapping/>
+  </p:clrMapOvr>
+</p:notes>
+</file>
+
+<file path=ppt/notesSlides/notesSlide2.xml><?xml version="1.0" encoding="utf-8"?>
+<p:notes xmlns:a="http://schemas.openxmlformats.org/drawingml/2006/main" xmlns:r="http://schemas.openxmlformats.org/officeDocument/2006/relationships" xmlns:p="http://schemas.openxmlformats.org/presentationml/2006/main">
+  <p:cSld>
+    <p:spTree>
+      <p:nvGrpSpPr>
+        <p:cNvPr id="1" name=""/>
+        <p:cNvGrpSpPr/>
+        <p:nvPr/>
+      </p:nvGrpSpPr>
+      <p:grpSpPr>
+        <a:xfrm>
+          <a:off x="0" y="0"/>
+          <a:ext cx="0" cy="0"/>
+          <a:chOff x="0" y="0"/>
+          <a:chExt cx="0" cy="0"/>
+        </a:xfrm>
+      </p:grpSpPr>
+      <p:sp>
+        <p:nvSpPr>
+          <p:cNvPr id="53250" name="Folienbildplatzhalter 1"/>
+          <p:cNvSpPr>
+            <a:spLocks noGrp="1" noRot="1" noChangeAspect="1" noTextEdit="1"/>
+          </p:cNvSpPr>
+          <p:nvPr>
+            <p:ph type="sldImg"/>
+          </p:nvPr>
+        </p:nvSpPr>
+        <p:spPr>
+          <a:ln/>
+        </p:spPr>
+      </p:sp>
+      <p:sp>
+        <p:nvSpPr>
+          <p:cNvPr id="53251" name="Notizenplatzhalter 2"/>
+          <p:cNvSpPr>
+            <a:spLocks noGrp="1"/>
+          </p:cNvSpPr>
+          <p:nvPr>
+            <p:ph type="body" idx="1"/>
+          </p:nvPr>
+        </p:nvSpPr>
+        <p:spPr>
+          <a:noFill/>
+          <a:extLst>
+            <a:ext uri="{909E8E84-426E-40DD-AFC4-6F175D3DCCD1}">
+              <a14:hiddenFill xmlns:a14="http://schemas.microsoft.com/office/drawing/2010/main">
+                <a:solidFill>
+                  <a:srgbClr val="FFFFFF"/>
+                </a:solidFill>
+              </a14:hiddenFill>
+            </a:ext>
+            <a:ext uri="{91240B29-F687-4F45-9708-019B960494DF}">
+              <a14:hiddenLine xmlns:a14="http://schemas.microsoft.com/office/drawing/2010/main" w="9525">
+                <a:solidFill>
+                  <a:srgbClr val="000000"/>
+                </a:solidFill>
+                <a:miter lim="800000"/>
+                <a:headEnd/>
+                <a:tailEnd/>
+              </a14:hiddenLine>
+            </a:ext>
+          </a:extLst>
+        </p:spPr>
+        <p:txBody>
+          <a:bodyPr/>
+          <a:lstStyle/>
+          <a:p>
+            <a:pPr marL="0" indent="0">
+              <a:buFontTx/>
+              <a:buNone/>
+            </a:pPr>
+            <a:r>
+              <a:rPr lang="de-DE" altLang="de-DE" i="0" dirty="0" err="1" smtClean="0">
+                <a:latin typeface="Times New Roman" pitchFamily="16" charset="0"/>
+              </a:rPr>
+              <a:t>Asterisk</a:t>
+            </a:r>
+            <a:r>
+              <a:rPr lang="de-DE" altLang="de-DE" i="0" dirty="0" smtClean="0">
+                <a:latin typeface="Times New Roman" pitchFamily="16" charset="0"/>
+              </a:rPr>
+              <a:t>: (i) Als Teil des </a:t>
+            </a:r>
+            <a:r>
+              <a:rPr lang="de-DE" altLang="de-DE" b="1" i="0" dirty="0" smtClean="0">
+                <a:latin typeface="Times New Roman" pitchFamily="16" charset="0"/>
+              </a:rPr>
+              <a:t>Typs</a:t>
+            </a:r>
+            <a:r>
+              <a:rPr lang="de-DE" altLang="de-DE" i="0" dirty="0" smtClean="0">
+                <a:latin typeface="Times New Roman" pitchFamily="16" charset="0"/>
+              </a:rPr>
+              <a:t> bei Pointern, (ii) Als </a:t>
+            </a:r>
+            <a:r>
+              <a:rPr lang="de-DE" altLang="de-DE" i="0" dirty="0" err="1" smtClean="0">
+                <a:latin typeface="Times New Roman" pitchFamily="16" charset="0"/>
+              </a:rPr>
+              <a:t>Dereferenzierungs</a:t>
+            </a:r>
+            <a:r>
+              <a:rPr lang="de-DE" altLang="de-DE" b="1" i="0" dirty="0" err="1" smtClean="0">
+                <a:latin typeface="Times New Roman" pitchFamily="16" charset="0"/>
+              </a:rPr>
+              <a:t>operator</a:t>
+            </a:r>
+            <a:endParaRPr lang="de-DE" altLang="de-DE" b="1" i="0" dirty="0" smtClean="0">
+              <a:latin typeface="Times New Roman" pitchFamily="16" charset="0"/>
+            </a:endParaRPr>
+          </a:p>
+          <a:p>
+            <a:pPr marL="0" indent="0">
+              <a:buFontTx/>
+              <a:buNone/>
+            </a:pPr>
+            <a:r>
+              <a:rPr lang="de-DE" altLang="de-DE" i="0" dirty="0" err="1" smtClean="0">
+                <a:latin typeface="Times New Roman" pitchFamily="16" charset="0"/>
+              </a:rPr>
+              <a:t>Ampersand</a:t>
+            </a:r>
+            <a:r>
+              <a:rPr lang="de-DE" altLang="de-DE" i="0" dirty="0" smtClean="0">
+                <a:latin typeface="Times New Roman" pitchFamily="16" charset="0"/>
+              </a:rPr>
+              <a:t>: (i) Als Teil des </a:t>
+            </a:r>
+            <a:r>
+              <a:rPr lang="de-DE" altLang="de-DE" b="1" i="0" dirty="0" smtClean="0">
+                <a:latin typeface="Times New Roman" pitchFamily="16" charset="0"/>
+              </a:rPr>
+              <a:t>Typs</a:t>
+            </a:r>
+            <a:r>
+              <a:rPr lang="de-DE" altLang="de-DE" i="0" dirty="0" smtClean="0">
+                <a:latin typeface="Times New Roman" pitchFamily="16" charset="0"/>
+              </a:rPr>
+              <a:t> bei</a:t>
+            </a:r>
+            <a:r>
+              <a:rPr lang="de-DE" altLang="de-DE" i="0" baseline="0" dirty="0" smtClean="0">
+                <a:latin typeface="Times New Roman" pitchFamily="16" charset="0"/>
+              </a:rPr>
+              <a:t> Referenzen, (ii) Als Adress</a:t>
+            </a:r>
+            <a:r>
+              <a:rPr lang="de-DE" altLang="de-DE" b="1" i="0" baseline="0" dirty="0" smtClean="0">
+                <a:latin typeface="Times New Roman" pitchFamily="16" charset="0"/>
+              </a:rPr>
+              <a:t>operator</a:t>
+            </a:r>
+            <a:endParaRPr lang="de-DE" altLang="de-DE" b="1" i="0" dirty="0" smtClean="0">
+              <a:latin typeface="Times New Roman" pitchFamily="16" charset="0"/>
+            </a:endParaRPr>
+          </a:p>
+        </p:txBody>
+      </p:sp>
+      <p:sp>
+        <p:nvSpPr>
+          <p:cNvPr id="53252" name="Datumsplatzhalter 3"/>
+          <p:cNvSpPr>
+            <a:spLocks noGrp="1"/>
+          </p:cNvSpPr>
+          <p:nvPr>
+            <p:ph type="dt" sz="quarter"/>
+          </p:nvPr>
+        </p:nvSpPr>
+        <p:spPr>
+          <a:noFill/>
+          <a:extLst>
+            <a:ext uri="{909E8E84-426E-40DD-AFC4-6F175D3DCCD1}">
+              <a14:hiddenFill xmlns:a14="http://schemas.microsoft.com/office/drawing/2010/main">
+                <a:solidFill>
+                  <a:srgbClr val="FFFFFF"/>
+                </a:solidFill>
+              </a14:hiddenFill>
+            </a:ext>
+            <a:ext uri="{91240B29-F687-4F45-9708-019B960494DF}">
+              <a14:hiddenLine xmlns:a14="http://schemas.microsoft.com/office/drawing/2010/main" w="9525">
+                <a:solidFill>
+                  <a:srgbClr val="000000"/>
+                </a:solidFill>
+                <a:miter lim="800000"/>
+                <a:headEnd/>
+                <a:tailEnd/>
+              </a14:hiddenLine>
+            </a:ext>
+          </a:extLst>
+        </p:spPr>
+        <p:txBody>
+          <a:bodyPr/>
+          <a:lstStyle>
+            <a:lvl1pPr defTabSz="463550" eaLnBrk="0" hangingPunct="0">
+              <a:tabLst>
+                <a:tab pos="746125" algn="l"/>
+                <a:tab pos="1492250" algn="l"/>
+              </a:tabLst>
+              <a:defRPr>
+                <a:solidFill>
+                  <a:schemeClr val="tx1"/>
+                </a:solidFill>
+                <a:latin typeface="Arial" charset="0"/>
+                <a:ea typeface="Lucida Sans Unicode" pitchFamily="34" charset="0"/>
+                <a:cs typeface="Lucida Sans Unicode" pitchFamily="34" charset="0"/>
+              </a:defRPr>
+            </a:lvl1pPr>
+            <a:lvl2pPr marL="742950" indent="-285750" defTabSz="463550" eaLnBrk="0" hangingPunct="0">
+              <a:tabLst>
+                <a:tab pos="746125" algn="l"/>
+                <a:tab pos="1492250" algn="l"/>
+              </a:tabLst>
+              <a:defRPr>
+                <a:solidFill>
+                  <a:schemeClr val="tx1"/>
+                </a:solidFill>
+                <a:latin typeface="Arial" charset="0"/>
+                <a:ea typeface="Lucida Sans Unicode" pitchFamily="34" charset="0"/>
+                <a:cs typeface="Lucida Sans Unicode" pitchFamily="34" charset="0"/>
+              </a:defRPr>
+            </a:lvl2pPr>
+            <a:lvl3pPr marL="1143000" indent="-228600" defTabSz="463550" eaLnBrk="0" hangingPunct="0">
+              <a:tabLst>
+                <a:tab pos="746125" algn="l"/>
+                <a:tab pos="1492250" algn="l"/>
+              </a:tabLst>
+              <a:defRPr>
+                <a:solidFill>
+                  <a:schemeClr val="tx1"/>
+                </a:solidFill>
+                <a:latin typeface="Arial" charset="0"/>
+                <a:ea typeface="Lucida Sans Unicode" pitchFamily="34" charset="0"/>
+                <a:cs typeface="Lucida Sans Unicode" pitchFamily="34" charset="0"/>
+              </a:defRPr>
+            </a:lvl3pPr>
+            <a:lvl4pPr marL="1600200" indent="-228600" defTabSz="463550" eaLnBrk="0" hangingPunct="0">
+              <a:tabLst>
+                <a:tab pos="746125" algn="l"/>
+                <a:tab pos="1492250" algn="l"/>
+              </a:tabLst>
+              <a:defRPr>
+                <a:solidFill>
+                  <a:schemeClr val="tx1"/>
+                </a:solidFill>
+                <a:latin typeface="Arial" charset="0"/>
+                <a:ea typeface="Lucida Sans Unicode" pitchFamily="34" charset="0"/>
+                <a:cs typeface="Lucida Sans Unicode" pitchFamily="34" charset="0"/>
+              </a:defRPr>
+            </a:lvl4pPr>
+            <a:lvl5pPr marL="2057400" indent="-228600" defTabSz="463550" eaLnBrk="0" hangingPunct="0">
+              <a:tabLst>
+                <a:tab pos="746125" algn="l"/>
+                <a:tab pos="1492250" algn="l"/>
+              </a:tabLst>
+              <a:defRPr>
+                <a:solidFill>
+                  <a:schemeClr val="tx1"/>
+                </a:solidFill>
+                <a:latin typeface="Arial" charset="0"/>
+                <a:ea typeface="Lucida Sans Unicode" pitchFamily="34" charset="0"/>
+                <a:cs typeface="Lucida Sans Unicode" pitchFamily="34" charset="0"/>
+              </a:defRPr>
+            </a:lvl5pPr>
+            <a:lvl6pPr marL="2514600" indent="-228600" algn="ctr" defTabSz="463550" eaLnBrk="0" fontAlgn="base" hangingPunct="0">
+              <a:lnSpc>
+                <a:spcPct val="93000"/>
+              </a:lnSpc>
+              <a:spcBef>
+                <a:spcPct val="0"/>
+              </a:spcBef>
+              <a:spcAft>
+                <a:spcPct val="0"/>
+              </a:spcAft>
+              <a:buClr>
+                <a:srgbClr val="000000"/>
+              </a:buClr>
+              <a:buSzPct val="100000"/>
+              <a:buFont typeface="Arial" charset="0"/>
+              <a:tabLst>
+                <a:tab pos="746125" algn="l"/>
+                <a:tab pos="1492250" algn="l"/>
+              </a:tabLst>
+              <a:defRPr>
+                <a:solidFill>
+                  <a:schemeClr val="tx1"/>
+                </a:solidFill>
+                <a:latin typeface="Arial" charset="0"/>
+                <a:ea typeface="Lucida Sans Unicode" pitchFamily="34" charset="0"/>
+                <a:cs typeface="Lucida Sans Unicode" pitchFamily="34" charset="0"/>
+              </a:defRPr>
+            </a:lvl6pPr>
+            <a:lvl7pPr marL="2971800" indent="-228600" algn="ctr" defTabSz="463550" eaLnBrk="0" fontAlgn="base" hangingPunct="0">
+              <a:lnSpc>
+                <a:spcPct val="93000"/>
+              </a:lnSpc>
+              <a:spcBef>
+                <a:spcPct val="0"/>
+              </a:spcBef>
+              <a:spcAft>
+                <a:spcPct val="0"/>
+              </a:spcAft>
+              <a:buClr>
+                <a:srgbClr val="000000"/>
+              </a:buClr>
+              <a:buSzPct val="100000"/>
+              <a:buFont typeface="Arial" charset="0"/>
+              <a:tabLst>
+                <a:tab pos="746125" algn="l"/>
+                <a:tab pos="1492250" algn="l"/>
+              </a:tabLst>
+              <a:defRPr>
+                <a:solidFill>
+                  <a:schemeClr val="tx1"/>
+                </a:solidFill>
+                <a:latin typeface="Arial" charset="0"/>
+                <a:ea typeface="Lucida Sans Unicode" pitchFamily="34" charset="0"/>
+                <a:cs typeface="Lucida Sans Unicode" pitchFamily="34" charset="0"/>
+              </a:defRPr>
+            </a:lvl7pPr>
+            <a:lvl8pPr marL="3429000" indent="-228600" algn="ctr" defTabSz="463550" eaLnBrk="0" fontAlgn="base" hangingPunct="0">
+              <a:lnSpc>
+                <a:spcPct val="93000"/>
+              </a:lnSpc>
+              <a:spcBef>
+                <a:spcPct val="0"/>
+              </a:spcBef>
+              <a:spcAft>
+                <a:spcPct val="0"/>
+              </a:spcAft>
+              <a:buClr>
+                <a:srgbClr val="000000"/>
+              </a:buClr>
+              <a:buSzPct val="100000"/>
+              <a:buFont typeface="Arial" charset="0"/>
+              <a:tabLst>
+                <a:tab pos="746125" algn="l"/>
+                <a:tab pos="1492250" algn="l"/>
+              </a:tabLst>
+              <a:defRPr>
+                <a:solidFill>
+                  <a:schemeClr val="tx1"/>
+                </a:solidFill>
+                <a:latin typeface="Arial" charset="0"/>
+                <a:ea typeface="Lucida Sans Unicode" pitchFamily="34" charset="0"/>
+                <a:cs typeface="Lucida Sans Unicode" pitchFamily="34" charset="0"/>
+              </a:defRPr>
+            </a:lvl8pPr>
+            <a:lvl9pPr marL="3886200" indent="-228600" algn="ctr" defTabSz="463550" eaLnBrk="0" fontAlgn="base" hangingPunct="0">
+              <a:lnSpc>
+                <a:spcPct val="93000"/>
+              </a:lnSpc>
+              <a:spcBef>
+                <a:spcPct val="0"/>
+              </a:spcBef>
+              <a:spcAft>
+                <a:spcPct val="0"/>
+              </a:spcAft>
+              <a:buClr>
+                <a:srgbClr val="000000"/>
+              </a:buClr>
+              <a:buSzPct val="100000"/>
+              <a:buFont typeface="Arial" charset="0"/>
+              <a:tabLst>
+                <a:tab pos="746125" algn="l"/>
+                <a:tab pos="1492250" algn="l"/>
+              </a:tabLst>
+              <a:defRPr>
+                <a:solidFill>
+                  <a:schemeClr val="tx1"/>
+                </a:solidFill>
+                <a:latin typeface="Arial" charset="0"/>
+                <a:ea typeface="Lucida Sans Unicode" pitchFamily="34" charset="0"/>
+                <a:cs typeface="Lucida Sans Unicode" pitchFamily="34" charset="0"/>
+              </a:defRPr>
+            </a:lvl9pPr>
+          </a:lstStyle>
+          <a:p>
+            <a:pPr eaLnBrk="1" hangingPunct="1"/>
+            <a:r>
+              <a:rPr lang="en-US" altLang="de-DE" smtClean="0">
+                <a:solidFill>
+                  <a:srgbClr val="000000"/>
+                </a:solidFill>
+                <a:latin typeface="Stafford" pitchFamily="2" charset="0"/>
+              </a:rPr>
+              <a:t>November 19, 2007</a:t>
+            </a:r>
+          </a:p>
+        </p:txBody>
+      </p:sp>
+      <p:sp>
+        <p:nvSpPr>
+          <p:cNvPr id="53253" name="Fußzeilenplatzhalter 4"/>
+          <p:cNvSpPr>
+            <a:spLocks noGrp="1"/>
+          </p:cNvSpPr>
+          <p:nvPr>
+            <p:ph type="ftr" sz="quarter"/>
+          </p:nvPr>
+        </p:nvSpPr>
+        <p:spPr>
+          <a:noFill/>
+          <a:extLst>
+            <a:ext uri="{909E8E84-426E-40DD-AFC4-6F175D3DCCD1}">
+              <a14:hiddenFill xmlns:a14="http://schemas.microsoft.com/office/drawing/2010/main">
+                <a:solidFill>
+                  <a:srgbClr val="FFFFFF"/>
+                </a:solidFill>
+              </a14:hiddenFill>
+            </a:ext>
+            <a:ext uri="{91240B29-F687-4F45-9708-019B960494DF}">
+              <a14:hiddenLine xmlns:a14="http://schemas.microsoft.com/office/drawing/2010/main" w="9525">
+                <a:solidFill>
+                  <a:srgbClr val="000000"/>
+                </a:solidFill>
+                <a:miter lim="800000"/>
+                <a:headEnd/>
+                <a:tailEnd/>
+              </a14:hiddenLine>
+            </a:ext>
+          </a:extLst>
+        </p:spPr>
+        <p:txBody>
+          <a:bodyPr/>
+          <a:lstStyle>
+            <a:lvl1pPr defTabSz="463550" eaLnBrk="0" hangingPunct="0">
+              <a:tabLst>
+                <a:tab pos="746125" algn="l"/>
+                <a:tab pos="1492250" algn="l"/>
+                <a:tab pos="2238375" algn="l"/>
+                <a:tab pos="2986088" algn="l"/>
+                <a:tab pos="3732213" algn="l"/>
+              </a:tabLst>
+              <a:defRPr>
+                <a:solidFill>
+                  <a:schemeClr val="tx1"/>
+                </a:solidFill>
+                <a:latin typeface="Arial" charset="0"/>
+                <a:ea typeface="Lucida Sans Unicode" pitchFamily="34" charset="0"/>
+                <a:cs typeface="Lucida Sans Unicode" pitchFamily="34" charset="0"/>
+              </a:defRPr>
+            </a:lvl1pPr>
+            <a:lvl2pPr marL="742950" indent="-285750" defTabSz="463550" eaLnBrk="0" hangingPunct="0">
+              <a:tabLst>
+                <a:tab pos="746125" algn="l"/>
+                <a:tab pos="1492250" algn="l"/>
+                <a:tab pos="2238375" algn="l"/>
+                <a:tab pos="2986088" algn="l"/>
+                <a:tab pos="3732213" algn="l"/>
+              </a:tabLst>
+              <a:defRPr>
+                <a:solidFill>
+                  <a:schemeClr val="tx1"/>
+                </a:solidFill>
+                <a:latin typeface="Arial" charset="0"/>
+                <a:ea typeface="Lucida Sans Unicode" pitchFamily="34" charset="0"/>
+                <a:cs typeface="Lucida Sans Unicode" pitchFamily="34" charset="0"/>
+              </a:defRPr>
+            </a:lvl2pPr>
+            <a:lvl3pPr marL="1143000" indent="-228600" defTabSz="463550" eaLnBrk="0" hangingPunct="0">
+              <a:tabLst>
+                <a:tab pos="746125" algn="l"/>
+                <a:tab pos="1492250" algn="l"/>
+                <a:tab pos="2238375" algn="l"/>
+                <a:tab pos="2986088" algn="l"/>
+                <a:tab pos="3732213" algn="l"/>
+              </a:tabLst>
+              <a:defRPr>
+                <a:solidFill>
+                  <a:schemeClr val="tx1"/>
+                </a:solidFill>
+                <a:latin typeface="Arial" charset="0"/>
+                <a:ea typeface="Lucida Sans Unicode" pitchFamily="34" charset="0"/>
+                <a:cs typeface="Lucida Sans Unicode" pitchFamily="34" charset="0"/>
+              </a:defRPr>
+            </a:lvl3pPr>
+            <a:lvl4pPr marL="1600200" indent="-228600" defTabSz="463550" eaLnBrk="0" hangingPunct="0">
+              <a:tabLst>
+                <a:tab pos="746125" algn="l"/>
+                <a:tab pos="1492250" algn="l"/>
+                <a:tab pos="2238375" algn="l"/>
+                <a:tab pos="2986088" algn="l"/>
+                <a:tab pos="3732213" algn="l"/>
+              </a:tabLst>
+              <a:defRPr>
+                <a:solidFill>
+                  <a:schemeClr val="tx1"/>
+                </a:solidFill>
+                <a:latin typeface="Arial" charset="0"/>
+                <a:ea typeface="Lucida Sans Unicode" pitchFamily="34" charset="0"/>
+                <a:cs typeface="Lucida Sans Unicode" pitchFamily="34" charset="0"/>
+              </a:defRPr>
+            </a:lvl4pPr>
+            <a:lvl5pPr marL="2057400" indent="-228600" defTabSz="463550" eaLnBrk="0" hangingPunct="0">
+              <a:tabLst>
+                <a:tab pos="746125" algn="l"/>
+                <a:tab pos="1492250" algn="l"/>
+                <a:tab pos="2238375" algn="l"/>
+                <a:tab pos="2986088" algn="l"/>
+                <a:tab pos="3732213" algn="l"/>
+              </a:tabLst>
+              <a:defRPr>
+                <a:solidFill>
+                  <a:schemeClr val="tx1"/>
+                </a:solidFill>
+                <a:latin typeface="Arial" charset="0"/>
+                <a:ea typeface="Lucida Sans Unicode" pitchFamily="34" charset="0"/>
+                <a:cs typeface="Lucida Sans Unicode" pitchFamily="34" charset="0"/>
+              </a:defRPr>
+            </a:lvl5pPr>
+            <a:lvl6pPr marL="2514600" indent="-228600" algn="ctr" defTabSz="463550" eaLnBrk="0" fontAlgn="base" hangingPunct="0">
+              <a:lnSpc>
+                <a:spcPct val="93000"/>
+              </a:lnSpc>
+              <a:spcBef>
+                <a:spcPct val="0"/>
+              </a:spcBef>
+              <a:spcAft>
+                <a:spcPct val="0"/>
+              </a:spcAft>
+              <a:buClr>
+                <a:srgbClr val="000000"/>
+              </a:buClr>
+              <a:buSzPct val="100000"/>
+              <a:buFont typeface="Arial" charset="0"/>
+              <a:tabLst>
+                <a:tab pos="746125" algn="l"/>
+                <a:tab pos="1492250" algn="l"/>
+                <a:tab pos="2238375" algn="l"/>
+                <a:tab pos="2986088" algn="l"/>
+                <a:tab pos="3732213" algn="l"/>
+              </a:tabLst>
+              <a:defRPr>
+                <a:solidFill>
+                  <a:schemeClr val="tx1"/>
+                </a:solidFill>
+                <a:latin typeface="Arial" charset="0"/>
+                <a:ea typeface="Lucida Sans Unicode" pitchFamily="34" charset="0"/>
+                <a:cs typeface="Lucida Sans Unicode" pitchFamily="34" charset="0"/>
+              </a:defRPr>
+            </a:lvl6pPr>
+            <a:lvl7pPr marL="2971800" indent="-228600" algn="ctr" defTabSz="463550" eaLnBrk="0" fontAlgn="base" hangingPunct="0">
+              <a:lnSpc>
+                <a:spcPct val="93000"/>
+              </a:lnSpc>
+              <a:spcBef>
+                <a:spcPct val="0"/>
+              </a:spcBef>
+              <a:spcAft>
+                <a:spcPct val="0"/>
+              </a:spcAft>
+              <a:buClr>
+                <a:srgbClr val="000000"/>
+              </a:buClr>
+              <a:buSzPct val="100000"/>
+              <a:buFont typeface="Arial" charset="0"/>
+              <a:tabLst>
+                <a:tab pos="746125" algn="l"/>
+                <a:tab pos="1492250" algn="l"/>
+                <a:tab pos="2238375" algn="l"/>
+                <a:tab pos="2986088" algn="l"/>
+                <a:tab pos="3732213" algn="l"/>
+              </a:tabLst>
+              <a:defRPr>
+                <a:solidFill>
+                  <a:schemeClr val="tx1"/>
+                </a:solidFill>
+                <a:latin typeface="Arial" charset="0"/>
+                <a:ea typeface="Lucida Sans Unicode" pitchFamily="34" charset="0"/>
+                <a:cs typeface="Lucida Sans Unicode" pitchFamily="34" charset="0"/>
+              </a:defRPr>
+            </a:lvl7pPr>
+            <a:lvl8pPr marL="3429000" indent="-228600" algn="ctr" defTabSz="463550" eaLnBrk="0" fontAlgn="base" hangingPunct="0">
+              <a:lnSpc>
+                <a:spcPct val="93000"/>
+              </a:lnSpc>
+              <a:spcBef>
+                <a:spcPct val="0"/>
+              </a:spcBef>
+              <a:spcAft>
+                <a:spcPct val="0"/>
+              </a:spcAft>
+              <a:buClr>
+                <a:srgbClr val="000000"/>
+              </a:buClr>
+              <a:buSzPct val="100000"/>
+              <a:buFont typeface="Arial" charset="0"/>
+              <a:tabLst>
+                <a:tab pos="746125" algn="l"/>
+                <a:tab pos="1492250" algn="l"/>
+                <a:tab pos="2238375" algn="l"/>
+                <a:tab pos="2986088" algn="l"/>
+                <a:tab pos="3732213" algn="l"/>
+              </a:tabLst>
+              <a:defRPr>
+                <a:solidFill>
+                  <a:schemeClr val="tx1"/>
+                </a:solidFill>
+                <a:latin typeface="Arial" charset="0"/>
+                <a:ea typeface="Lucida Sans Unicode" pitchFamily="34" charset="0"/>
+                <a:cs typeface="Lucida Sans Unicode" pitchFamily="34" charset="0"/>
+              </a:defRPr>
+            </a:lvl8pPr>
+            <a:lvl9pPr marL="3886200" indent="-228600" algn="ctr" defTabSz="463550" eaLnBrk="0" fontAlgn="base" hangingPunct="0">
+              <a:lnSpc>
+                <a:spcPct val="93000"/>
+              </a:lnSpc>
+              <a:spcBef>
+                <a:spcPct val="0"/>
+              </a:spcBef>
+              <a:spcAft>
+                <a:spcPct val="0"/>
+              </a:spcAft>
+              <a:buClr>
+                <a:srgbClr val="000000"/>
+              </a:buClr>
+              <a:buSzPct val="100000"/>
+              <a:buFont typeface="Arial" charset="0"/>
+              <a:tabLst>
+                <a:tab pos="746125" algn="l"/>
+                <a:tab pos="1492250" algn="l"/>
+                <a:tab pos="2238375" algn="l"/>
+                <a:tab pos="2986088" algn="l"/>
+                <a:tab pos="3732213" algn="l"/>
+              </a:tabLst>
+              <a:defRPr>
+                <a:solidFill>
+                  <a:schemeClr val="tx1"/>
+                </a:solidFill>
+                <a:latin typeface="Arial" charset="0"/>
+                <a:ea typeface="Lucida Sans Unicode" pitchFamily="34" charset="0"/>
+                <a:cs typeface="Lucida Sans Unicode" pitchFamily="34" charset="0"/>
+              </a:defRPr>
+            </a:lvl9pPr>
+          </a:lstStyle>
+          <a:p>
+            <a:pPr eaLnBrk="1" hangingPunct="1"/>
+            <a:r>
+              <a:rPr lang="en-US" altLang="de-DE" smtClean="0">
+                <a:solidFill>
+                  <a:srgbClr val="000000"/>
+                </a:solidFill>
+                <a:latin typeface="Stafford" pitchFamily="2" charset="0"/>
+              </a:rPr>
+              <a:t>|  </a:t>
+            </a:r>
+          </a:p>
+        </p:txBody>
+      </p:sp>
+      <p:sp>
+        <p:nvSpPr>
+          <p:cNvPr id="53254" name="Foliennummernplatzhalter 5"/>
+          <p:cNvSpPr>
+            <a:spLocks noGrp="1"/>
+          </p:cNvSpPr>
+          <p:nvPr>
+            <p:ph type="sldNum" sz="quarter"/>
+          </p:nvPr>
+        </p:nvSpPr>
+        <p:spPr>
+          <a:noFill/>
+          <a:extLst>
+            <a:ext uri="{909E8E84-426E-40DD-AFC4-6F175D3DCCD1}">
+              <a14:hiddenFill xmlns:a14="http://schemas.microsoft.com/office/drawing/2010/main">
+                <a:solidFill>
+                  <a:srgbClr val="FFFFFF"/>
+                </a:solidFill>
+              </a14:hiddenFill>
+            </a:ext>
+            <a:ext uri="{91240B29-F687-4F45-9708-019B960494DF}">
+              <a14:hiddenLine xmlns:a14="http://schemas.microsoft.com/office/drawing/2010/main" w="9525">
+                <a:solidFill>
+                  <a:srgbClr val="000000"/>
+                </a:solidFill>
+                <a:miter lim="800000"/>
+                <a:headEnd/>
+                <a:tailEnd/>
+              </a14:hiddenLine>
+            </a:ext>
+          </a:extLst>
+        </p:spPr>
+        <p:txBody>
+          <a:bodyPr/>
+          <a:lstStyle>
+            <a:lvl1pPr defTabSz="463550" eaLnBrk="0" hangingPunct="0">
+              <a:tabLst>
+                <a:tab pos="746125" algn="l"/>
+              </a:tabLst>
+              <a:defRPr>
+                <a:solidFill>
+                  <a:schemeClr val="tx1"/>
+                </a:solidFill>
+                <a:latin typeface="Arial" charset="0"/>
+                <a:ea typeface="Lucida Sans Unicode" pitchFamily="34" charset="0"/>
+                <a:cs typeface="Lucida Sans Unicode" pitchFamily="34" charset="0"/>
+              </a:defRPr>
+            </a:lvl1pPr>
+            <a:lvl2pPr marL="742950" indent="-285750" defTabSz="463550" eaLnBrk="0" hangingPunct="0">
+              <a:tabLst>
+                <a:tab pos="746125" algn="l"/>
+              </a:tabLst>
+              <a:defRPr>
+                <a:solidFill>
+                  <a:schemeClr val="tx1"/>
+                </a:solidFill>
+                <a:latin typeface="Arial" charset="0"/>
+                <a:ea typeface="Lucida Sans Unicode" pitchFamily="34" charset="0"/>
+                <a:cs typeface="Lucida Sans Unicode" pitchFamily="34" charset="0"/>
+              </a:defRPr>
+            </a:lvl2pPr>
+            <a:lvl3pPr marL="1143000" indent="-228600" defTabSz="463550" eaLnBrk="0" hangingPunct="0">
+              <a:tabLst>
+                <a:tab pos="746125" algn="l"/>
+              </a:tabLst>
+              <a:defRPr>
+                <a:solidFill>
+                  <a:schemeClr val="tx1"/>
+                </a:solidFill>
+                <a:latin typeface="Arial" charset="0"/>
+                <a:ea typeface="Lucida Sans Unicode" pitchFamily="34" charset="0"/>
+                <a:cs typeface="Lucida Sans Unicode" pitchFamily="34" charset="0"/>
+              </a:defRPr>
+            </a:lvl3pPr>
+            <a:lvl4pPr marL="1600200" indent="-228600" defTabSz="463550" eaLnBrk="0" hangingPunct="0">
+              <a:tabLst>
+                <a:tab pos="746125" algn="l"/>
+              </a:tabLst>
+              <a:defRPr>
+                <a:solidFill>
+                  <a:schemeClr val="tx1"/>
+                </a:solidFill>
+                <a:latin typeface="Arial" charset="0"/>
+                <a:ea typeface="Lucida Sans Unicode" pitchFamily="34" charset="0"/>
+                <a:cs typeface="Lucida Sans Unicode" pitchFamily="34" charset="0"/>
+              </a:defRPr>
+            </a:lvl4pPr>
+            <a:lvl5pPr marL="2057400" indent="-228600" defTabSz="463550" eaLnBrk="0" hangingPunct="0">
+              <a:tabLst>
+                <a:tab pos="746125" algn="l"/>
+              </a:tabLst>
+              <a:defRPr>
+                <a:solidFill>
+                  <a:schemeClr val="tx1"/>
+                </a:solidFill>
+                <a:latin typeface="Arial" charset="0"/>
+                <a:ea typeface="Lucida Sans Unicode" pitchFamily="34" charset="0"/>
+                <a:cs typeface="Lucida Sans Unicode" pitchFamily="34" charset="0"/>
+              </a:defRPr>
+            </a:lvl5pPr>
+            <a:lvl6pPr marL="2514600" indent="-228600" algn="ctr" defTabSz="463550" eaLnBrk="0" fontAlgn="base" hangingPunct="0">
+              <a:lnSpc>
+                <a:spcPct val="93000"/>
+              </a:lnSpc>
+              <a:spcBef>
+                <a:spcPct val="0"/>
+              </a:spcBef>
+              <a:spcAft>
+                <a:spcPct val="0"/>
+              </a:spcAft>
+              <a:buClr>
+                <a:srgbClr val="000000"/>
+              </a:buClr>
+              <a:buSzPct val="100000"/>
+              <a:buFont typeface="Arial" charset="0"/>
+              <a:tabLst>
+                <a:tab pos="746125" algn="l"/>
+              </a:tabLst>
+              <a:defRPr>
+                <a:solidFill>
+                  <a:schemeClr val="tx1"/>
+                </a:solidFill>
+                <a:latin typeface="Arial" charset="0"/>
+                <a:ea typeface="Lucida Sans Unicode" pitchFamily="34" charset="0"/>
+                <a:cs typeface="Lucida Sans Unicode" pitchFamily="34" charset="0"/>
+              </a:defRPr>
+            </a:lvl6pPr>
+            <a:lvl7pPr marL="2971800" indent="-228600" algn="ctr" defTabSz="463550" eaLnBrk="0" fontAlgn="base" hangingPunct="0">
+              <a:lnSpc>
+                <a:spcPct val="93000"/>
+              </a:lnSpc>
+              <a:spcBef>
+                <a:spcPct val="0"/>
+              </a:spcBef>
+              <a:spcAft>
+                <a:spcPct val="0"/>
+              </a:spcAft>
+              <a:buClr>
+                <a:srgbClr val="000000"/>
+              </a:buClr>
+              <a:buSzPct val="100000"/>
+              <a:buFont typeface="Arial" charset="0"/>
+              <a:tabLst>
+                <a:tab pos="746125" algn="l"/>
+              </a:tabLst>
+              <a:defRPr>
+                <a:solidFill>
+                  <a:schemeClr val="tx1"/>
+                </a:solidFill>
+                <a:latin typeface="Arial" charset="0"/>
+                <a:ea typeface="Lucida Sans Unicode" pitchFamily="34" charset="0"/>
+                <a:cs typeface="Lucida Sans Unicode" pitchFamily="34" charset="0"/>
+              </a:defRPr>
+            </a:lvl7pPr>
+            <a:lvl8pPr marL="3429000" indent="-228600" algn="ctr" defTabSz="463550" eaLnBrk="0" fontAlgn="base" hangingPunct="0">
+              <a:lnSpc>
+                <a:spcPct val="93000"/>
+              </a:lnSpc>
+              <a:spcBef>
+                <a:spcPct val="0"/>
+              </a:spcBef>
+              <a:spcAft>
+                <a:spcPct val="0"/>
+              </a:spcAft>
+              <a:buClr>
+                <a:srgbClr val="000000"/>
+              </a:buClr>
+              <a:buSzPct val="100000"/>
+              <a:buFont typeface="Arial" charset="0"/>
+              <a:tabLst>
+                <a:tab pos="746125" algn="l"/>
+              </a:tabLst>
+              <a:defRPr>
+                <a:solidFill>
+                  <a:schemeClr val="tx1"/>
+                </a:solidFill>
+                <a:latin typeface="Arial" charset="0"/>
+                <a:ea typeface="Lucida Sans Unicode" pitchFamily="34" charset="0"/>
+                <a:cs typeface="Lucida Sans Unicode" pitchFamily="34" charset="0"/>
+              </a:defRPr>
+            </a:lvl8pPr>
+            <a:lvl9pPr marL="3886200" indent="-228600" algn="ctr" defTabSz="463550" eaLnBrk="0" fontAlgn="base" hangingPunct="0">
+              <a:lnSpc>
+                <a:spcPct val="93000"/>
+              </a:lnSpc>
+              <a:spcBef>
+                <a:spcPct val="0"/>
+              </a:spcBef>
+              <a:spcAft>
+                <a:spcPct val="0"/>
+              </a:spcAft>
+              <a:buClr>
+                <a:srgbClr val="000000"/>
+              </a:buClr>
+              <a:buSzPct val="100000"/>
+              <a:buFont typeface="Arial" charset="0"/>
+              <a:tabLst>
+                <a:tab pos="746125" algn="l"/>
+              </a:tabLst>
+              <a:defRPr>
+                <a:solidFill>
+                  <a:schemeClr val="tx1"/>
+                </a:solidFill>
+                <a:latin typeface="Arial" charset="0"/>
+                <a:ea typeface="Lucida Sans Unicode" pitchFamily="34" charset="0"/>
+                <a:cs typeface="Lucida Sans Unicode" pitchFamily="34" charset="0"/>
+              </a:defRPr>
+            </a:lvl9pPr>
+          </a:lstStyle>
+          <a:p>
+            <a:pPr eaLnBrk="1" hangingPunct="1"/>
+            <a:r>
+              <a:rPr lang="en-US" altLang="de-DE" smtClean="0">
+                <a:solidFill>
+                  <a:srgbClr val="000000"/>
+                </a:solidFill>
+                <a:latin typeface="Stafford" pitchFamily="2" charset="0"/>
+              </a:rPr>
+              <a:t>|  </a:t>
+            </a:r>
+            <a:fld id="{6775A062-1A8A-4084-8B81-E33BA407A859}" type="slidenum">
+              <a:rPr lang="en-US" altLang="de-DE" smtClean="0">
+                <a:solidFill>
+                  <a:srgbClr val="000000"/>
+                </a:solidFill>
+                <a:latin typeface="Stafford" pitchFamily="2" charset="0"/>
+              </a:rPr>
+              <a:pPr eaLnBrk="1" hangingPunct="1"/>
+              <a:t>5</a:t>
+            </a:fld>
+            <a:endParaRPr lang="en-US" altLang="de-DE" smtClean="0">
+              <a:solidFill>
+                <a:srgbClr val="000000"/>
+              </a:solidFill>
+              <a:latin typeface="Stafford" pitchFamily="2" charset="0"/>
+            </a:endParaRPr>
+          </a:p>
+        </p:txBody>
+      </p:sp>
+    </p:spTree>
+    <p:extLst>
+      <p:ext uri="{BB962C8B-B14F-4D97-AF65-F5344CB8AC3E}">
+        <p14:creationId xmlns:p14="http://schemas.microsoft.com/office/powerpoint/2010/main" val="1036047372"/>
+      </p:ext>
+    </p:extLst>
+  </p:cSld>
+  <p:clrMapOvr>
+    <a:masterClrMapping/>
+  </p:clrMapOvr>
+</p:notes>
+</file>
+
 <file path=ppt/slideLayouts/slideLayout1.xml><?xml version="1.0" encoding="utf-8"?>
 <p:sldLayout xmlns:a="http://schemas.openxmlformats.org/drawingml/2006/main" xmlns:r="http://schemas.openxmlformats.org/officeDocument/2006/relationships" xmlns:p="http://schemas.openxmlformats.org/presentationml/2006/main" showMasterSp="0" type="title" preserve="1">
   <p:cSld name="Titelfolie">
@@ -3842,6 +4899,190 @@
     <p:extLst>
       <p:ext uri="{BB962C8B-B14F-4D97-AF65-F5344CB8AC3E}">
         <p14:creationId xmlns:p14="http://schemas.microsoft.com/office/powerpoint/2010/main" val="1871957153"/>
+      </p:ext>
+    </p:extLst>
+  </p:cSld>
+  <p:clrMapOvr>
+    <a:masterClrMapping/>
+  </p:clrMapOvr>
+  <p:timing>
+    <p:tnLst>
+      <p:par>
+        <p:cTn id="1" dur="indefinite" restart="never" nodeType="tmRoot"/>
+      </p:par>
+    </p:tnLst>
+  </p:timing>
+</p:sldLayout>
+</file>
+
+<file path=ppt/slideLayouts/slideLayout12.xml><?xml version="1.0" encoding="utf-8"?>
+<p:sldLayout xmlns:a="http://schemas.openxmlformats.org/drawingml/2006/main" xmlns:r="http://schemas.openxmlformats.org/officeDocument/2006/relationships" xmlns:p="http://schemas.openxmlformats.org/presentationml/2006/main" userDrawn="1">
+  <p:cSld name="1_Intermezzo">
+    <p:spTree>
+      <p:nvGrpSpPr>
+        <p:cNvPr id="1" name=""/>
+        <p:cNvGrpSpPr/>
+        <p:nvPr/>
+      </p:nvGrpSpPr>
+      <p:grpSpPr>
+        <a:xfrm>
+          <a:off x="0" y="0"/>
+          <a:ext cx="0" cy="0"/>
+          <a:chOff x="0" y="0"/>
+          <a:chExt cx="0" cy="0"/>
+        </a:xfrm>
+      </p:grpSpPr>
+      <p:sp>
+        <p:nvSpPr>
+          <p:cNvPr id="2" name="Titel 1"/>
+          <p:cNvSpPr>
+            <a:spLocks noGrp="1"/>
+          </p:cNvSpPr>
+          <p:nvPr>
+            <p:ph type="title" hasCustomPrompt="1"/>
+          </p:nvPr>
+        </p:nvSpPr>
+        <p:spPr>
+          <a:xfrm>
+            <a:off x="358775" y="488950"/>
+            <a:ext cx="6877050" cy="838200"/>
+          </a:xfrm>
+        </p:spPr>
+        <p:txBody>
+          <a:bodyPr/>
+          <a:lstStyle>
+            <a:lvl1pPr>
+              <a:defRPr sz="3600">
+                <a:latin typeface="Bradley Hand ITC" panose="03070402050302030203" pitchFamily="66" charset="0"/>
+              </a:defRPr>
+            </a:lvl1pPr>
+          </a:lstStyle>
+          <a:p>
+            <a:r>
+              <a:rPr lang="de-DE" dirty="0" smtClean="0"/>
+              <a:t>Intermezzo</a:t>
+            </a:r>
+            <a:endParaRPr lang="de-DE" dirty="0"/>
+          </a:p>
+        </p:txBody>
+      </p:sp>
+      <p:pic>
+        <p:nvPicPr>
+          <p:cNvPr id="32770" name="Picture 2" descr="katieyunholmes: smiley face clip art animated - ClipArt Best ..."/>
+          <p:cNvPicPr>
+            <a:picLocks noChangeAspect="1" noChangeArrowheads="1"/>
+          </p:cNvPicPr>
+          <p:nvPr userDrawn="1"/>
+        </p:nvPicPr>
+        <p:blipFill>
+          <a:blip r:embed="rId2">
+            <a:clrChange>
+              <a:clrFrom>
+                <a:srgbClr val="FFFFFF"/>
+              </a:clrFrom>
+              <a:clrTo>
+                <a:srgbClr val="FFFFFF">
+                  <a:alpha val="0"/>
+                </a:srgbClr>
+              </a:clrTo>
+            </a:clrChange>
+            <a:extLst>
+              <a:ext uri="{28A0092B-C50C-407E-A947-70E740481C1C}">
+                <a14:useLocalDpi xmlns:a14="http://schemas.microsoft.com/office/drawing/2010/main" val="0"/>
+              </a:ext>
+            </a:extLst>
+          </a:blip>
+          <a:srcRect/>
+          <a:stretch>
+            <a:fillRect/>
+          </a:stretch>
+        </p:blipFill>
+        <p:spPr bwMode="auto">
+          <a:xfrm>
+            <a:off x="6732240" y="3933056"/>
+            <a:ext cx="2304256" cy="2304256"/>
+          </a:xfrm>
+          <a:prstGeom prst="rect">
+            <a:avLst/>
+          </a:prstGeom>
+          <a:noFill/>
+          <a:extLst>
+            <a:ext uri="{909E8E84-426E-40DD-AFC4-6F175D3DCCD1}">
+              <a14:hiddenFill xmlns:a14="http://schemas.microsoft.com/office/drawing/2010/main">
+                <a:solidFill>
+                  <a:srgbClr val="FFFFFF"/>
+                </a:solidFill>
+              </a14:hiddenFill>
+            </a:ext>
+          </a:extLst>
+        </p:spPr>
+      </p:pic>
+      <p:sp>
+        <p:nvSpPr>
+          <p:cNvPr id="5" name="Inhaltsplatzhalter 2"/>
+          <p:cNvSpPr>
+            <a:spLocks noGrp="1"/>
+          </p:cNvSpPr>
+          <p:nvPr>
+            <p:ph idx="1"/>
+          </p:nvPr>
+        </p:nvSpPr>
+        <p:spPr>
+          <a:xfrm>
+            <a:off x="251520" y="1481744"/>
+            <a:ext cx="8640763" cy="4971591"/>
+          </a:xfrm>
+        </p:spPr>
+        <p:txBody>
+          <a:bodyPr/>
+          <a:lstStyle>
+            <a:lvl1pPr marL="0" indent="0">
+              <a:buNone/>
+              <a:defRPr/>
+            </a:lvl1pPr>
+          </a:lstStyle>
+          <a:p>
+            <a:pPr lvl="0"/>
+            <a:r>
+              <a:rPr lang="de-DE" dirty="0" smtClean="0"/>
+              <a:t>Textmasterformat bearbeiten</a:t>
+            </a:r>
+          </a:p>
+          <a:p>
+            <a:pPr lvl="1"/>
+            <a:r>
+              <a:rPr lang="de-DE" dirty="0" smtClean="0"/>
+              <a:t>Zweite Ebene</a:t>
+            </a:r>
+          </a:p>
+          <a:p>
+            <a:pPr lvl="2"/>
+            <a:r>
+              <a:rPr lang="de-DE" dirty="0" smtClean="0"/>
+              <a:t>Dritte Ebene</a:t>
+            </a:r>
+          </a:p>
+          <a:p>
+            <a:pPr lvl="3"/>
+            <a:r>
+              <a:rPr lang="de-DE" dirty="0" smtClean="0"/>
+              <a:t>Vierte Ebene</a:t>
+            </a:r>
+          </a:p>
+          <a:p>
+            <a:pPr lvl="4"/>
+            <a:r>
+              <a:rPr lang="de-DE" dirty="0" smtClean="0"/>
+              <a:t>Fünfte Ebene</a:t>
+            </a:r>
+            <a:endParaRPr lang="de-DE" dirty="0"/>
+          </a:p>
+        </p:txBody>
+      </p:sp>
+    </p:spTree>
+    <p:extLst>
+      <p:ext uri="{BB962C8B-B14F-4D97-AF65-F5344CB8AC3E}">
+        <p14:creationId xmlns:p14="http://schemas.microsoft.com/office/powerpoint/2010/main" val="1893049346"/>
       </p:ext>
     </p:extLst>
   </p:cSld>
@@ -5600,7 +6841,7 @@
           <p:nvPr/>
         </p:nvPicPr>
         <p:blipFill>
-          <a:blip r:embed="rId14">
+          <a:blip r:embed="rId15">
             <a:extLst>
               <a:ext uri="{28A0092B-C50C-407E-A947-70E740481C1C}">
                 <a14:useLocalDpi xmlns:a14="http://schemas.microsoft.com/office/drawing/2010/main" val="0"/>
@@ -6109,12 +7350,12 @@
           <a:graphicData uri="http://schemas.openxmlformats.org/presentationml/2006/ole">
             <mc:AlternateContent xmlns:mc="http://schemas.openxmlformats.org/markup-compatibility/2006">
               <mc:Choice xmlns:v="urn:schemas-microsoft-com:vml" Requires="v">
-                <p:oleObj spid="_x0000_s1923" r:id="rId15" imgW="1038370" imgH="980952" progId="">
+                <p:oleObj spid="_x0000_s1929" r:id="rId16" imgW="1038370" imgH="980952" progId="">
                   <p:embed/>
                 </p:oleObj>
               </mc:Choice>
               <mc:Fallback>
-                <p:oleObj r:id="rId15" imgW="1038370" imgH="980952" progId="">
+                <p:oleObj r:id="rId16" imgW="1038370" imgH="980952" progId="">
                   <p:embed/>
                   <p:pic>
                     <p:nvPicPr>
@@ -6125,7 +7366,7 @@
                       <p:nvPr/>
                     </p:nvPicPr>
                     <p:blipFill>
-                      <a:blip r:embed="rId16">
+                      <a:blip r:embed="rId17">
                         <a:extLst>
                           <a:ext uri="{28A0092B-C50C-407E-A947-70E740481C1C}">
                             <a14:useLocalDpi xmlns:a14="http://schemas.microsoft.com/office/drawing/2010/main" val="0"/>
@@ -6547,7 +7788,7 @@
                 </a:lnSpc>
                 <a:defRPr/>
               </a:pPr>
-              <a:t>01.09.2016</a:t>
+              <a:t>02.09.2016</a:t>
             </a:fld>
             <a:r>
               <a:rPr lang="en-GB" altLang="de-DE" sz="1000" smtClean="0">
@@ -6605,6 +7846,7 @@
     <p:sldLayoutId id="2147484090" r:id="rId9"/>
     <p:sldLayoutId id="2147484073" r:id="rId10"/>
     <p:sldLayoutId id="2147484089" r:id="rId11"/>
+    <p:sldLayoutId id="2147484092" r:id="rId12"/>
   </p:sldLayoutIdLst>
   <p:timing>
     <p:tnLst>
@@ -7108,11 +8350,7 @@
           <a:p>
             <a:r>
               <a:rPr lang="en-US" smtClean="0"/>
-              <a:t>Tag </a:t>
-            </a:r>
-            <a:r>
-              <a:rPr lang="en-US" smtClean="0"/>
-              <a:t>1-Nachmittag: Anmerkungen</a:t>
+              <a:t>Tag 1-Nachmittag: Anmerkungen</a:t>
             </a:r>
             <a:endParaRPr lang="en-US" dirty="0"/>
           </a:p>
@@ -7253,13 +8491,7 @@
               <a:rPr lang="en-US">
                 <a:hlinkClick r:id="rId2"/>
               </a:rPr>
-              <a:t>https</a:t>
-            </a:r>
-            <a:r>
-              <a:rPr lang="en-US">
-                <a:hlinkClick r:id="rId2"/>
-              </a:rPr>
-              <a:t>://</a:t>
+              <a:t>https://</a:t>
             </a:r>
             <a:r>
               <a:rPr lang="en-US" smtClean="0">
@@ -7281,13 +8513,7 @@
               <a:rPr lang="en-US">
                 <a:hlinkClick r:id="rId3"/>
               </a:rPr>
-              <a:t>https</a:t>
-            </a:r>
-            <a:r>
-              <a:rPr lang="en-US">
-                <a:hlinkClick r:id="rId3"/>
-              </a:rPr>
-              <a:t>://</a:t>
+              <a:t>https://</a:t>
             </a:r>
             <a:r>
               <a:rPr lang="en-US" smtClean="0">
@@ -7475,17 +8701,581 @@
           <a:lstStyle/>
           <a:p>
             <a:r>
-              <a:rPr lang="en-US" smtClean="0"/>
-              <a:t>Folien von 2015</a:t>
-            </a:r>
-            <a:endParaRPr lang="en-US"/>
+              <a:rPr lang="en-US" dirty="0"/>
+              <a:t>Tag 2: </a:t>
+            </a:r>
+            <a:r>
+              <a:rPr lang="en-US" dirty="0" err="1"/>
+              <a:t>Rückschau</a:t>
+            </a:r>
+            <a:r>
+              <a:rPr lang="en-US" dirty="0"/>
+              <a:t> und Warm Up</a:t>
+            </a:r>
           </a:p>
         </p:txBody>
       </p:sp>
+      <p:sp>
+        <p:nvSpPr>
+          <p:cNvPr id="3" name="Inhaltsplatzhalter 2"/>
+          <p:cNvSpPr>
+            <a:spLocks noGrp="1"/>
+          </p:cNvSpPr>
+          <p:nvPr>
+            <p:ph idx="1"/>
+          </p:nvPr>
+        </p:nvSpPr>
+        <p:spPr>
+          <a:xfrm>
+            <a:off x="250825" y="1484313"/>
+            <a:ext cx="8640763" cy="504527"/>
+          </a:xfrm>
+        </p:spPr>
+        <p:txBody>
+          <a:bodyPr/>
+          <a:lstStyle/>
+          <a:p>
+            <a:r>
+              <a:rPr lang="en-US" b="1" dirty="0" smtClean="0"/>
+              <a:t>Was </a:t>
+            </a:r>
+            <a:r>
+              <a:rPr lang="en-US" b="1" dirty="0" err="1" smtClean="0"/>
+              <a:t>ist</a:t>
+            </a:r>
+            <a:r>
+              <a:rPr lang="en-US" b="1" dirty="0" smtClean="0"/>
+              <a:t> </a:t>
+            </a:r>
+            <a:r>
+              <a:rPr lang="en-US" b="1" dirty="0" err="1" smtClean="0"/>
+              <a:t>hier</a:t>
+            </a:r>
+            <a:r>
+              <a:rPr lang="en-US" b="1" dirty="0" smtClean="0"/>
+              <a:t> </a:t>
+            </a:r>
+            <a:r>
+              <a:rPr lang="en-US" b="1" dirty="0" err="1" smtClean="0"/>
+              <a:t>verkehrt</a:t>
+            </a:r>
+            <a:r>
+              <a:rPr lang="en-US" b="1" dirty="0" smtClean="0"/>
+              <a:t>? Welches Problem </a:t>
+            </a:r>
+            <a:r>
+              <a:rPr lang="en-US" b="1" dirty="0" err="1" smtClean="0"/>
+              <a:t>wird</a:t>
+            </a:r>
+            <a:r>
+              <a:rPr lang="en-US" b="1" dirty="0" smtClean="0"/>
+              <a:t> </a:t>
+            </a:r>
+            <a:r>
+              <a:rPr lang="en-US" b="1" dirty="0" err="1" smtClean="0"/>
+              <a:t>auftreten</a:t>
+            </a:r>
+            <a:r>
+              <a:rPr lang="en-US" b="1" dirty="0" smtClean="0"/>
+              <a:t>?</a:t>
+            </a:r>
+          </a:p>
+          <a:p>
+            <a:endParaRPr lang="en-US" b="1" dirty="0"/>
+          </a:p>
+          <a:p>
+            <a:endParaRPr lang="en-US" b="1" dirty="0"/>
+          </a:p>
+        </p:txBody>
+      </p:sp>
+      <p:grpSp>
+        <p:nvGrpSpPr>
+          <p:cNvPr id="7" name="Gruppieren 6"/>
+          <p:cNvGrpSpPr/>
+          <p:nvPr/>
+        </p:nvGrpSpPr>
+        <p:grpSpPr>
+          <a:xfrm>
+            <a:off x="93240" y="1988840"/>
+            <a:ext cx="8798348" cy="2088232"/>
+            <a:chOff x="1306805" y="1988840"/>
+            <a:chExt cx="7584783" cy="1800200"/>
+          </a:xfrm>
+        </p:grpSpPr>
+        <p:sp>
+          <p:nvSpPr>
+            <p:cNvPr id="4" name="Gefaltete Ecke 3"/>
+            <p:cNvSpPr/>
+            <p:nvPr/>
+          </p:nvSpPr>
+          <p:spPr bwMode="auto">
+            <a:xfrm>
+              <a:off x="1306805" y="1988840"/>
+              <a:ext cx="2502216" cy="1800200"/>
+            </a:xfrm>
+            <a:prstGeom prst="foldedCorner">
+              <a:avLst/>
+            </a:prstGeom>
+            <a:noFill/>
+            <a:ln w="9525">
+              <a:solidFill>
+                <a:srgbClr val="000000"/>
+              </a:solidFill>
+              <a:miter lim="800000"/>
+              <a:headEnd/>
+              <a:tailEnd/>
+            </a:ln>
+            <a:extLst>
+              <a:ext uri="{909E8E84-426E-40DD-AFC4-6F175D3DCCD1}">
+                <a14:hiddenFill xmlns:a14="http://schemas.microsoft.com/office/drawing/2010/main">
+                  <a:solidFill>
+                    <a:srgbClr val="FFFFFF"/>
+                  </a:solidFill>
+                </a14:hiddenFill>
+              </a:ext>
+            </a:extLst>
+          </p:spPr>
+          <p:txBody>
+            <a:bodyPr rtlCol="0" anchor="t" anchorCtr="0">
+              <a:noAutofit/>
+            </a:bodyPr>
+            <a:lstStyle/>
+            <a:p>
+              <a:pPr algn="l">
+                <a:buSzTx/>
+              </a:pPr>
+              <a:r>
+                <a:rPr lang="en-US" sz="1400" dirty="0" smtClean="0">
+                  <a:solidFill>
+                    <a:srgbClr val="7F0055"/>
+                  </a:solidFill>
+                  <a:latin typeface="Consolas" pitchFamily="49" charset="0"/>
+                </a:rPr>
+                <a:t>// main.cpp</a:t>
+              </a:r>
+            </a:p>
+            <a:p>
+              <a:pPr algn="l">
+                <a:buSzTx/>
+              </a:pPr>
+              <a:r>
+                <a:rPr lang="en-US" sz="1400" dirty="0" smtClean="0">
+                  <a:solidFill>
+                    <a:srgbClr val="7F0055"/>
+                  </a:solidFill>
+                  <a:latin typeface="Consolas" pitchFamily="49" charset="0"/>
+                </a:rPr>
+                <a:t>#</a:t>
+              </a:r>
+              <a:r>
+                <a:rPr lang="en-US" sz="1400" dirty="0">
+                  <a:solidFill>
+                    <a:srgbClr val="7F0055"/>
+                  </a:solidFill>
+                  <a:latin typeface="Consolas" pitchFamily="49" charset="0"/>
+                </a:rPr>
+                <a:t>include "functions.cpp"</a:t>
+              </a:r>
+            </a:p>
+            <a:p>
+              <a:pPr algn="l">
+                <a:buSzTx/>
+              </a:pPr>
+              <a:endParaRPr lang="en-US" sz="1400" dirty="0">
+                <a:solidFill>
+                  <a:srgbClr val="7F0055"/>
+                </a:solidFill>
+                <a:latin typeface="Consolas" pitchFamily="49" charset="0"/>
+              </a:endParaRPr>
+            </a:p>
+            <a:p>
+              <a:pPr algn="l">
+                <a:buSzTx/>
+              </a:pPr>
+              <a:r>
+                <a:rPr lang="en-US" sz="1400" dirty="0" err="1">
+                  <a:solidFill>
+                    <a:srgbClr val="7F0055"/>
+                  </a:solidFill>
+                  <a:latin typeface="Consolas" pitchFamily="49" charset="0"/>
+                </a:rPr>
+                <a:t>int</a:t>
+              </a:r>
+              <a:r>
+                <a:rPr lang="en-US" sz="1400" dirty="0">
+                  <a:solidFill>
+                    <a:srgbClr val="7F0055"/>
+                  </a:solidFill>
+                  <a:latin typeface="Consolas" pitchFamily="49" charset="0"/>
+                </a:rPr>
+                <a:t> main() {</a:t>
+              </a:r>
+            </a:p>
+            <a:p>
+              <a:pPr algn="l">
+                <a:buSzTx/>
+              </a:pPr>
+              <a:r>
+                <a:rPr lang="en-US" sz="1400" dirty="0">
+                  <a:solidFill>
+                    <a:srgbClr val="7F0055"/>
+                  </a:solidFill>
+                  <a:latin typeface="Consolas" pitchFamily="49" charset="0"/>
+                </a:rPr>
+                <a:t>	</a:t>
+              </a:r>
+              <a:r>
+                <a:rPr lang="en-US" sz="1400" dirty="0" err="1">
+                  <a:solidFill>
+                    <a:srgbClr val="7F0055"/>
+                  </a:solidFill>
+                  <a:latin typeface="Consolas" pitchFamily="49" charset="0"/>
+                </a:rPr>
+                <a:t>myNewFunction</a:t>
+              </a:r>
+              <a:r>
+                <a:rPr lang="en-US" sz="1400" dirty="0">
+                  <a:solidFill>
+                    <a:srgbClr val="7F0055"/>
+                  </a:solidFill>
+                  <a:latin typeface="Consolas" pitchFamily="49" charset="0"/>
+                </a:rPr>
+                <a:t>();</a:t>
+              </a:r>
+            </a:p>
+            <a:p>
+              <a:pPr algn="l">
+                <a:buSzTx/>
+              </a:pPr>
+              <a:r>
+                <a:rPr lang="en-US" sz="1400" dirty="0">
+                  <a:solidFill>
+                    <a:srgbClr val="7F0055"/>
+                  </a:solidFill>
+                  <a:latin typeface="Consolas" pitchFamily="49" charset="0"/>
+                </a:rPr>
+                <a:t>	return 0;</a:t>
+              </a:r>
+            </a:p>
+            <a:p>
+              <a:pPr algn="l">
+                <a:buSzTx/>
+              </a:pPr>
+              <a:r>
+                <a:rPr lang="en-US" sz="1400" dirty="0">
+                  <a:solidFill>
+                    <a:srgbClr val="7F0055"/>
+                  </a:solidFill>
+                  <a:latin typeface="Consolas" pitchFamily="49" charset="0"/>
+                </a:rPr>
+                <a:t>}</a:t>
+              </a:r>
+            </a:p>
+          </p:txBody>
+        </p:sp>
+        <p:sp>
+          <p:nvSpPr>
+            <p:cNvPr id="5" name="Gefaltete Ecke 4"/>
+            <p:cNvSpPr/>
+            <p:nvPr/>
+          </p:nvSpPr>
+          <p:spPr bwMode="auto">
+            <a:xfrm>
+              <a:off x="6271084" y="1988840"/>
+              <a:ext cx="2620504" cy="1800200"/>
+            </a:xfrm>
+            <a:prstGeom prst="foldedCorner">
+              <a:avLst/>
+            </a:prstGeom>
+            <a:noFill/>
+            <a:ln w="9525">
+              <a:solidFill>
+                <a:srgbClr val="000000"/>
+              </a:solidFill>
+              <a:miter lim="800000"/>
+              <a:headEnd/>
+              <a:tailEnd/>
+            </a:ln>
+            <a:extLst>
+              <a:ext uri="{909E8E84-426E-40DD-AFC4-6F175D3DCCD1}">
+                <a14:hiddenFill xmlns:a14="http://schemas.microsoft.com/office/drawing/2010/main">
+                  <a:solidFill>
+                    <a:srgbClr val="FFFFFF"/>
+                  </a:solidFill>
+                </a14:hiddenFill>
+              </a:ext>
+            </a:extLst>
+          </p:spPr>
+          <p:txBody>
+            <a:bodyPr wrap="square" rtlCol="0" anchor="t" anchorCtr="0">
+              <a:noAutofit/>
+            </a:bodyPr>
+            <a:lstStyle/>
+            <a:p>
+              <a:pPr algn="l">
+                <a:buSzTx/>
+              </a:pPr>
+              <a:r>
+                <a:rPr lang="en-US" sz="1400" dirty="0">
+                  <a:solidFill>
+                    <a:srgbClr val="7F0055"/>
+                  </a:solidFill>
+                  <a:latin typeface="Consolas" pitchFamily="49" charset="0"/>
+                </a:rPr>
+                <a:t>//</a:t>
+              </a:r>
+              <a:r>
+                <a:rPr lang="en-US" sz="1400" dirty="0" smtClean="0">
+                  <a:solidFill>
+                    <a:srgbClr val="7F0055"/>
+                  </a:solidFill>
+                  <a:latin typeface="Consolas" pitchFamily="49" charset="0"/>
+                </a:rPr>
+                <a:t>functions.cpp</a:t>
+              </a:r>
+            </a:p>
+            <a:p>
+              <a:pPr algn="l">
+                <a:buSzTx/>
+              </a:pPr>
+              <a:r>
+                <a:rPr lang="en-US" sz="1400" dirty="0" smtClean="0">
+                  <a:solidFill>
+                    <a:srgbClr val="7F0055"/>
+                  </a:solidFill>
+                  <a:latin typeface="Consolas" pitchFamily="49" charset="0"/>
+                </a:rPr>
+                <a:t>#include “functions.hpp”</a:t>
+              </a:r>
+              <a:r>
+                <a:rPr lang="en-US" sz="1400" dirty="0">
+                  <a:solidFill>
+                    <a:srgbClr val="7F0055"/>
+                  </a:solidFill>
+                  <a:latin typeface="Consolas" pitchFamily="49" charset="0"/>
+                </a:rPr>
+                <a:t/>
+              </a:r>
+              <a:br>
+                <a:rPr lang="en-US" sz="1400" dirty="0">
+                  <a:solidFill>
+                    <a:srgbClr val="7F0055"/>
+                  </a:solidFill>
+                  <a:latin typeface="Consolas" pitchFamily="49" charset="0"/>
+                </a:rPr>
+              </a:br>
+              <a:r>
+                <a:rPr lang="en-US" sz="1400" dirty="0">
+                  <a:solidFill>
+                    <a:srgbClr val="7F0055"/>
+                  </a:solidFill>
+                  <a:latin typeface="Consolas" pitchFamily="49" charset="0"/>
+                </a:rPr>
+                <a:t/>
+              </a:r>
+              <a:br>
+                <a:rPr lang="en-US" sz="1400" dirty="0">
+                  <a:solidFill>
+                    <a:srgbClr val="7F0055"/>
+                  </a:solidFill>
+                  <a:latin typeface="Consolas" pitchFamily="49" charset="0"/>
+                </a:rPr>
+              </a:br>
+              <a:r>
+                <a:rPr lang="en-US" sz="1400" dirty="0" err="1">
+                  <a:solidFill>
+                    <a:srgbClr val="7F0055"/>
+                  </a:solidFill>
+                  <a:latin typeface="Consolas" pitchFamily="49" charset="0"/>
+                </a:rPr>
+                <a:t>int</a:t>
+              </a:r>
+              <a:r>
+                <a:rPr lang="en-US" sz="1400" dirty="0">
+                  <a:solidFill>
+                    <a:srgbClr val="7F0055"/>
+                  </a:solidFill>
+                  <a:latin typeface="Consolas" pitchFamily="49" charset="0"/>
+                </a:rPr>
+                <a:t> </a:t>
+              </a:r>
+              <a:r>
+                <a:rPr lang="en-US" sz="1400" dirty="0" err="1">
+                  <a:solidFill>
+                    <a:srgbClr val="7F0055"/>
+                  </a:solidFill>
+                  <a:latin typeface="Consolas" pitchFamily="49" charset="0"/>
+                </a:rPr>
+                <a:t>myNewFunction</a:t>
+              </a:r>
+              <a:r>
+                <a:rPr lang="en-US" sz="1400" dirty="0">
+                  <a:solidFill>
+                    <a:srgbClr val="7F0055"/>
+                  </a:solidFill>
+                  <a:latin typeface="Consolas" pitchFamily="49" charset="0"/>
+                </a:rPr>
+                <a:t>() {</a:t>
+              </a:r>
+            </a:p>
+            <a:p>
+              <a:pPr algn="l">
+                <a:buSzTx/>
+              </a:pPr>
+              <a:r>
+                <a:rPr lang="en-US" sz="1400" dirty="0">
+                  <a:solidFill>
+                    <a:srgbClr val="7F0055"/>
+                  </a:solidFill>
+                  <a:latin typeface="Consolas" pitchFamily="49" charset="0"/>
+                </a:rPr>
+                <a:t>	return -12;</a:t>
+              </a:r>
+            </a:p>
+            <a:p>
+              <a:pPr algn="l">
+                <a:buSzTx/>
+              </a:pPr>
+              <a:r>
+                <a:rPr lang="en-US" sz="1400" dirty="0">
+                  <a:solidFill>
+                    <a:srgbClr val="7F0055"/>
+                  </a:solidFill>
+                  <a:latin typeface="Consolas" pitchFamily="49" charset="0"/>
+                </a:rPr>
+                <a:t>}</a:t>
+              </a:r>
+            </a:p>
+            <a:p>
+              <a:pPr algn="l">
+                <a:buSzTx/>
+              </a:pPr>
+              <a:endParaRPr lang="en-US" sz="1400" dirty="0">
+                <a:solidFill>
+                  <a:srgbClr val="7F0055"/>
+                </a:solidFill>
+                <a:latin typeface="Consolas" pitchFamily="49" charset="0"/>
+              </a:endParaRPr>
+            </a:p>
+          </p:txBody>
+        </p:sp>
+        <p:sp>
+          <p:nvSpPr>
+            <p:cNvPr id="6" name="Gefaltete Ecke 5"/>
+            <p:cNvSpPr/>
+            <p:nvPr/>
+          </p:nvSpPr>
+          <p:spPr bwMode="auto">
+            <a:xfrm>
+              <a:off x="3923928" y="1988840"/>
+              <a:ext cx="2232248" cy="1800200"/>
+            </a:xfrm>
+            <a:prstGeom prst="foldedCorner">
+              <a:avLst/>
+            </a:prstGeom>
+            <a:noFill/>
+            <a:ln w="9525">
+              <a:solidFill>
+                <a:srgbClr val="000000"/>
+              </a:solidFill>
+              <a:miter lim="800000"/>
+              <a:headEnd/>
+              <a:tailEnd/>
+            </a:ln>
+            <a:extLst>
+              <a:ext uri="{909E8E84-426E-40DD-AFC4-6F175D3DCCD1}">
+                <a14:hiddenFill xmlns:a14="http://schemas.microsoft.com/office/drawing/2010/main">
+                  <a:solidFill>
+                    <a:srgbClr val="FFFFFF"/>
+                  </a:solidFill>
+                </a14:hiddenFill>
+              </a:ext>
+            </a:extLst>
+          </p:spPr>
+          <p:txBody>
+            <a:bodyPr wrap="square" rtlCol="0" anchor="t" anchorCtr="0">
+              <a:noAutofit/>
+            </a:bodyPr>
+            <a:lstStyle/>
+            <a:p>
+              <a:pPr algn="l">
+                <a:buSzTx/>
+              </a:pPr>
+              <a:r>
+                <a:rPr lang="en-US" sz="1400" dirty="0" smtClean="0">
+                  <a:solidFill>
+                    <a:srgbClr val="7F0055"/>
+                  </a:solidFill>
+                  <a:latin typeface="Consolas" pitchFamily="49" charset="0"/>
+                </a:rPr>
+                <a:t>//functions.hpp</a:t>
+              </a:r>
+            </a:p>
+            <a:p>
+              <a:pPr algn="l">
+                <a:buSzTx/>
+              </a:pPr>
+              <a:endParaRPr lang="en-US" sz="1400" dirty="0" smtClean="0">
+                <a:solidFill>
+                  <a:srgbClr val="7F0055"/>
+                </a:solidFill>
+                <a:latin typeface="Consolas" pitchFamily="49" charset="0"/>
+              </a:endParaRPr>
+            </a:p>
+            <a:p>
+              <a:pPr algn="l">
+                <a:buSzTx/>
+              </a:pPr>
+              <a:r>
+                <a:rPr lang="en-US" sz="1400" dirty="0" err="1" smtClean="0">
+                  <a:solidFill>
+                    <a:srgbClr val="7F0055"/>
+                  </a:solidFill>
+                  <a:latin typeface="Consolas" pitchFamily="49" charset="0"/>
+                </a:rPr>
+                <a:t>int</a:t>
+              </a:r>
+              <a:r>
+                <a:rPr lang="en-US" sz="1400" dirty="0" smtClean="0">
+                  <a:solidFill>
+                    <a:srgbClr val="7F0055"/>
+                  </a:solidFill>
+                  <a:latin typeface="Consolas" pitchFamily="49" charset="0"/>
+                </a:rPr>
+                <a:t> </a:t>
+              </a:r>
+              <a:r>
+                <a:rPr lang="en-US" sz="1400" dirty="0" err="1">
+                  <a:solidFill>
+                    <a:srgbClr val="7F0055"/>
+                  </a:solidFill>
+                  <a:latin typeface="Consolas" pitchFamily="49" charset="0"/>
+                </a:rPr>
+                <a:t>myNewFunction</a:t>
+              </a:r>
+              <a:r>
+                <a:rPr lang="en-US" sz="1400" dirty="0" smtClean="0">
+                  <a:solidFill>
+                    <a:srgbClr val="7F0055"/>
+                  </a:solidFill>
+                  <a:latin typeface="Consolas" pitchFamily="49" charset="0"/>
+                </a:rPr>
+                <a:t>();</a:t>
+              </a:r>
+              <a:endParaRPr lang="en-US" sz="1400" dirty="0">
+                <a:solidFill>
+                  <a:srgbClr val="7F0055"/>
+                </a:solidFill>
+                <a:latin typeface="Consolas" pitchFamily="49" charset="0"/>
+              </a:endParaRPr>
+            </a:p>
+          </p:txBody>
+        </p:sp>
+      </p:grpSp>
     </p:spTree>
     <p:extLst>
       <p:ext uri="{BB962C8B-B14F-4D97-AF65-F5344CB8AC3E}">
-        <p14:creationId xmlns:p14="http://schemas.microsoft.com/office/powerpoint/2010/main" val="409010217"/>
+        <p14:creationId xmlns:p14="http://schemas.microsoft.com/office/powerpoint/2010/main" val="3279742400"/>
       </p:ext>
     </p:extLst>
   </p:cSld>
@@ -7521,6 +9311,545 @@
       </p:grpSpPr>
       <p:sp>
         <p:nvSpPr>
+          <p:cNvPr id="2" name="Titel 1"/>
+          <p:cNvSpPr>
+            <a:spLocks noGrp="1"/>
+          </p:cNvSpPr>
+          <p:nvPr>
+            <p:ph type="title"/>
+          </p:nvPr>
+        </p:nvSpPr>
+        <p:spPr/>
+        <p:txBody>
+          <a:bodyPr/>
+          <a:lstStyle/>
+          <a:p>
+            <a:r>
+              <a:rPr lang="en-US" dirty="0" smtClean="0"/>
+              <a:t>Tag 3: </a:t>
+            </a:r>
+            <a:r>
+              <a:rPr lang="en-US" dirty="0" err="1" smtClean="0"/>
+              <a:t>Rückschau</a:t>
+            </a:r>
+            <a:r>
+              <a:rPr lang="en-US" dirty="0" smtClean="0"/>
+              <a:t> und Warm Up</a:t>
+            </a:r>
+            <a:endParaRPr lang="en-US" dirty="0"/>
+          </a:p>
+        </p:txBody>
+      </p:sp>
+      <p:sp>
+        <p:nvSpPr>
+          <p:cNvPr id="3" name="Inhaltsplatzhalter 2"/>
+          <p:cNvSpPr>
+            <a:spLocks noGrp="1"/>
+          </p:cNvSpPr>
+          <p:nvPr>
+            <p:ph idx="1"/>
+          </p:nvPr>
+        </p:nvSpPr>
+        <p:spPr/>
+        <p:txBody>
+          <a:bodyPr/>
+          <a:lstStyle/>
+          <a:p>
+            <a:pPr marL="342900" indent="-342900">
+              <a:buFontTx/>
+              <a:buChar char="-"/>
+            </a:pPr>
+            <a:endParaRPr lang="en-US" dirty="0" smtClean="0"/>
+          </a:p>
+          <a:p>
+            <a:pPr marL="342900" indent="-342900">
+              <a:buFontTx/>
+              <a:buChar char="-"/>
+            </a:pPr>
+            <a:r>
+              <a:rPr lang="en-US" smtClean="0"/>
+              <a:t>Fragen </a:t>
+            </a:r>
+            <a:r>
+              <a:rPr lang="en-US" dirty="0" err="1" smtClean="0"/>
+              <a:t>für</a:t>
+            </a:r>
+            <a:r>
+              <a:rPr lang="en-US" dirty="0" smtClean="0"/>
+              <a:t> die </a:t>
+            </a:r>
+            <a:r>
+              <a:rPr lang="en-US" b="1" dirty="0" smtClean="0"/>
+              <a:t>Evaluation</a:t>
+            </a:r>
+            <a:r>
+              <a:rPr lang="en-US" dirty="0" smtClean="0"/>
+              <a:t> am </a:t>
+            </a:r>
+            <a:r>
+              <a:rPr lang="en-US" dirty="0" err="1" smtClean="0"/>
+              <a:t>letzten</a:t>
+            </a:r>
+            <a:r>
+              <a:rPr lang="en-US" dirty="0" smtClean="0"/>
+              <a:t> Tag</a:t>
+            </a:r>
+          </a:p>
+          <a:p>
+            <a:pPr marL="692150" lvl="1" indent="-342900">
+              <a:buFont typeface="+mj-lt"/>
+              <a:buAutoNum type="arabicPeriod"/>
+            </a:pPr>
+            <a:r>
+              <a:rPr lang="en-US" dirty="0" err="1" smtClean="0"/>
+              <a:t>Stärkerer</a:t>
+            </a:r>
+            <a:r>
+              <a:rPr lang="en-US" dirty="0" smtClean="0"/>
+              <a:t> </a:t>
+            </a:r>
+            <a:r>
+              <a:rPr lang="en-US" dirty="0" err="1" smtClean="0"/>
+              <a:t>Fokus</a:t>
+            </a:r>
+            <a:r>
+              <a:rPr lang="en-US" dirty="0" smtClean="0"/>
+              <a:t> auf C++11 </a:t>
+            </a:r>
+            <a:r>
+              <a:rPr lang="en-US" dirty="0" err="1" smtClean="0"/>
+              <a:t>legen</a:t>
+            </a:r>
+            <a:r>
+              <a:rPr lang="en-US" dirty="0" smtClean="0"/>
+              <a:t>?</a:t>
+            </a:r>
+          </a:p>
+          <a:p>
+            <a:pPr marL="692150" lvl="1" indent="-342900">
+              <a:buFont typeface="+mj-lt"/>
+              <a:buAutoNum type="arabicPeriod"/>
+            </a:pPr>
+            <a:r>
+              <a:rPr lang="en-US" smtClean="0"/>
+              <a:t>Selbsteinschätzung deiner C++-Kenntnisse (1=Keine Vorkenntnisse, 3=Eigene kleinere Projekte, 5=Sehr erfahrener C++-Programmierer)</a:t>
+            </a:r>
+            <a:endParaRPr lang="en-US" dirty="0"/>
+          </a:p>
+          <a:p>
+            <a:pPr marL="342900" indent="-342900">
+              <a:buFontTx/>
+              <a:buChar char="-"/>
+            </a:pPr>
+            <a:r>
+              <a:rPr lang="en-US" b="1" dirty="0" err="1" smtClean="0"/>
+              <a:t>Gastvortrag</a:t>
+            </a:r>
+            <a:r>
+              <a:rPr lang="en-US" b="1" dirty="0" smtClean="0"/>
+              <a:t> am </a:t>
+            </a:r>
+            <a:r>
+              <a:rPr lang="en-US" b="1" dirty="0" err="1" smtClean="0"/>
+              <a:t>letzten</a:t>
+            </a:r>
+            <a:r>
+              <a:rPr lang="en-US" b="1" dirty="0" smtClean="0"/>
+              <a:t> Tag</a:t>
+            </a:r>
+            <a:r>
+              <a:rPr lang="en-US" dirty="0" smtClean="0"/>
+              <a:t>: Holger Wech von Cypress/</a:t>
+            </a:r>
+            <a:r>
+              <a:rPr lang="en-US" dirty="0" err="1" smtClean="0"/>
+              <a:t>Spansion</a:t>
+            </a:r>
+            <a:r>
+              <a:rPr lang="en-US" dirty="0" smtClean="0"/>
+              <a:t/>
+            </a:r>
+            <a:br>
+              <a:rPr lang="en-US" dirty="0" smtClean="0"/>
+            </a:br>
+            <a:endParaRPr lang="en-US" dirty="0"/>
+          </a:p>
+        </p:txBody>
+      </p:sp>
+      <p:grpSp>
+        <p:nvGrpSpPr>
+          <p:cNvPr id="8" name="Gruppieren 7"/>
+          <p:cNvGrpSpPr/>
+          <p:nvPr/>
+        </p:nvGrpSpPr>
+        <p:grpSpPr>
+          <a:xfrm>
+            <a:off x="1475656" y="3645024"/>
+            <a:ext cx="4992961" cy="1865682"/>
+            <a:chOff x="1475656" y="4521395"/>
+            <a:chExt cx="4992961" cy="1865682"/>
+          </a:xfrm>
+        </p:grpSpPr>
+        <p:pic>
+          <p:nvPicPr>
+            <p:cNvPr id="4" name="Grafik 3"/>
+            <p:cNvPicPr>
+              <a:picLocks noChangeAspect="1"/>
+            </p:cNvPicPr>
+            <p:nvPr/>
+          </p:nvPicPr>
+          <p:blipFill>
+            <a:blip r:embed="rId2"/>
+            <a:stretch>
+              <a:fillRect/>
+            </a:stretch>
+          </p:blipFill>
+          <p:spPr>
+            <a:xfrm>
+              <a:off x="1475656" y="4521395"/>
+              <a:ext cx="4824536" cy="1865682"/>
+            </a:xfrm>
+            <a:prstGeom prst="rect">
+              <a:avLst/>
+            </a:prstGeom>
+          </p:spPr>
+        </p:pic>
+        <p:sp>
+          <p:nvSpPr>
+            <p:cNvPr id="5" name="Rechteck 4"/>
+            <p:cNvSpPr/>
+            <p:nvPr/>
+          </p:nvSpPr>
+          <p:spPr bwMode="auto">
+            <a:xfrm>
+              <a:off x="4139952" y="5805264"/>
+              <a:ext cx="2328665" cy="170166"/>
+            </a:xfrm>
+            <a:prstGeom prst="rect">
+              <a:avLst/>
+            </a:prstGeom>
+            <a:solidFill>
+              <a:schemeClr val="bg1"/>
+            </a:solidFill>
+            <a:ln w="9525">
+              <a:noFill/>
+              <a:miter lim="800000"/>
+              <a:headEnd/>
+              <a:tailEnd/>
+            </a:ln>
+            <a:extLst/>
+          </p:spPr>
+          <p:txBody>
+            <a:bodyPr wrap="square" rtlCol="0" anchor="ctr">
+              <a:spAutoFit/>
+            </a:bodyPr>
+            <a:lstStyle/>
+            <a:p>
+              <a:pPr algn="ctr" eaLnBrk="1" hangingPunct="1">
+                <a:spcBef>
+                  <a:spcPct val="0"/>
+                </a:spcBef>
+                <a:buSzTx/>
+                <a:buFont typeface="Arial" charset="0"/>
+                <a:buNone/>
+              </a:pPr>
+              <a:endParaRPr lang="en-US" sz="1400" dirty="0" err="1">
+                <a:solidFill>
+                  <a:srgbClr val="7F0055"/>
+                </a:solidFill>
+                <a:latin typeface="Consolas" pitchFamily="49" charset="0"/>
+              </a:endParaRPr>
+            </a:p>
+          </p:txBody>
+        </p:sp>
+      </p:grpSp>
+    </p:spTree>
+    <p:extLst>
+      <p:ext uri="{BB962C8B-B14F-4D97-AF65-F5344CB8AC3E}">
+        <p14:creationId xmlns:p14="http://schemas.microsoft.com/office/powerpoint/2010/main" val="1706240809"/>
+      </p:ext>
+    </p:extLst>
+  </p:cSld>
+  <p:clrMapOvr>
+    <a:masterClrMapping/>
+  </p:clrMapOvr>
+  <p:timing>
+    <p:tnLst>
+      <p:par>
+        <p:cTn id="1" dur="indefinite" restart="never" nodeType="tmRoot"/>
+      </p:par>
+    </p:tnLst>
+  </p:timing>
+</p:sld>
+</file>
+
+<file path=ppt/slides/slide5.xml><?xml version="1.0" encoding="utf-8"?>
+<p:sld xmlns:a="http://schemas.openxmlformats.org/drawingml/2006/main" xmlns:r="http://schemas.openxmlformats.org/officeDocument/2006/relationships" xmlns:p="http://schemas.openxmlformats.org/presentationml/2006/main">
+  <p:cSld>
+    <p:spTree>
+      <p:nvGrpSpPr>
+        <p:cNvPr id="1" name=""/>
+        <p:cNvGrpSpPr/>
+        <p:nvPr/>
+      </p:nvGrpSpPr>
+      <p:grpSpPr>
+        <a:xfrm>
+          <a:off x="0" y="0"/>
+          <a:ext cx="0" cy="0"/>
+          <a:chOff x="0" y="0"/>
+          <a:chExt cx="0" cy="0"/>
+        </a:xfrm>
+      </p:grpSpPr>
+      <p:sp>
+        <p:nvSpPr>
+          <p:cNvPr id="15362" name="Titel 1"/>
+          <p:cNvSpPr>
+            <a:spLocks noGrp="1"/>
+          </p:cNvSpPr>
+          <p:nvPr>
+            <p:ph type="title"/>
+          </p:nvPr>
+        </p:nvSpPr>
+        <p:spPr/>
+        <p:txBody>
+          <a:bodyPr/>
+          <a:lstStyle/>
+          <a:p>
+            <a:r>
+              <a:rPr lang="de-DE" altLang="de-DE" smtClean="0">
+                <a:latin typeface="Consolas" panose="020B0609020204030204" pitchFamily="49" charset="0"/>
+                <a:cs typeface="Consolas" panose="020B0609020204030204" pitchFamily="49" charset="0"/>
+              </a:rPr>
+              <a:t>Tag 3: *</a:t>
+            </a:r>
+            <a:r>
+              <a:rPr lang="de-DE" altLang="de-DE" smtClean="0"/>
+              <a:t> </a:t>
+            </a:r>
+            <a:r>
+              <a:rPr lang="de-DE" altLang="de-DE" dirty="0" smtClean="0"/>
+              <a:t>und </a:t>
+            </a:r>
+            <a:r>
+              <a:rPr lang="de-DE" altLang="de-DE" dirty="0" smtClean="0">
+                <a:latin typeface="Consolas" panose="020B0609020204030204" pitchFamily="49" charset="0"/>
+                <a:cs typeface="Consolas" panose="020B0609020204030204" pitchFamily="49" charset="0"/>
+              </a:rPr>
+              <a:t>&amp;</a:t>
+            </a:r>
+          </a:p>
+        </p:txBody>
+      </p:sp>
+      <p:sp>
+        <p:nvSpPr>
+          <p:cNvPr id="2" name="Inhaltsplatzhalter 1"/>
+          <p:cNvSpPr>
+            <a:spLocks noGrp="1"/>
+          </p:cNvSpPr>
+          <p:nvPr>
+            <p:ph idx="1"/>
+          </p:nvPr>
+        </p:nvSpPr>
+        <p:spPr/>
+        <p:txBody>
+          <a:bodyPr/>
+          <a:lstStyle/>
+          <a:p>
+            <a:pPr eaLnBrk="1" hangingPunct="1">
+              <a:spcBef>
+                <a:spcPct val="0"/>
+              </a:spcBef>
+            </a:pPr>
+            <a:r>
+              <a:rPr lang="de-DE" altLang="de-DE" smtClean="0"/>
+              <a:t>Welche </a:t>
+            </a:r>
+            <a:r>
+              <a:rPr lang="de-DE" altLang="de-DE" b="1"/>
+              <a:t>Bedeutung</a:t>
+            </a:r>
+            <a:r>
+              <a:rPr lang="de-DE" altLang="de-DE"/>
+              <a:t> kann der Asterisk (</a:t>
+            </a:r>
+            <a:r>
+              <a:rPr lang="de-DE" altLang="de-DE">
+                <a:latin typeface="Courier New" panose="02070309020205020404" pitchFamily="49" charset="0"/>
+                <a:cs typeface="Courier New" panose="02070309020205020404" pitchFamily="49" charset="0"/>
+              </a:rPr>
+              <a:t>*</a:t>
+            </a:r>
+            <a:r>
+              <a:rPr lang="de-DE" altLang="de-DE"/>
+              <a:t>) im Code annehmen?</a:t>
+            </a:r>
+          </a:p>
+          <a:p>
+            <a:pPr eaLnBrk="1" hangingPunct="1">
+              <a:spcBef>
+                <a:spcPct val="0"/>
+              </a:spcBef>
+            </a:pPr>
+            <a:endParaRPr lang="de-DE" altLang="de-DE"/>
+          </a:p>
+          <a:p>
+            <a:pPr eaLnBrk="1" hangingPunct="1">
+              <a:spcBef>
+                <a:spcPct val="0"/>
+              </a:spcBef>
+            </a:pPr>
+            <a:endParaRPr lang="de-DE" altLang="de-DE"/>
+          </a:p>
+          <a:p>
+            <a:pPr eaLnBrk="1" hangingPunct="1">
+              <a:spcBef>
+                <a:spcPct val="0"/>
+              </a:spcBef>
+            </a:pPr>
+            <a:r>
+              <a:rPr lang="de-DE" altLang="de-DE"/>
+              <a:t>Welche </a:t>
+            </a:r>
+            <a:r>
+              <a:rPr lang="de-DE" altLang="de-DE" b="1"/>
+              <a:t>Bedeutung</a:t>
+            </a:r>
+            <a:r>
+              <a:rPr lang="de-DE" altLang="de-DE"/>
+              <a:t> kann das Ampersand (</a:t>
+            </a:r>
+            <a:r>
+              <a:rPr lang="de-DE" altLang="de-DE">
+                <a:latin typeface="Courier New" panose="02070309020205020404" pitchFamily="49" charset="0"/>
+                <a:cs typeface="Courier New" panose="02070309020205020404" pitchFamily="49" charset="0"/>
+              </a:rPr>
+              <a:t>&amp;</a:t>
+            </a:r>
+            <a:r>
+              <a:rPr lang="de-DE" altLang="de-DE"/>
+              <a:t>) im Code annehmen?</a:t>
+            </a:r>
+          </a:p>
+          <a:p>
+            <a:pPr eaLnBrk="1" hangingPunct="1">
+              <a:spcBef>
+                <a:spcPct val="0"/>
+              </a:spcBef>
+            </a:pPr>
+            <a:endParaRPr lang="de-DE" altLang="de-DE"/>
+          </a:p>
+          <a:p>
+            <a:endParaRPr lang="en-US"/>
+          </a:p>
+        </p:txBody>
+      </p:sp>
+    </p:spTree>
+    <p:extLst>
+      <p:ext uri="{BB962C8B-B14F-4D97-AF65-F5344CB8AC3E}">
+        <p14:creationId xmlns:p14="http://schemas.microsoft.com/office/powerpoint/2010/main" val="1677156006"/>
+      </p:ext>
+    </p:extLst>
+  </p:cSld>
+  <p:clrMapOvr>
+    <a:masterClrMapping/>
+  </p:clrMapOvr>
+  <mc:AlternateContent xmlns:mc="http://schemas.openxmlformats.org/markup-compatibility/2006" xmlns:p14="http://schemas.microsoft.com/office/powerpoint/2010/main">
+    <mc:Choice Requires="p14">
+      <p:transition spd="slow" p14:dur="2000"/>
+    </mc:Choice>
+    <mc:Fallback xmlns="">
+      <p:transition spd="slow"/>
+    </mc:Fallback>
+  </mc:AlternateContent>
+  <p:timing>
+    <p:tnLst>
+      <p:par>
+        <p:cTn id="1" dur="indefinite" restart="never" nodeType="tmRoot"/>
+      </p:par>
+    </p:tnLst>
+  </p:timing>
+</p:sld>
+</file>
+
+<file path=ppt/slides/slide6.xml><?xml version="1.0" encoding="utf-8"?>
+<p:sld xmlns:a="http://schemas.openxmlformats.org/drawingml/2006/main" xmlns:r="http://schemas.openxmlformats.org/officeDocument/2006/relationships" xmlns:p="http://schemas.openxmlformats.org/presentationml/2006/main">
+  <p:cSld>
+    <p:spTree>
+      <p:nvGrpSpPr>
+        <p:cNvPr id="1" name=""/>
+        <p:cNvGrpSpPr/>
+        <p:nvPr/>
+      </p:nvGrpSpPr>
+      <p:grpSpPr>
+        <a:xfrm>
+          <a:off x="0" y="0"/>
+          <a:ext cx="0" cy="0"/>
+          <a:chOff x="0" y="0"/>
+          <a:chExt cx="0" cy="0"/>
+        </a:xfrm>
+      </p:grpSpPr>
+      <p:sp>
+        <p:nvSpPr>
+          <p:cNvPr id="2" name="Titel 1"/>
+          <p:cNvSpPr>
+            <a:spLocks noGrp="1"/>
+          </p:cNvSpPr>
+          <p:nvPr>
+            <p:ph type="title"/>
+          </p:nvPr>
+        </p:nvSpPr>
+        <p:spPr/>
+        <p:txBody>
+          <a:bodyPr/>
+          <a:lstStyle/>
+          <a:p>
+            <a:r>
+              <a:rPr lang="en-US" smtClean="0"/>
+              <a:t>Folien von 2015</a:t>
+            </a:r>
+            <a:endParaRPr lang="en-US"/>
+          </a:p>
+        </p:txBody>
+      </p:sp>
+    </p:spTree>
+    <p:extLst>
+      <p:ext uri="{BB962C8B-B14F-4D97-AF65-F5344CB8AC3E}">
+        <p14:creationId xmlns:p14="http://schemas.microsoft.com/office/powerpoint/2010/main" val="409010217"/>
+      </p:ext>
+    </p:extLst>
+  </p:cSld>
+  <p:clrMapOvr>
+    <a:masterClrMapping/>
+  </p:clrMapOvr>
+  <p:timing>
+    <p:tnLst>
+      <p:par>
+        <p:cTn id="1" dur="indefinite" restart="never" nodeType="tmRoot"/>
+      </p:par>
+    </p:tnLst>
+  </p:timing>
+</p:sld>
+</file>
+
+<file path=ppt/slides/slide7.xml><?xml version="1.0" encoding="utf-8"?>
+<p:sld xmlns:a="http://schemas.openxmlformats.org/drawingml/2006/main" xmlns:r="http://schemas.openxmlformats.org/officeDocument/2006/relationships" xmlns:p="http://schemas.openxmlformats.org/presentationml/2006/main">
+  <p:cSld>
+    <p:spTree>
+      <p:nvGrpSpPr>
+        <p:cNvPr id="1" name=""/>
+        <p:cNvGrpSpPr/>
+        <p:nvPr/>
+      </p:nvGrpSpPr>
+      <p:grpSpPr>
+        <a:xfrm>
+          <a:off x="0" y="0"/>
+          <a:ext cx="0" cy="0"/>
+          <a:chOff x="0" y="0"/>
+          <a:chExt cx="0" cy="0"/>
+        </a:xfrm>
+      </p:grpSpPr>
+      <p:sp>
+        <p:nvSpPr>
           <p:cNvPr id="7" name="Titel 6"/>
           <p:cNvSpPr>
             <a:spLocks noGrp="1"/>
@@ -7808,13 +10137,7 @@
               <a:rPr lang="en-US" smtClean="0">
                 <a:sym typeface="Wingdings" panose="05000000000000000000" pitchFamily="2" charset="2"/>
               </a:rPr>
-              <a:t>und </a:t>
-            </a:r>
-            <a:r>
-              <a:rPr lang="en-US" smtClean="0">
-                <a:sym typeface="Wingdings" panose="05000000000000000000" pitchFamily="2" charset="2"/>
-              </a:rPr>
-              <a:t>Hinweise</a:t>
+              <a:t>und Hinweise</a:t>
             </a:r>
             <a:endParaRPr lang="en-US" dirty="0" smtClean="0"/>
           </a:p>
@@ -8165,938 +10488,7 @@
 </p:sld>
 </file>
 
-<file path=ppt/slides/slide5.xml><?xml version="1.0" encoding="utf-8"?>
-<p:sld xmlns:a="http://schemas.openxmlformats.org/drawingml/2006/main" xmlns:r="http://schemas.openxmlformats.org/officeDocument/2006/relationships" xmlns:p="http://schemas.openxmlformats.org/presentationml/2006/main">
-  <p:cSld>
-    <p:spTree>
-      <p:nvGrpSpPr>
-        <p:cNvPr id="1" name=""/>
-        <p:cNvGrpSpPr/>
-        <p:nvPr/>
-      </p:nvGrpSpPr>
-      <p:grpSpPr>
-        <a:xfrm>
-          <a:off x="0" y="0"/>
-          <a:ext cx="0" cy="0"/>
-          <a:chOff x="0" y="0"/>
-          <a:chExt cx="0" cy="0"/>
-        </a:xfrm>
-      </p:grpSpPr>
-      <p:sp>
-        <p:nvSpPr>
-          <p:cNvPr id="2" name="Titel 1"/>
-          <p:cNvSpPr>
-            <a:spLocks noGrp="1"/>
-          </p:cNvSpPr>
-          <p:nvPr>
-            <p:ph type="title"/>
-          </p:nvPr>
-        </p:nvSpPr>
-        <p:spPr/>
-        <p:txBody>
-          <a:bodyPr/>
-          <a:lstStyle/>
-          <a:p>
-            <a:r>
-              <a:rPr lang="en-US" dirty="0"/>
-              <a:t>Tag 2: </a:t>
-            </a:r>
-            <a:r>
-              <a:rPr lang="en-US" dirty="0" err="1"/>
-              <a:t>Rückschau</a:t>
-            </a:r>
-            <a:r>
-              <a:rPr lang="en-US" dirty="0"/>
-              <a:t> und Warm Up</a:t>
-            </a:r>
-          </a:p>
-        </p:txBody>
-      </p:sp>
-      <p:sp>
-        <p:nvSpPr>
-          <p:cNvPr id="3" name="Inhaltsplatzhalter 2"/>
-          <p:cNvSpPr>
-            <a:spLocks noGrp="1"/>
-          </p:cNvSpPr>
-          <p:nvPr>
-            <p:ph idx="1"/>
-          </p:nvPr>
-        </p:nvSpPr>
-        <p:spPr>
-          <a:xfrm>
-            <a:off x="250825" y="1484313"/>
-            <a:ext cx="8640763" cy="504527"/>
-          </a:xfrm>
-        </p:spPr>
-        <p:txBody>
-          <a:bodyPr/>
-          <a:lstStyle/>
-          <a:p>
-            <a:r>
-              <a:rPr lang="en-US" b="1" dirty="0" smtClean="0"/>
-              <a:t>Was </a:t>
-            </a:r>
-            <a:r>
-              <a:rPr lang="en-US" b="1" dirty="0" err="1" smtClean="0"/>
-              <a:t>ist</a:t>
-            </a:r>
-            <a:r>
-              <a:rPr lang="en-US" b="1" dirty="0" smtClean="0"/>
-              <a:t> </a:t>
-            </a:r>
-            <a:r>
-              <a:rPr lang="en-US" b="1" dirty="0" err="1" smtClean="0"/>
-              <a:t>hier</a:t>
-            </a:r>
-            <a:r>
-              <a:rPr lang="en-US" b="1" dirty="0" smtClean="0"/>
-              <a:t> </a:t>
-            </a:r>
-            <a:r>
-              <a:rPr lang="en-US" b="1" dirty="0" err="1" smtClean="0"/>
-              <a:t>verkehrt</a:t>
-            </a:r>
-            <a:r>
-              <a:rPr lang="en-US" b="1" dirty="0" smtClean="0"/>
-              <a:t>? Welches Problem </a:t>
-            </a:r>
-            <a:r>
-              <a:rPr lang="en-US" b="1" dirty="0" err="1" smtClean="0"/>
-              <a:t>wird</a:t>
-            </a:r>
-            <a:r>
-              <a:rPr lang="en-US" b="1" dirty="0" smtClean="0"/>
-              <a:t> </a:t>
-            </a:r>
-            <a:r>
-              <a:rPr lang="en-US" b="1" dirty="0" err="1" smtClean="0"/>
-              <a:t>auftreten</a:t>
-            </a:r>
-            <a:r>
-              <a:rPr lang="en-US" b="1" dirty="0" smtClean="0"/>
-              <a:t>?</a:t>
-            </a:r>
-          </a:p>
-          <a:p>
-            <a:endParaRPr lang="en-US" b="1" dirty="0"/>
-          </a:p>
-          <a:p>
-            <a:endParaRPr lang="en-US" b="1" dirty="0"/>
-          </a:p>
-        </p:txBody>
-      </p:sp>
-      <p:sp>
-        <p:nvSpPr>
-          <p:cNvPr id="4" name="Gefaltete Ecke 3"/>
-          <p:cNvSpPr/>
-          <p:nvPr/>
-        </p:nvSpPr>
-        <p:spPr bwMode="auto">
-          <a:xfrm>
-            <a:off x="712676" y="1988840"/>
-            <a:ext cx="3096344" cy="1800200"/>
-          </a:xfrm>
-          <a:prstGeom prst="foldedCorner">
-            <a:avLst/>
-          </a:prstGeom>
-          <a:noFill/>
-          <a:ln w="9525">
-            <a:solidFill>
-              <a:srgbClr val="000000"/>
-            </a:solidFill>
-            <a:miter lim="800000"/>
-            <a:headEnd/>
-            <a:tailEnd/>
-          </a:ln>
-          <a:extLst>
-            <a:ext uri="{909E8E84-426E-40DD-AFC4-6F175D3DCCD1}">
-              <a14:hiddenFill xmlns:a14="http://schemas.microsoft.com/office/drawing/2010/main">
-                <a:solidFill>
-                  <a:srgbClr val="FFFFFF"/>
-                </a:solidFill>
-              </a14:hiddenFill>
-            </a:ext>
-          </a:extLst>
-        </p:spPr>
-        <p:txBody>
-          <a:bodyPr rtlCol="0" anchor="t" anchorCtr="0">
-            <a:noAutofit/>
-          </a:bodyPr>
-          <a:lstStyle/>
-          <a:p>
-            <a:pPr algn="l">
-              <a:buSzTx/>
-            </a:pPr>
-            <a:r>
-              <a:rPr lang="en-US" sz="1400" dirty="0" smtClean="0">
-                <a:solidFill>
-                  <a:srgbClr val="7F0055"/>
-                </a:solidFill>
-                <a:latin typeface="Consolas" pitchFamily="49" charset="0"/>
-              </a:rPr>
-              <a:t>// main.cpp</a:t>
-            </a:r>
-          </a:p>
-          <a:p>
-            <a:pPr algn="l">
-              <a:buSzTx/>
-            </a:pPr>
-            <a:r>
-              <a:rPr lang="en-US" sz="1400" dirty="0" smtClean="0">
-                <a:solidFill>
-                  <a:srgbClr val="7F0055"/>
-                </a:solidFill>
-                <a:latin typeface="Consolas" pitchFamily="49" charset="0"/>
-              </a:rPr>
-              <a:t>#</a:t>
-            </a:r>
-            <a:r>
-              <a:rPr lang="en-US" sz="1400" dirty="0">
-                <a:solidFill>
-                  <a:srgbClr val="7F0055"/>
-                </a:solidFill>
-                <a:latin typeface="Consolas" pitchFamily="49" charset="0"/>
-              </a:rPr>
-              <a:t>include "functions.cpp"</a:t>
-            </a:r>
-          </a:p>
-          <a:p>
-            <a:pPr algn="l">
-              <a:buSzTx/>
-            </a:pPr>
-            <a:endParaRPr lang="en-US" sz="1400" dirty="0">
-              <a:solidFill>
-                <a:srgbClr val="7F0055"/>
-              </a:solidFill>
-              <a:latin typeface="Consolas" pitchFamily="49" charset="0"/>
-            </a:endParaRPr>
-          </a:p>
-          <a:p>
-            <a:pPr algn="l">
-              <a:buSzTx/>
-            </a:pPr>
-            <a:r>
-              <a:rPr lang="en-US" sz="1400" dirty="0" err="1">
-                <a:solidFill>
-                  <a:srgbClr val="7F0055"/>
-                </a:solidFill>
-                <a:latin typeface="Consolas" pitchFamily="49" charset="0"/>
-              </a:rPr>
-              <a:t>int</a:t>
-            </a:r>
-            <a:r>
-              <a:rPr lang="en-US" sz="1400" dirty="0">
-                <a:solidFill>
-                  <a:srgbClr val="7F0055"/>
-                </a:solidFill>
-                <a:latin typeface="Consolas" pitchFamily="49" charset="0"/>
-              </a:rPr>
-              <a:t> main() {</a:t>
-            </a:r>
-          </a:p>
-          <a:p>
-            <a:pPr algn="l">
-              <a:buSzTx/>
-            </a:pPr>
-            <a:r>
-              <a:rPr lang="en-US" sz="1400" dirty="0">
-                <a:solidFill>
-                  <a:srgbClr val="7F0055"/>
-                </a:solidFill>
-                <a:latin typeface="Consolas" pitchFamily="49" charset="0"/>
-              </a:rPr>
-              <a:t>	</a:t>
-            </a:r>
-            <a:r>
-              <a:rPr lang="en-US" sz="1400" dirty="0" err="1">
-                <a:solidFill>
-                  <a:srgbClr val="7F0055"/>
-                </a:solidFill>
-                <a:latin typeface="Consolas" pitchFamily="49" charset="0"/>
-              </a:rPr>
-              <a:t>myNewFunction</a:t>
-            </a:r>
-            <a:r>
-              <a:rPr lang="en-US" sz="1400" dirty="0">
-                <a:solidFill>
-                  <a:srgbClr val="7F0055"/>
-                </a:solidFill>
-                <a:latin typeface="Consolas" pitchFamily="49" charset="0"/>
-              </a:rPr>
-              <a:t>();</a:t>
-            </a:r>
-          </a:p>
-          <a:p>
-            <a:pPr algn="l">
-              <a:buSzTx/>
-            </a:pPr>
-            <a:r>
-              <a:rPr lang="en-US" sz="1400" dirty="0">
-                <a:solidFill>
-                  <a:srgbClr val="7F0055"/>
-                </a:solidFill>
-                <a:latin typeface="Consolas" pitchFamily="49" charset="0"/>
-              </a:rPr>
-              <a:t>	return 0;</a:t>
-            </a:r>
-          </a:p>
-          <a:p>
-            <a:pPr algn="l">
-              <a:buSzTx/>
-            </a:pPr>
-            <a:r>
-              <a:rPr lang="en-US" sz="1400" dirty="0">
-                <a:solidFill>
-                  <a:srgbClr val="7F0055"/>
-                </a:solidFill>
-                <a:latin typeface="Consolas" pitchFamily="49" charset="0"/>
-              </a:rPr>
-              <a:t>}</a:t>
-            </a:r>
-          </a:p>
-        </p:txBody>
-      </p:sp>
-      <p:sp>
-        <p:nvSpPr>
-          <p:cNvPr id="5" name="Gefaltete Ecke 4"/>
-          <p:cNvSpPr/>
-          <p:nvPr/>
-        </p:nvSpPr>
-        <p:spPr bwMode="auto">
-          <a:xfrm>
-            <a:off x="6271084" y="1988840"/>
-            <a:ext cx="2620504" cy="1800200"/>
-          </a:xfrm>
-          <a:prstGeom prst="foldedCorner">
-            <a:avLst/>
-          </a:prstGeom>
-          <a:noFill/>
-          <a:ln w="9525">
-            <a:solidFill>
-              <a:srgbClr val="000000"/>
-            </a:solidFill>
-            <a:miter lim="800000"/>
-            <a:headEnd/>
-            <a:tailEnd/>
-          </a:ln>
-          <a:extLst>
-            <a:ext uri="{909E8E84-426E-40DD-AFC4-6F175D3DCCD1}">
-              <a14:hiddenFill xmlns:a14="http://schemas.microsoft.com/office/drawing/2010/main">
-                <a:solidFill>
-                  <a:srgbClr val="FFFFFF"/>
-                </a:solidFill>
-              </a14:hiddenFill>
-            </a:ext>
-          </a:extLst>
-        </p:spPr>
-        <p:txBody>
-          <a:bodyPr wrap="square" rtlCol="0" anchor="t" anchorCtr="0">
-            <a:noAutofit/>
-          </a:bodyPr>
-          <a:lstStyle/>
-          <a:p>
-            <a:pPr algn="l">
-              <a:buSzTx/>
-            </a:pPr>
-            <a:r>
-              <a:rPr lang="en-US" sz="1400" dirty="0">
-                <a:solidFill>
-                  <a:srgbClr val="7F0055"/>
-                </a:solidFill>
-                <a:latin typeface="Consolas" pitchFamily="49" charset="0"/>
-              </a:rPr>
-              <a:t>//</a:t>
-            </a:r>
-            <a:r>
-              <a:rPr lang="en-US" sz="1400" dirty="0" smtClean="0">
-                <a:solidFill>
-                  <a:srgbClr val="7F0055"/>
-                </a:solidFill>
-                <a:latin typeface="Consolas" pitchFamily="49" charset="0"/>
-              </a:rPr>
-              <a:t>functions.cpp</a:t>
-            </a:r>
-          </a:p>
-          <a:p>
-            <a:pPr algn="l">
-              <a:buSzTx/>
-            </a:pPr>
-            <a:r>
-              <a:rPr lang="en-US" sz="1400" dirty="0" smtClean="0">
-                <a:solidFill>
-                  <a:srgbClr val="7F0055"/>
-                </a:solidFill>
-                <a:latin typeface="Consolas" pitchFamily="49" charset="0"/>
-              </a:rPr>
-              <a:t>#include “functions.hpp”</a:t>
-            </a:r>
-            <a:r>
-              <a:rPr lang="en-US" sz="1400" dirty="0">
-                <a:solidFill>
-                  <a:srgbClr val="7F0055"/>
-                </a:solidFill>
-                <a:latin typeface="Consolas" pitchFamily="49" charset="0"/>
-              </a:rPr>
-              <a:t/>
-            </a:r>
-            <a:br>
-              <a:rPr lang="en-US" sz="1400" dirty="0">
-                <a:solidFill>
-                  <a:srgbClr val="7F0055"/>
-                </a:solidFill>
-                <a:latin typeface="Consolas" pitchFamily="49" charset="0"/>
-              </a:rPr>
-            </a:br>
-            <a:r>
-              <a:rPr lang="en-US" sz="1400" dirty="0">
-                <a:solidFill>
-                  <a:srgbClr val="7F0055"/>
-                </a:solidFill>
-                <a:latin typeface="Consolas" pitchFamily="49" charset="0"/>
-              </a:rPr>
-              <a:t/>
-            </a:r>
-            <a:br>
-              <a:rPr lang="en-US" sz="1400" dirty="0">
-                <a:solidFill>
-                  <a:srgbClr val="7F0055"/>
-                </a:solidFill>
-                <a:latin typeface="Consolas" pitchFamily="49" charset="0"/>
-              </a:rPr>
-            </a:br>
-            <a:r>
-              <a:rPr lang="en-US" sz="1400" dirty="0" err="1">
-                <a:solidFill>
-                  <a:srgbClr val="7F0055"/>
-                </a:solidFill>
-                <a:latin typeface="Consolas" pitchFamily="49" charset="0"/>
-              </a:rPr>
-              <a:t>int</a:t>
-            </a:r>
-            <a:r>
-              <a:rPr lang="en-US" sz="1400" dirty="0">
-                <a:solidFill>
-                  <a:srgbClr val="7F0055"/>
-                </a:solidFill>
-                <a:latin typeface="Consolas" pitchFamily="49" charset="0"/>
-              </a:rPr>
-              <a:t> </a:t>
-            </a:r>
-            <a:r>
-              <a:rPr lang="en-US" sz="1400" dirty="0" err="1">
-                <a:solidFill>
-                  <a:srgbClr val="7F0055"/>
-                </a:solidFill>
-                <a:latin typeface="Consolas" pitchFamily="49" charset="0"/>
-              </a:rPr>
-              <a:t>myNewFunction</a:t>
-            </a:r>
-            <a:r>
-              <a:rPr lang="en-US" sz="1400" dirty="0">
-                <a:solidFill>
-                  <a:srgbClr val="7F0055"/>
-                </a:solidFill>
-                <a:latin typeface="Consolas" pitchFamily="49" charset="0"/>
-              </a:rPr>
-              <a:t>() {</a:t>
-            </a:r>
-          </a:p>
-          <a:p>
-            <a:pPr algn="l">
-              <a:buSzTx/>
-            </a:pPr>
-            <a:r>
-              <a:rPr lang="en-US" sz="1400" dirty="0">
-                <a:solidFill>
-                  <a:srgbClr val="7F0055"/>
-                </a:solidFill>
-                <a:latin typeface="Consolas" pitchFamily="49" charset="0"/>
-              </a:rPr>
-              <a:t>	return -12;</a:t>
-            </a:r>
-          </a:p>
-          <a:p>
-            <a:pPr algn="l">
-              <a:buSzTx/>
-            </a:pPr>
-            <a:r>
-              <a:rPr lang="en-US" sz="1400" dirty="0">
-                <a:solidFill>
-                  <a:srgbClr val="7F0055"/>
-                </a:solidFill>
-                <a:latin typeface="Consolas" pitchFamily="49" charset="0"/>
-              </a:rPr>
-              <a:t>}</a:t>
-            </a:r>
-          </a:p>
-          <a:p>
-            <a:pPr algn="l">
-              <a:buSzTx/>
-            </a:pPr>
-            <a:endParaRPr lang="en-US" sz="1400" dirty="0">
-              <a:solidFill>
-                <a:srgbClr val="7F0055"/>
-              </a:solidFill>
-              <a:latin typeface="Consolas" pitchFamily="49" charset="0"/>
-            </a:endParaRPr>
-          </a:p>
-        </p:txBody>
-      </p:sp>
-      <p:sp>
-        <p:nvSpPr>
-          <p:cNvPr id="6" name="Gefaltete Ecke 5"/>
-          <p:cNvSpPr/>
-          <p:nvPr/>
-        </p:nvSpPr>
-        <p:spPr bwMode="auto">
-          <a:xfrm>
-            <a:off x="3923928" y="1988840"/>
-            <a:ext cx="2232248" cy="1800200"/>
-          </a:xfrm>
-          <a:prstGeom prst="foldedCorner">
-            <a:avLst/>
-          </a:prstGeom>
-          <a:noFill/>
-          <a:ln w="9525">
-            <a:solidFill>
-              <a:srgbClr val="000000"/>
-            </a:solidFill>
-            <a:miter lim="800000"/>
-            <a:headEnd/>
-            <a:tailEnd/>
-          </a:ln>
-          <a:extLst>
-            <a:ext uri="{909E8E84-426E-40DD-AFC4-6F175D3DCCD1}">
-              <a14:hiddenFill xmlns:a14="http://schemas.microsoft.com/office/drawing/2010/main">
-                <a:solidFill>
-                  <a:srgbClr val="FFFFFF"/>
-                </a:solidFill>
-              </a14:hiddenFill>
-            </a:ext>
-          </a:extLst>
-        </p:spPr>
-        <p:txBody>
-          <a:bodyPr wrap="square" rtlCol="0" anchor="t" anchorCtr="0">
-            <a:noAutofit/>
-          </a:bodyPr>
-          <a:lstStyle/>
-          <a:p>
-            <a:pPr algn="l">
-              <a:buSzTx/>
-            </a:pPr>
-            <a:r>
-              <a:rPr lang="en-US" sz="1400" dirty="0" smtClean="0">
-                <a:solidFill>
-                  <a:srgbClr val="7F0055"/>
-                </a:solidFill>
-                <a:latin typeface="Consolas" pitchFamily="49" charset="0"/>
-              </a:rPr>
-              <a:t>//functions.hpp</a:t>
-            </a:r>
-          </a:p>
-          <a:p>
-            <a:pPr algn="l">
-              <a:buSzTx/>
-            </a:pPr>
-            <a:endParaRPr lang="en-US" sz="1400" dirty="0" smtClean="0">
-              <a:solidFill>
-                <a:srgbClr val="7F0055"/>
-              </a:solidFill>
-              <a:latin typeface="Consolas" pitchFamily="49" charset="0"/>
-            </a:endParaRPr>
-          </a:p>
-          <a:p>
-            <a:pPr algn="l">
-              <a:buSzTx/>
-            </a:pPr>
-            <a:r>
-              <a:rPr lang="en-US" sz="1400" dirty="0" err="1" smtClean="0">
-                <a:solidFill>
-                  <a:srgbClr val="7F0055"/>
-                </a:solidFill>
-                <a:latin typeface="Consolas" pitchFamily="49" charset="0"/>
-              </a:rPr>
-              <a:t>int</a:t>
-            </a:r>
-            <a:r>
-              <a:rPr lang="en-US" sz="1400" dirty="0" smtClean="0">
-                <a:solidFill>
-                  <a:srgbClr val="7F0055"/>
-                </a:solidFill>
-                <a:latin typeface="Consolas" pitchFamily="49" charset="0"/>
-              </a:rPr>
-              <a:t> </a:t>
-            </a:r>
-            <a:r>
-              <a:rPr lang="en-US" sz="1400" dirty="0" err="1">
-                <a:solidFill>
-                  <a:srgbClr val="7F0055"/>
-                </a:solidFill>
-                <a:latin typeface="Consolas" pitchFamily="49" charset="0"/>
-              </a:rPr>
-              <a:t>myNewFunction</a:t>
-            </a:r>
-            <a:r>
-              <a:rPr lang="en-US" sz="1400" dirty="0" smtClean="0">
-                <a:solidFill>
-                  <a:srgbClr val="7F0055"/>
-                </a:solidFill>
-                <a:latin typeface="Consolas" pitchFamily="49" charset="0"/>
-              </a:rPr>
-              <a:t>();</a:t>
-            </a:r>
-            <a:endParaRPr lang="en-US" sz="1400" dirty="0">
-              <a:solidFill>
-                <a:srgbClr val="7F0055"/>
-              </a:solidFill>
-              <a:latin typeface="Consolas" pitchFamily="49" charset="0"/>
-            </a:endParaRPr>
-          </a:p>
-        </p:txBody>
-      </p:sp>
-    </p:spTree>
-    <p:extLst>
-      <p:ext uri="{BB962C8B-B14F-4D97-AF65-F5344CB8AC3E}">
-        <p14:creationId xmlns:p14="http://schemas.microsoft.com/office/powerpoint/2010/main" val="3279742400"/>
-      </p:ext>
-    </p:extLst>
-  </p:cSld>
-  <p:clrMapOvr>
-    <a:masterClrMapping/>
-  </p:clrMapOvr>
-  <p:timing>
-    <p:tnLst>
-      <p:par>
-        <p:cTn id="1" dur="indefinite" restart="never" nodeType="tmRoot"/>
-      </p:par>
-    </p:tnLst>
-  </p:timing>
-</p:sld>
-</file>
-
-<file path=ppt/slides/slide6.xml><?xml version="1.0" encoding="utf-8"?>
-<p:sld xmlns:a="http://schemas.openxmlformats.org/drawingml/2006/main" xmlns:r="http://schemas.openxmlformats.org/officeDocument/2006/relationships" xmlns:p="http://schemas.openxmlformats.org/presentationml/2006/main">
-  <p:cSld>
-    <p:spTree>
-      <p:nvGrpSpPr>
-        <p:cNvPr id="1" name=""/>
-        <p:cNvGrpSpPr/>
-        <p:nvPr/>
-      </p:nvGrpSpPr>
-      <p:grpSpPr>
-        <a:xfrm>
-          <a:off x="0" y="0"/>
-          <a:ext cx="0" cy="0"/>
-          <a:chOff x="0" y="0"/>
-          <a:chExt cx="0" cy="0"/>
-        </a:xfrm>
-      </p:grpSpPr>
-      <p:sp>
-        <p:nvSpPr>
-          <p:cNvPr id="2" name="Titel 1"/>
-          <p:cNvSpPr>
-            <a:spLocks noGrp="1"/>
-          </p:cNvSpPr>
-          <p:nvPr>
-            <p:ph type="title"/>
-          </p:nvPr>
-        </p:nvSpPr>
-        <p:spPr/>
-        <p:txBody>
-          <a:bodyPr/>
-          <a:lstStyle/>
-          <a:p>
-            <a:r>
-              <a:rPr lang="en-US" dirty="0" smtClean="0"/>
-              <a:t>Tag 3: </a:t>
-            </a:r>
-            <a:r>
-              <a:rPr lang="en-US" dirty="0" err="1" smtClean="0"/>
-              <a:t>Rückschau</a:t>
-            </a:r>
-            <a:r>
-              <a:rPr lang="en-US" dirty="0" smtClean="0"/>
-              <a:t> und Warm Up</a:t>
-            </a:r>
-            <a:endParaRPr lang="en-US" dirty="0"/>
-          </a:p>
-        </p:txBody>
-      </p:sp>
-      <p:sp>
-        <p:nvSpPr>
-          <p:cNvPr id="3" name="Inhaltsplatzhalter 2"/>
-          <p:cNvSpPr>
-            <a:spLocks noGrp="1"/>
-          </p:cNvSpPr>
-          <p:nvPr>
-            <p:ph idx="1"/>
-          </p:nvPr>
-        </p:nvSpPr>
-        <p:spPr/>
-        <p:txBody>
-          <a:bodyPr/>
-          <a:lstStyle/>
-          <a:p>
-            <a:pPr marL="342900" indent="-342900">
-              <a:buFontTx/>
-              <a:buChar char="-"/>
-            </a:pPr>
-            <a:endParaRPr lang="en-US" dirty="0" smtClean="0"/>
-          </a:p>
-          <a:p>
-            <a:pPr marL="342900" indent="-342900">
-              <a:buFontTx/>
-              <a:buChar char="-"/>
-            </a:pPr>
-            <a:r>
-              <a:rPr lang="en-US" smtClean="0"/>
-              <a:t>Fragen </a:t>
-            </a:r>
-            <a:r>
-              <a:rPr lang="en-US" dirty="0" err="1" smtClean="0"/>
-              <a:t>für</a:t>
-            </a:r>
-            <a:r>
-              <a:rPr lang="en-US" dirty="0" smtClean="0"/>
-              <a:t> die </a:t>
-            </a:r>
-            <a:r>
-              <a:rPr lang="en-US" b="1" dirty="0" smtClean="0"/>
-              <a:t>Evaluation</a:t>
-            </a:r>
-            <a:r>
-              <a:rPr lang="en-US" dirty="0" smtClean="0"/>
-              <a:t> am </a:t>
-            </a:r>
-            <a:r>
-              <a:rPr lang="en-US" dirty="0" err="1" smtClean="0"/>
-              <a:t>letzten</a:t>
-            </a:r>
-            <a:r>
-              <a:rPr lang="en-US" dirty="0" smtClean="0"/>
-              <a:t> Tag</a:t>
-            </a:r>
-          </a:p>
-          <a:p>
-            <a:pPr marL="692150" lvl="1" indent="-342900">
-              <a:buFont typeface="+mj-lt"/>
-              <a:buAutoNum type="arabicPeriod"/>
-            </a:pPr>
-            <a:r>
-              <a:rPr lang="en-US" dirty="0" err="1" smtClean="0"/>
-              <a:t>Stärkerer</a:t>
-            </a:r>
-            <a:r>
-              <a:rPr lang="en-US" dirty="0" smtClean="0"/>
-              <a:t> </a:t>
-            </a:r>
-            <a:r>
-              <a:rPr lang="en-US" dirty="0" err="1" smtClean="0"/>
-              <a:t>Fokus</a:t>
-            </a:r>
-            <a:r>
-              <a:rPr lang="en-US" dirty="0" smtClean="0"/>
-              <a:t> auf C++11 </a:t>
-            </a:r>
-            <a:r>
-              <a:rPr lang="en-US" dirty="0" err="1" smtClean="0"/>
-              <a:t>legen</a:t>
-            </a:r>
-            <a:r>
-              <a:rPr lang="en-US" dirty="0" smtClean="0"/>
-              <a:t>?</a:t>
-            </a:r>
-          </a:p>
-          <a:p>
-            <a:pPr marL="692150" lvl="1" indent="-342900">
-              <a:buFont typeface="+mj-lt"/>
-              <a:buAutoNum type="arabicPeriod"/>
-            </a:pPr>
-            <a:r>
-              <a:rPr lang="en-US" dirty="0" err="1" smtClean="0"/>
-              <a:t>Stärkerer</a:t>
-            </a:r>
-            <a:r>
-              <a:rPr lang="en-US" dirty="0" smtClean="0"/>
-              <a:t> </a:t>
-            </a:r>
-            <a:r>
-              <a:rPr lang="en-US" dirty="0" err="1" smtClean="0"/>
-              <a:t>Fokus</a:t>
-            </a:r>
-            <a:r>
-              <a:rPr lang="en-US" dirty="0" smtClean="0"/>
-              <a:t> auf C-</a:t>
-            </a:r>
-            <a:r>
-              <a:rPr lang="en-US" dirty="0" err="1" smtClean="0"/>
-              <a:t>Programmierung</a:t>
-            </a:r>
-            <a:r>
-              <a:rPr lang="en-US" dirty="0" smtClean="0"/>
-              <a:t> </a:t>
-            </a:r>
-            <a:r>
-              <a:rPr lang="en-US" dirty="0" err="1" smtClean="0"/>
-              <a:t>legen</a:t>
-            </a:r>
-            <a:r>
-              <a:rPr lang="en-US" dirty="0" smtClean="0"/>
-              <a:t>?</a:t>
-            </a:r>
-            <a:br>
-              <a:rPr lang="en-US" dirty="0" smtClean="0"/>
-            </a:br>
-            <a:endParaRPr lang="en-US" dirty="0"/>
-          </a:p>
-          <a:p>
-            <a:pPr marL="342900" indent="-342900">
-              <a:buFontTx/>
-              <a:buChar char="-"/>
-            </a:pPr>
-            <a:r>
-              <a:rPr lang="en-US" b="1" dirty="0" err="1" smtClean="0"/>
-              <a:t>Gastvortrag</a:t>
-            </a:r>
-            <a:r>
-              <a:rPr lang="en-US" b="1" dirty="0" smtClean="0"/>
-              <a:t> am </a:t>
-            </a:r>
-            <a:r>
-              <a:rPr lang="en-US" b="1" dirty="0" err="1" smtClean="0"/>
-              <a:t>letzten</a:t>
-            </a:r>
-            <a:r>
-              <a:rPr lang="en-US" b="1" dirty="0" smtClean="0"/>
-              <a:t> Tag</a:t>
-            </a:r>
-            <a:r>
-              <a:rPr lang="en-US" dirty="0" smtClean="0"/>
-              <a:t>: Holger Wech von Cypress/</a:t>
-            </a:r>
-            <a:r>
-              <a:rPr lang="en-US" dirty="0" err="1" smtClean="0"/>
-              <a:t>Spansion</a:t>
-            </a:r>
-            <a:r>
-              <a:rPr lang="en-US" dirty="0" smtClean="0"/>
-              <a:t/>
-            </a:r>
-            <a:br>
-              <a:rPr lang="en-US" dirty="0" smtClean="0"/>
-            </a:br>
-            <a:endParaRPr lang="en-US" dirty="0"/>
-          </a:p>
-        </p:txBody>
-      </p:sp>
-      <p:grpSp>
-        <p:nvGrpSpPr>
-          <p:cNvPr id="8" name="Gruppieren 7"/>
-          <p:cNvGrpSpPr/>
-          <p:nvPr/>
-        </p:nvGrpSpPr>
-        <p:grpSpPr>
-          <a:xfrm>
-            <a:off x="1475656" y="3645024"/>
-            <a:ext cx="4992961" cy="1865682"/>
-            <a:chOff x="1475656" y="4521395"/>
-            <a:chExt cx="4992961" cy="1865682"/>
-          </a:xfrm>
-        </p:grpSpPr>
-        <p:pic>
-          <p:nvPicPr>
-            <p:cNvPr id="4" name="Grafik 3"/>
-            <p:cNvPicPr>
-              <a:picLocks noChangeAspect="1"/>
-            </p:cNvPicPr>
-            <p:nvPr/>
-          </p:nvPicPr>
-          <p:blipFill>
-            <a:blip r:embed="rId2"/>
-            <a:stretch>
-              <a:fillRect/>
-            </a:stretch>
-          </p:blipFill>
-          <p:spPr>
-            <a:xfrm>
-              <a:off x="1475656" y="4521395"/>
-              <a:ext cx="4824536" cy="1865682"/>
-            </a:xfrm>
-            <a:prstGeom prst="rect">
-              <a:avLst/>
-            </a:prstGeom>
-          </p:spPr>
-        </p:pic>
-        <p:sp>
-          <p:nvSpPr>
-            <p:cNvPr id="5" name="Rechteck 4"/>
-            <p:cNvSpPr/>
-            <p:nvPr/>
-          </p:nvSpPr>
-          <p:spPr bwMode="auto">
-            <a:xfrm>
-              <a:off x="4139952" y="5805264"/>
-              <a:ext cx="2328665" cy="170166"/>
-            </a:xfrm>
-            <a:prstGeom prst="rect">
-              <a:avLst/>
-            </a:prstGeom>
-            <a:solidFill>
-              <a:schemeClr val="bg1"/>
-            </a:solidFill>
-            <a:ln w="9525">
-              <a:noFill/>
-              <a:miter lim="800000"/>
-              <a:headEnd/>
-              <a:tailEnd/>
-            </a:ln>
-            <a:extLst/>
-          </p:spPr>
-          <p:txBody>
-            <a:bodyPr wrap="square" rtlCol="0" anchor="ctr">
-              <a:spAutoFit/>
-            </a:bodyPr>
-            <a:lstStyle/>
-            <a:p>
-              <a:pPr algn="ctr" eaLnBrk="1" hangingPunct="1">
-                <a:spcBef>
-                  <a:spcPct val="0"/>
-                </a:spcBef>
-                <a:buSzTx/>
-                <a:buFont typeface="Arial" charset="0"/>
-                <a:buNone/>
-              </a:pPr>
-              <a:endParaRPr lang="en-US" sz="1400" dirty="0" err="1">
-                <a:solidFill>
-                  <a:srgbClr val="7F0055"/>
-                </a:solidFill>
-                <a:latin typeface="Consolas" pitchFamily="49" charset="0"/>
-              </a:endParaRPr>
-            </a:p>
-          </p:txBody>
-        </p:sp>
-      </p:grpSp>
-    </p:spTree>
-    <p:extLst>
-      <p:ext uri="{BB962C8B-B14F-4D97-AF65-F5344CB8AC3E}">
-        <p14:creationId xmlns:p14="http://schemas.microsoft.com/office/powerpoint/2010/main" val="1706240809"/>
-      </p:ext>
-    </p:extLst>
-  </p:cSld>
-  <p:clrMapOvr>
-    <a:masterClrMapping/>
-  </p:clrMapOvr>
-  <p:timing>
-    <p:tnLst>
-      <p:par>
-        <p:cTn id="1" dur="indefinite" restart="never" nodeType="tmRoot"/>
-      </p:par>
-    </p:tnLst>
-  </p:timing>
-</p:sld>
-</file>
-
-<file path=ppt/slides/slide7.xml><?xml version="1.0" encoding="utf-8"?>
+<file path=ppt/slides/slide8.xml><?xml version="1.0" encoding="utf-8"?>
 <p:sld xmlns:a="http://schemas.openxmlformats.org/drawingml/2006/main" xmlns:r="http://schemas.openxmlformats.org/officeDocument/2006/relationships" xmlns:p="http://schemas.openxmlformats.org/presentationml/2006/main">
   <p:cSld>
     <p:spTree>

</xml_diff>

<commit_message>
Minor bugfxes in day 3's slides
</commit_message>
<xml_diff>
--- a/2016/week1__recap_and_warmup_slides.pptx
+++ b/2016/week1__recap_and_warmup_slides.pptx
@@ -5,10 +5,10 @@
     <p:sldMasterId id="2147483650" r:id="rId1"/>
   </p:sldMasterIdLst>
   <p:notesMasterIdLst>
-    <p:notesMasterId r:id="rId10"/>
+    <p:notesMasterId r:id="rId9"/>
   </p:notesMasterIdLst>
   <p:handoutMasterIdLst>
-    <p:handoutMasterId r:id="rId11"/>
+    <p:handoutMasterId r:id="rId10"/>
   </p:handoutMasterIdLst>
   <p:sldIdLst>
     <p:sldId id="454" r:id="rId2"/>
@@ -16,9 +16,8 @@
     <p:sldId id="456" r:id="rId4"/>
     <p:sldId id="457" r:id="rId5"/>
     <p:sldId id="465" r:id="rId6"/>
-    <p:sldId id="464" r:id="rId7"/>
-    <p:sldId id="455" r:id="rId8"/>
-    <p:sldId id="458" r:id="rId9"/>
+    <p:sldId id="466" r:id="rId7"/>
+    <p:sldId id="467" r:id="rId8"/>
   </p:sldIdLst>
   <p:sldSz cx="9144000" cy="6858000" type="screen4x3"/>
   <p:notesSz cx="7099300" cy="10234613"/>
@@ -197,9 +196,8 @@
             <p14:sldId id="456"/>
             <p14:sldId id="457"/>
             <p14:sldId id="465"/>
-            <p14:sldId id="464"/>
-            <p14:sldId id="455"/>
-            <p14:sldId id="458"/>
+            <p14:sldId id="466"/>
+            <p14:sldId id="467"/>
           </p14:sldIdLst>
         </p14:section>
       </p14:sectionLst>
@@ -2912,6 +2910,1727 @@
 </p:notes>
 </file>
 
+<file path=ppt/notesSlides/notesSlide3.xml><?xml version="1.0" encoding="utf-8"?>
+<p:notes xmlns:a="http://schemas.openxmlformats.org/drawingml/2006/main" xmlns:r="http://schemas.openxmlformats.org/officeDocument/2006/relationships" xmlns:p="http://schemas.openxmlformats.org/presentationml/2006/main">
+  <p:cSld>
+    <p:spTree>
+      <p:nvGrpSpPr>
+        <p:cNvPr id="1" name=""/>
+        <p:cNvGrpSpPr/>
+        <p:nvPr/>
+      </p:nvGrpSpPr>
+      <p:grpSpPr>
+        <a:xfrm>
+          <a:off x="0" y="0"/>
+          <a:ext cx="0" cy="0"/>
+          <a:chOff x="0" y="0"/>
+          <a:chExt cx="0" cy="0"/>
+        </a:xfrm>
+      </p:grpSpPr>
+      <p:sp>
+        <p:nvSpPr>
+          <p:cNvPr id="53250" name="Folienbildplatzhalter 1"/>
+          <p:cNvSpPr>
+            <a:spLocks noGrp="1" noRot="1" noChangeAspect="1" noTextEdit="1"/>
+          </p:cNvSpPr>
+          <p:nvPr>
+            <p:ph type="sldImg"/>
+          </p:nvPr>
+        </p:nvSpPr>
+        <p:spPr>
+          <a:ln/>
+        </p:spPr>
+      </p:sp>
+      <p:sp>
+        <p:nvSpPr>
+          <p:cNvPr id="53251" name="Notizenplatzhalter 2"/>
+          <p:cNvSpPr>
+            <a:spLocks noGrp="1"/>
+          </p:cNvSpPr>
+          <p:nvPr>
+            <p:ph type="body" idx="1"/>
+          </p:nvPr>
+        </p:nvSpPr>
+        <p:spPr>
+          <a:noFill/>
+          <a:extLst>
+            <a:ext uri="{909E8E84-426E-40DD-AFC4-6F175D3DCCD1}">
+              <a14:hiddenFill xmlns:a14="http://schemas.microsoft.com/office/drawing/2010/main">
+                <a:solidFill>
+                  <a:srgbClr val="FFFFFF"/>
+                </a:solidFill>
+              </a14:hiddenFill>
+            </a:ext>
+            <a:ext uri="{91240B29-F687-4F45-9708-019B960494DF}">
+              <a14:hiddenLine xmlns:a14="http://schemas.microsoft.com/office/drawing/2010/main" w="9525">
+                <a:solidFill>
+                  <a:srgbClr val="000000"/>
+                </a:solidFill>
+                <a:miter lim="800000"/>
+                <a:headEnd/>
+                <a:tailEnd/>
+              </a14:hiddenLine>
+            </a:ext>
+          </a:extLst>
+        </p:spPr>
+        <p:txBody>
+          <a:bodyPr/>
+          <a:lstStyle/>
+          <a:p>
+            <a:pPr marL="0" indent="0">
+              <a:buFontTx/>
+              <a:buNone/>
+            </a:pPr>
+            <a:r>
+              <a:rPr lang="de-DE" altLang="de-DE" i="0" dirty="0" err="1" smtClean="0">
+                <a:latin typeface="Times New Roman" pitchFamily="16" charset="0"/>
+              </a:rPr>
+              <a:t>Asterisk</a:t>
+            </a:r>
+            <a:r>
+              <a:rPr lang="de-DE" altLang="de-DE" i="0" dirty="0" smtClean="0">
+                <a:latin typeface="Times New Roman" pitchFamily="16" charset="0"/>
+              </a:rPr>
+              <a:t>: (i) Als Teil des </a:t>
+            </a:r>
+            <a:r>
+              <a:rPr lang="de-DE" altLang="de-DE" b="1" i="0" dirty="0" smtClean="0">
+                <a:latin typeface="Times New Roman" pitchFamily="16" charset="0"/>
+              </a:rPr>
+              <a:t>Typs</a:t>
+            </a:r>
+            <a:r>
+              <a:rPr lang="de-DE" altLang="de-DE" i="0" dirty="0" smtClean="0">
+                <a:latin typeface="Times New Roman" pitchFamily="16" charset="0"/>
+              </a:rPr>
+              <a:t> bei Pointern, (ii) Als </a:t>
+            </a:r>
+            <a:r>
+              <a:rPr lang="de-DE" altLang="de-DE" i="0" dirty="0" err="1" smtClean="0">
+                <a:latin typeface="Times New Roman" pitchFamily="16" charset="0"/>
+              </a:rPr>
+              <a:t>Dereferenzierungs</a:t>
+            </a:r>
+            <a:r>
+              <a:rPr lang="de-DE" altLang="de-DE" b="1" i="0" dirty="0" err="1" smtClean="0">
+                <a:latin typeface="Times New Roman" pitchFamily="16" charset="0"/>
+              </a:rPr>
+              <a:t>operator</a:t>
+            </a:r>
+            <a:endParaRPr lang="de-DE" altLang="de-DE" b="1" i="0" dirty="0" smtClean="0">
+              <a:latin typeface="Times New Roman" pitchFamily="16" charset="0"/>
+            </a:endParaRPr>
+          </a:p>
+          <a:p>
+            <a:pPr marL="0" indent="0">
+              <a:buFontTx/>
+              <a:buNone/>
+            </a:pPr>
+            <a:r>
+              <a:rPr lang="de-DE" altLang="de-DE" i="0" dirty="0" err="1" smtClean="0">
+                <a:latin typeface="Times New Roman" pitchFamily="16" charset="0"/>
+              </a:rPr>
+              <a:t>Ampersand</a:t>
+            </a:r>
+            <a:r>
+              <a:rPr lang="de-DE" altLang="de-DE" i="0" dirty="0" smtClean="0">
+                <a:latin typeface="Times New Roman" pitchFamily="16" charset="0"/>
+              </a:rPr>
+              <a:t>: (i) Als Teil des </a:t>
+            </a:r>
+            <a:r>
+              <a:rPr lang="de-DE" altLang="de-DE" b="1" i="0" dirty="0" smtClean="0">
+                <a:latin typeface="Times New Roman" pitchFamily="16" charset="0"/>
+              </a:rPr>
+              <a:t>Typs</a:t>
+            </a:r>
+            <a:r>
+              <a:rPr lang="de-DE" altLang="de-DE" i="0" dirty="0" smtClean="0">
+                <a:latin typeface="Times New Roman" pitchFamily="16" charset="0"/>
+              </a:rPr>
+              <a:t> bei</a:t>
+            </a:r>
+            <a:r>
+              <a:rPr lang="de-DE" altLang="de-DE" i="0" baseline="0" dirty="0" smtClean="0">
+                <a:latin typeface="Times New Roman" pitchFamily="16" charset="0"/>
+              </a:rPr>
+              <a:t> Referenzen, (ii) Als Adress</a:t>
+            </a:r>
+            <a:r>
+              <a:rPr lang="de-DE" altLang="de-DE" b="1" i="0" baseline="0" dirty="0" smtClean="0">
+                <a:latin typeface="Times New Roman" pitchFamily="16" charset="0"/>
+              </a:rPr>
+              <a:t>operator</a:t>
+            </a:r>
+            <a:endParaRPr lang="de-DE" altLang="de-DE" b="1" i="0" dirty="0" smtClean="0">
+              <a:latin typeface="Times New Roman" pitchFamily="16" charset="0"/>
+            </a:endParaRPr>
+          </a:p>
+        </p:txBody>
+      </p:sp>
+      <p:sp>
+        <p:nvSpPr>
+          <p:cNvPr id="53252" name="Datumsplatzhalter 3"/>
+          <p:cNvSpPr>
+            <a:spLocks noGrp="1"/>
+          </p:cNvSpPr>
+          <p:nvPr>
+            <p:ph type="dt" sz="quarter"/>
+          </p:nvPr>
+        </p:nvSpPr>
+        <p:spPr>
+          <a:noFill/>
+          <a:extLst>
+            <a:ext uri="{909E8E84-426E-40DD-AFC4-6F175D3DCCD1}">
+              <a14:hiddenFill xmlns:a14="http://schemas.microsoft.com/office/drawing/2010/main">
+                <a:solidFill>
+                  <a:srgbClr val="FFFFFF"/>
+                </a:solidFill>
+              </a14:hiddenFill>
+            </a:ext>
+            <a:ext uri="{91240B29-F687-4F45-9708-019B960494DF}">
+              <a14:hiddenLine xmlns:a14="http://schemas.microsoft.com/office/drawing/2010/main" w="9525">
+                <a:solidFill>
+                  <a:srgbClr val="000000"/>
+                </a:solidFill>
+                <a:miter lim="800000"/>
+                <a:headEnd/>
+                <a:tailEnd/>
+              </a14:hiddenLine>
+            </a:ext>
+          </a:extLst>
+        </p:spPr>
+        <p:txBody>
+          <a:bodyPr/>
+          <a:lstStyle>
+            <a:lvl1pPr defTabSz="463550" eaLnBrk="0" hangingPunct="0">
+              <a:tabLst>
+                <a:tab pos="746125" algn="l"/>
+                <a:tab pos="1492250" algn="l"/>
+              </a:tabLst>
+              <a:defRPr>
+                <a:solidFill>
+                  <a:schemeClr val="tx1"/>
+                </a:solidFill>
+                <a:latin typeface="Arial" charset="0"/>
+                <a:ea typeface="Lucida Sans Unicode" pitchFamily="34" charset="0"/>
+                <a:cs typeface="Lucida Sans Unicode" pitchFamily="34" charset="0"/>
+              </a:defRPr>
+            </a:lvl1pPr>
+            <a:lvl2pPr marL="742950" indent="-285750" defTabSz="463550" eaLnBrk="0" hangingPunct="0">
+              <a:tabLst>
+                <a:tab pos="746125" algn="l"/>
+                <a:tab pos="1492250" algn="l"/>
+              </a:tabLst>
+              <a:defRPr>
+                <a:solidFill>
+                  <a:schemeClr val="tx1"/>
+                </a:solidFill>
+                <a:latin typeface="Arial" charset="0"/>
+                <a:ea typeface="Lucida Sans Unicode" pitchFamily="34" charset="0"/>
+                <a:cs typeface="Lucida Sans Unicode" pitchFamily="34" charset="0"/>
+              </a:defRPr>
+            </a:lvl2pPr>
+            <a:lvl3pPr marL="1143000" indent="-228600" defTabSz="463550" eaLnBrk="0" hangingPunct="0">
+              <a:tabLst>
+                <a:tab pos="746125" algn="l"/>
+                <a:tab pos="1492250" algn="l"/>
+              </a:tabLst>
+              <a:defRPr>
+                <a:solidFill>
+                  <a:schemeClr val="tx1"/>
+                </a:solidFill>
+                <a:latin typeface="Arial" charset="0"/>
+                <a:ea typeface="Lucida Sans Unicode" pitchFamily="34" charset="0"/>
+                <a:cs typeface="Lucida Sans Unicode" pitchFamily="34" charset="0"/>
+              </a:defRPr>
+            </a:lvl3pPr>
+            <a:lvl4pPr marL="1600200" indent="-228600" defTabSz="463550" eaLnBrk="0" hangingPunct="0">
+              <a:tabLst>
+                <a:tab pos="746125" algn="l"/>
+                <a:tab pos="1492250" algn="l"/>
+              </a:tabLst>
+              <a:defRPr>
+                <a:solidFill>
+                  <a:schemeClr val="tx1"/>
+                </a:solidFill>
+                <a:latin typeface="Arial" charset="0"/>
+                <a:ea typeface="Lucida Sans Unicode" pitchFamily="34" charset="0"/>
+                <a:cs typeface="Lucida Sans Unicode" pitchFamily="34" charset="0"/>
+              </a:defRPr>
+            </a:lvl4pPr>
+            <a:lvl5pPr marL="2057400" indent="-228600" defTabSz="463550" eaLnBrk="0" hangingPunct="0">
+              <a:tabLst>
+                <a:tab pos="746125" algn="l"/>
+                <a:tab pos="1492250" algn="l"/>
+              </a:tabLst>
+              <a:defRPr>
+                <a:solidFill>
+                  <a:schemeClr val="tx1"/>
+                </a:solidFill>
+                <a:latin typeface="Arial" charset="0"/>
+                <a:ea typeface="Lucida Sans Unicode" pitchFamily="34" charset="0"/>
+                <a:cs typeface="Lucida Sans Unicode" pitchFamily="34" charset="0"/>
+              </a:defRPr>
+            </a:lvl5pPr>
+            <a:lvl6pPr marL="2514600" indent="-228600" algn="ctr" defTabSz="463550" eaLnBrk="0" fontAlgn="base" hangingPunct="0">
+              <a:lnSpc>
+                <a:spcPct val="93000"/>
+              </a:lnSpc>
+              <a:spcBef>
+                <a:spcPct val="0"/>
+              </a:spcBef>
+              <a:spcAft>
+                <a:spcPct val="0"/>
+              </a:spcAft>
+              <a:buClr>
+                <a:srgbClr val="000000"/>
+              </a:buClr>
+              <a:buSzPct val="100000"/>
+              <a:buFont typeface="Arial" charset="0"/>
+              <a:tabLst>
+                <a:tab pos="746125" algn="l"/>
+                <a:tab pos="1492250" algn="l"/>
+              </a:tabLst>
+              <a:defRPr>
+                <a:solidFill>
+                  <a:schemeClr val="tx1"/>
+                </a:solidFill>
+                <a:latin typeface="Arial" charset="0"/>
+                <a:ea typeface="Lucida Sans Unicode" pitchFamily="34" charset="0"/>
+                <a:cs typeface="Lucida Sans Unicode" pitchFamily="34" charset="0"/>
+              </a:defRPr>
+            </a:lvl6pPr>
+            <a:lvl7pPr marL="2971800" indent="-228600" algn="ctr" defTabSz="463550" eaLnBrk="0" fontAlgn="base" hangingPunct="0">
+              <a:lnSpc>
+                <a:spcPct val="93000"/>
+              </a:lnSpc>
+              <a:spcBef>
+                <a:spcPct val="0"/>
+              </a:spcBef>
+              <a:spcAft>
+                <a:spcPct val="0"/>
+              </a:spcAft>
+              <a:buClr>
+                <a:srgbClr val="000000"/>
+              </a:buClr>
+              <a:buSzPct val="100000"/>
+              <a:buFont typeface="Arial" charset="0"/>
+              <a:tabLst>
+                <a:tab pos="746125" algn="l"/>
+                <a:tab pos="1492250" algn="l"/>
+              </a:tabLst>
+              <a:defRPr>
+                <a:solidFill>
+                  <a:schemeClr val="tx1"/>
+                </a:solidFill>
+                <a:latin typeface="Arial" charset="0"/>
+                <a:ea typeface="Lucida Sans Unicode" pitchFamily="34" charset="0"/>
+                <a:cs typeface="Lucida Sans Unicode" pitchFamily="34" charset="0"/>
+              </a:defRPr>
+            </a:lvl7pPr>
+            <a:lvl8pPr marL="3429000" indent="-228600" algn="ctr" defTabSz="463550" eaLnBrk="0" fontAlgn="base" hangingPunct="0">
+              <a:lnSpc>
+                <a:spcPct val="93000"/>
+              </a:lnSpc>
+              <a:spcBef>
+                <a:spcPct val="0"/>
+              </a:spcBef>
+              <a:spcAft>
+                <a:spcPct val="0"/>
+              </a:spcAft>
+              <a:buClr>
+                <a:srgbClr val="000000"/>
+              </a:buClr>
+              <a:buSzPct val="100000"/>
+              <a:buFont typeface="Arial" charset="0"/>
+              <a:tabLst>
+                <a:tab pos="746125" algn="l"/>
+                <a:tab pos="1492250" algn="l"/>
+              </a:tabLst>
+              <a:defRPr>
+                <a:solidFill>
+                  <a:schemeClr val="tx1"/>
+                </a:solidFill>
+                <a:latin typeface="Arial" charset="0"/>
+                <a:ea typeface="Lucida Sans Unicode" pitchFamily="34" charset="0"/>
+                <a:cs typeface="Lucida Sans Unicode" pitchFamily="34" charset="0"/>
+              </a:defRPr>
+            </a:lvl8pPr>
+            <a:lvl9pPr marL="3886200" indent="-228600" algn="ctr" defTabSz="463550" eaLnBrk="0" fontAlgn="base" hangingPunct="0">
+              <a:lnSpc>
+                <a:spcPct val="93000"/>
+              </a:lnSpc>
+              <a:spcBef>
+                <a:spcPct val="0"/>
+              </a:spcBef>
+              <a:spcAft>
+                <a:spcPct val="0"/>
+              </a:spcAft>
+              <a:buClr>
+                <a:srgbClr val="000000"/>
+              </a:buClr>
+              <a:buSzPct val="100000"/>
+              <a:buFont typeface="Arial" charset="0"/>
+              <a:tabLst>
+                <a:tab pos="746125" algn="l"/>
+                <a:tab pos="1492250" algn="l"/>
+              </a:tabLst>
+              <a:defRPr>
+                <a:solidFill>
+                  <a:schemeClr val="tx1"/>
+                </a:solidFill>
+                <a:latin typeface="Arial" charset="0"/>
+                <a:ea typeface="Lucida Sans Unicode" pitchFamily="34" charset="0"/>
+                <a:cs typeface="Lucida Sans Unicode" pitchFamily="34" charset="0"/>
+              </a:defRPr>
+            </a:lvl9pPr>
+          </a:lstStyle>
+          <a:p>
+            <a:pPr eaLnBrk="1" hangingPunct="1"/>
+            <a:r>
+              <a:rPr lang="en-US" altLang="de-DE" smtClean="0">
+                <a:solidFill>
+                  <a:srgbClr val="000000"/>
+                </a:solidFill>
+                <a:latin typeface="Stafford" pitchFamily="2" charset="0"/>
+              </a:rPr>
+              <a:t>November 19, 2007</a:t>
+            </a:r>
+          </a:p>
+        </p:txBody>
+      </p:sp>
+      <p:sp>
+        <p:nvSpPr>
+          <p:cNvPr id="53253" name="Fußzeilenplatzhalter 4"/>
+          <p:cNvSpPr>
+            <a:spLocks noGrp="1"/>
+          </p:cNvSpPr>
+          <p:nvPr>
+            <p:ph type="ftr" sz="quarter"/>
+          </p:nvPr>
+        </p:nvSpPr>
+        <p:spPr>
+          <a:noFill/>
+          <a:extLst>
+            <a:ext uri="{909E8E84-426E-40DD-AFC4-6F175D3DCCD1}">
+              <a14:hiddenFill xmlns:a14="http://schemas.microsoft.com/office/drawing/2010/main">
+                <a:solidFill>
+                  <a:srgbClr val="FFFFFF"/>
+                </a:solidFill>
+              </a14:hiddenFill>
+            </a:ext>
+            <a:ext uri="{91240B29-F687-4F45-9708-019B960494DF}">
+              <a14:hiddenLine xmlns:a14="http://schemas.microsoft.com/office/drawing/2010/main" w="9525">
+                <a:solidFill>
+                  <a:srgbClr val="000000"/>
+                </a:solidFill>
+                <a:miter lim="800000"/>
+                <a:headEnd/>
+                <a:tailEnd/>
+              </a14:hiddenLine>
+            </a:ext>
+          </a:extLst>
+        </p:spPr>
+        <p:txBody>
+          <a:bodyPr/>
+          <a:lstStyle>
+            <a:lvl1pPr defTabSz="463550" eaLnBrk="0" hangingPunct="0">
+              <a:tabLst>
+                <a:tab pos="746125" algn="l"/>
+                <a:tab pos="1492250" algn="l"/>
+                <a:tab pos="2238375" algn="l"/>
+                <a:tab pos="2986088" algn="l"/>
+                <a:tab pos="3732213" algn="l"/>
+              </a:tabLst>
+              <a:defRPr>
+                <a:solidFill>
+                  <a:schemeClr val="tx1"/>
+                </a:solidFill>
+                <a:latin typeface="Arial" charset="0"/>
+                <a:ea typeface="Lucida Sans Unicode" pitchFamily="34" charset="0"/>
+                <a:cs typeface="Lucida Sans Unicode" pitchFamily="34" charset="0"/>
+              </a:defRPr>
+            </a:lvl1pPr>
+            <a:lvl2pPr marL="742950" indent="-285750" defTabSz="463550" eaLnBrk="0" hangingPunct="0">
+              <a:tabLst>
+                <a:tab pos="746125" algn="l"/>
+                <a:tab pos="1492250" algn="l"/>
+                <a:tab pos="2238375" algn="l"/>
+                <a:tab pos="2986088" algn="l"/>
+                <a:tab pos="3732213" algn="l"/>
+              </a:tabLst>
+              <a:defRPr>
+                <a:solidFill>
+                  <a:schemeClr val="tx1"/>
+                </a:solidFill>
+                <a:latin typeface="Arial" charset="0"/>
+                <a:ea typeface="Lucida Sans Unicode" pitchFamily="34" charset="0"/>
+                <a:cs typeface="Lucida Sans Unicode" pitchFamily="34" charset="0"/>
+              </a:defRPr>
+            </a:lvl2pPr>
+            <a:lvl3pPr marL="1143000" indent="-228600" defTabSz="463550" eaLnBrk="0" hangingPunct="0">
+              <a:tabLst>
+                <a:tab pos="746125" algn="l"/>
+                <a:tab pos="1492250" algn="l"/>
+                <a:tab pos="2238375" algn="l"/>
+                <a:tab pos="2986088" algn="l"/>
+                <a:tab pos="3732213" algn="l"/>
+              </a:tabLst>
+              <a:defRPr>
+                <a:solidFill>
+                  <a:schemeClr val="tx1"/>
+                </a:solidFill>
+                <a:latin typeface="Arial" charset="0"/>
+                <a:ea typeface="Lucida Sans Unicode" pitchFamily="34" charset="0"/>
+                <a:cs typeface="Lucida Sans Unicode" pitchFamily="34" charset="0"/>
+              </a:defRPr>
+            </a:lvl3pPr>
+            <a:lvl4pPr marL="1600200" indent="-228600" defTabSz="463550" eaLnBrk="0" hangingPunct="0">
+              <a:tabLst>
+                <a:tab pos="746125" algn="l"/>
+                <a:tab pos="1492250" algn="l"/>
+                <a:tab pos="2238375" algn="l"/>
+                <a:tab pos="2986088" algn="l"/>
+                <a:tab pos="3732213" algn="l"/>
+              </a:tabLst>
+              <a:defRPr>
+                <a:solidFill>
+                  <a:schemeClr val="tx1"/>
+                </a:solidFill>
+                <a:latin typeface="Arial" charset="0"/>
+                <a:ea typeface="Lucida Sans Unicode" pitchFamily="34" charset="0"/>
+                <a:cs typeface="Lucida Sans Unicode" pitchFamily="34" charset="0"/>
+              </a:defRPr>
+            </a:lvl4pPr>
+            <a:lvl5pPr marL="2057400" indent="-228600" defTabSz="463550" eaLnBrk="0" hangingPunct="0">
+              <a:tabLst>
+                <a:tab pos="746125" algn="l"/>
+                <a:tab pos="1492250" algn="l"/>
+                <a:tab pos="2238375" algn="l"/>
+                <a:tab pos="2986088" algn="l"/>
+                <a:tab pos="3732213" algn="l"/>
+              </a:tabLst>
+              <a:defRPr>
+                <a:solidFill>
+                  <a:schemeClr val="tx1"/>
+                </a:solidFill>
+                <a:latin typeface="Arial" charset="0"/>
+                <a:ea typeface="Lucida Sans Unicode" pitchFamily="34" charset="0"/>
+                <a:cs typeface="Lucida Sans Unicode" pitchFamily="34" charset="0"/>
+              </a:defRPr>
+            </a:lvl5pPr>
+            <a:lvl6pPr marL="2514600" indent="-228600" algn="ctr" defTabSz="463550" eaLnBrk="0" fontAlgn="base" hangingPunct="0">
+              <a:lnSpc>
+                <a:spcPct val="93000"/>
+              </a:lnSpc>
+              <a:spcBef>
+                <a:spcPct val="0"/>
+              </a:spcBef>
+              <a:spcAft>
+                <a:spcPct val="0"/>
+              </a:spcAft>
+              <a:buClr>
+                <a:srgbClr val="000000"/>
+              </a:buClr>
+              <a:buSzPct val="100000"/>
+              <a:buFont typeface="Arial" charset="0"/>
+              <a:tabLst>
+                <a:tab pos="746125" algn="l"/>
+                <a:tab pos="1492250" algn="l"/>
+                <a:tab pos="2238375" algn="l"/>
+                <a:tab pos="2986088" algn="l"/>
+                <a:tab pos="3732213" algn="l"/>
+              </a:tabLst>
+              <a:defRPr>
+                <a:solidFill>
+                  <a:schemeClr val="tx1"/>
+                </a:solidFill>
+                <a:latin typeface="Arial" charset="0"/>
+                <a:ea typeface="Lucida Sans Unicode" pitchFamily="34" charset="0"/>
+                <a:cs typeface="Lucida Sans Unicode" pitchFamily="34" charset="0"/>
+              </a:defRPr>
+            </a:lvl6pPr>
+            <a:lvl7pPr marL="2971800" indent="-228600" algn="ctr" defTabSz="463550" eaLnBrk="0" fontAlgn="base" hangingPunct="0">
+              <a:lnSpc>
+                <a:spcPct val="93000"/>
+              </a:lnSpc>
+              <a:spcBef>
+                <a:spcPct val="0"/>
+              </a:spcBef>
+              <a:spcAft>
+                <a:spcPct val="0"/>
+              </a:spcAft>
+              <a:buClr>
+                <a:srgbClr val="000000"/>
+              </a:buClr>
+              <a:buSzPct val="100000"/>
+              <a:buFont typeface="Arial" charset="0"/>
+              <a:tabLst>
+                <a:tab pos="746125" algn="l"/>
+                <a:tab pos="1492250" algn="l"/>
+                <a:tab pos="2238375" algn="l"/>
+                <a:tab pos="2986088" algn="l"/>
+                <a:tab pos="3732213" algn="l"/>
+              </a:tabLst>
+              <a:defRPr>
+                <a:solidFill>
+                  <a:schemeClr val="tx1"/>
+                </a:solidFill>
+                <a:latin typeface="Arial" charset="0"/>
+                <a:ea typeface="Lucida Sans Unicode" pitchFamily="34" charset="0"/>
+                <a:cs typeface="Lucida Sans Unicode" pitchFamily="34" charset="0"/>
+              </a:defRPr>
+            </a:lvl7pPr>
+            <a:lvl8pPr marL="3429000" indent="-228600" algn="ctr" defTabSz="463550" eaLnBrk="0" fontAlgn="base" hangingPunct="0">
+              <a:lnSpc>
+                <a:spcPct val="93000"/>
+              </a:lnSpc>
+              <a:spcBef>
+                <a:spcPct val="0"/>
+              </a:spcBef>
+              <a:spcAft>
+                <a:spcPct val="0"/>
+              </a:spcAft>
+              <a:buClr>
+                <a:srgbClr val="000000"/>
+              </a:buClr>
+              <a:buSzPct val="100000"/>
+              <a:buFont typeface="Arial" charset="0"/>
+              <a:tabLst>
+                <a:tab pos="746125" algn="l"/>
+                <a:tab pos="1492250" algn="l"/>
+                <a:tab pos="2238375" algn="l"/>
+                <a:tab pos="2986088" algn="l"/>
+                <a:tab pos="3732213" algn="l"/>
+              </a:tabLst>
+              <a:defRPr>
+                <a:solidFill>
+                  <a:schemeClr val="tx1"/>
+                </a:solidFill>
+                <a:latin typeface="Arial" charset="0"/>
+                <a:ea typeface="Lucida Sans Unicode" pitchFamily="34" charset="0"/>
+                <a:cs typeface="Lucida Sans Unicode" pitchFamily="34" charset="0"/>
+              </a:defRPr>
+            </a:lvl8pPr>
+            <a:lvl9pPr marL="3886200" indent="-228600" algn="ctr" defTabSz="463550" eaLnBrk="0" fontAlgn="base" hangingPunct="0">
+              <a:lnSpc>
+                <a:spcPct val="93000"/>
+              </a:lnSpc>
+              <a:spcBef>
+                <a:spcPct val="0"/>
+              </a:spcBef>
+              <a:spcAft>
+                <a:spcPct val="0"/>
+              </a:spcAft>
+              <a:buClr>
+                <a:srgbClr val="000000"/>
+              </a:buClr>
+              <a:buSzPct val="100000"/>
+              <a:buFont typeface="Arial" charset="0"/>
+              <a:tabLst>
+                <a:tab pos="746125" algn="l"/>
+                <a:tab pos="1492250" algn="l"/>
+                <a:tab pos="2238375" algn="l"/>
+                <a:tab pos="2986088" algn="l"/>
+                <a:tab pos="3732213" algn="l"/>
+              </a:tabLst>
+              <a:defRPr>
+                <a:solidFill>
+                  <a:schemeClr val="tx1"/>
+                </a:solidFill>
+                <a:latin typeface="Arial" charset="0"/>
+                <a:ea typeface="Lucida Sans Unicode" pitchFamily="34" charset="0"/>
+                <a:cs typeface="Lucida Sans Unicode" pitchFamily="34" charset="0"/>
+              </a:defRPr>
+            </a:lvl9pPr>
+          </a:lstStyle>
+          <a:p>
+            <a:pPr eaLnBrk="1" hangingPunct="1"/>
+            <a:r>
+              <a:rPr lang="en-US" altLang="de-DE" smtClean="0">
+                <a:solidFill>
+                  <a:srgbClr val="000000"/>
+                </a:solidFill>
+                <a:latin typeface="Stafford" pitchFamily="2" charset="0"/>
+              </a:rPr>
+              <a:t>|  </a:t>
+            </a:r>
+          </a:p>
+        </p:txBody>
+      </p:sp>
+      <p:sp>
+        <p:nvSpPr>
+          <p:cNvPr id="53254" name="Foliennummernplatzhalter 5"/>
+          <p:cNvSpPr>
+            <a:spLocks noGrp="1"/>
+          </p:cNvSpPr>
+          <p:nvPr>
+            <p:ph type="sldNum" sz="quarter"/>
+          </p:nvPr>
+        </p:nvSpPr>
+        <p:spPr>
+          <a:noFill/>
+          <a:extLst>
+            <a:ext uri="{909E8E84-426E-40DD-AFC4-6F175D3DCCD1}">
+              <a14:hiddenFill xmlns:a14="http://schemas.microsoft.com/office/drawing/2010/main">
+                <a:solidFill>
+                  <a:srgbClr val="FFFFFF"/>
+                </a:solidFill>
+              </a14:hiddenFill>
+            </a:ext>
+            <a:ext uri="{91240B29-F687-4F45-9708-019B960494DF}">
+              <a14:hiddenLine xmlns:a14="http://schemas.microsoft.com/office/drawing/2010/main" w="9525">
+                <a:solidFill>
+                  <a:srgbClr val="000000"/>
+                </a:solidFill>
+                <a:miter lim="800000"/>
+                <a:headEnd/>
+                <a:tailEnd/>
+              </a14:hiddenLine>
+            </a:ext>
+          </a:extLst>
+        </p:spPr>
+        <p:txBody>
+          <a:bodyPr/>
+          <a:lstStyle>
+            <a:lvl1pPr defTabSz="463550" eaLnBrk="0" hangingPunct="0">
+              <a:tabLst>
+                <a:tab pos="746125" algn="l"/>
+              </a:tabLst>
+              <a:defRPr>
+                <a:solidFill>
+                  <a:schemeClr val="tx1"/>
+                </a:solidFill>
+                <a:latin typeface="Arial" charset="0"/>
+                <a:ea typeface="Lucida Sans Unicode" pitchFamily="34" charset="0"/>
+                <a:cs typeface="Lucida Sans Unicode" pitchFamily="34" charset="0"/>
+              </a:defRPr>
+            </a:lvl1pPr>
+            <a:lvl2pPr marL="742950" indent="-285750" defTabSz="463550" eaLnBrk="0" hangingPunct="0">
+              <a:tabLst>
+                <a:tab pos="746125" algn="l"/>
+              </a:tabLst>
+              <a:defRPr>
+                <a:solidFill>
+                  <a:schemeClr val="tx1"/>
+                </a:solidFill>
+                <a:latin typeface="Arial" charset="0"/>
+                <a:ea typeface="Lucida Sans Unicode" pitchFamily="34" charset="0"/>
+                <a:cs typeface="Lucida Sans Unicode" pitchFamily="34" charset="0"/>
+              </a:defRPr>
+            </a:lvl2pPr>
+            <a:lvl3pPr marL="1143000" indent="-228600" defTabSz="463550" eaLnBrk="0" hangingPunct="0">
+              <a:tabLst>
+                <a:tab pos="746125" algn="l"/>
+              </a:tabLst>
+              <a:defRPr>
+                <a:solidFill>
+                  <a:schemeClr val="tx1"/>
+                </a:solidFill>
+                <a:latin typeface="Arial" charset="0"/>
+                <a:ea typeface="Lucida Sans Unicode" pitchFamily="34" charset="0"/>
+                <a:cs typeface="Lucida Sans Unicode" pitchFamily="34" charset="0"/>
+              </a:defRPr>
+            </a:lvl3pPr>
+            <a:lvl4pPr marL="1600200" indent="-228600" defTabSz="463550" eaLnBrk="0" hangingPunct="0">
+              <a:tabLst>
+                <a:tab pos="746125" algn="l"/>
+              </a:tabLst>
+              <a:defRPr>
+                <a:solidFill>
+                  <a:schemeClr val="tx1"/>
+                </a:solidFill>
+                <a:latin typeface="Arial" charset="0"/>
+                <a:ea typeface="Lucida Sans Unicode" pitchFamily="34" charset="0"/>
+                <a:cs typeface="Lucida Sans Unicode" pitchFamily="34" charset="0"/>
+              </a:defRPr>
+            </a:lvl4pPr>
+            <a:lvl5pPr marL="2057400" indent="-228600" defTabSz="463550" eaLnBrk="0" hangingPunct="0">
+              <a:tabLst>
+                <a:tab pos="746125" algn="l"/>
+              </a:tabLst>
+              <a:defRPr>
+                <a:solidFill>
+                  <a:schemeClr val="tx1"/>
+                </a:solidFill>
+                <a:latin typeface="Arial" charset="0"/>
+                <a:ea typeface="Lucida Sans Unicode" pitchFamily="34" charset="0"/>
+                <a:cs typeface="Lucida Sans Unicode" pitchFamily="34" charset="0"/>
+              </a:defRPr>
+            </a:lvl5pPr>
+            <a:lvl6pPr marL="2514600" indent="-228600" algn="ctr" defTabSz="463550" eaLnBrk="0" fontAlgn="base" hangingPunct="0">
+              <a:lnSpc>
+                <a:spcPct val="93000"/>
+              </a:lnSpc>
+              <a:spcBef>
+                <a:spcPct val="0"/>
+              </a:spcBef>
+              <a:spcAft>
+                <a:spcPct val="0"/>
+              </a:spcAft>
+              <a:buClr>
+                <a:srgbClr val="000000"/>
+              </a:buClr>
+              <a:buSzPct val="100000"/>
+              <a:buFont typeface="Arial" charset="0"/>
+              <a:tabLst>
+                <a:tab pos="746125" algn="l"/>
+              </a:tabLst>
+              <a:defRPr>
+                <a:solidFill>
+                  <a:schemeClr val="tx1"/>
+                </a:solidFill>
+                <a:latin typeface="Arial" charset="0"/>
+                <a:ea typeface="Lucida Sans Unicode" pitchFamily="34" charset="0"/>
+                <a:cs typeface="Lucida Sans Unicode" pitchFamily="34" charset="0"/>
+              </a:defRPr>
+            </a:lvl6pPr>
+            <a:lvl7pPr marL="2971800" indent="-228600" algn="ctr" defTabSz="463550" eaLnBrk="0" fontAlgn="base" hangingPunct="0">
+              <a:lnSpc>
+                <a:spcPct val="93000"/>
+              </a:lnSpc>
+              <a:spcBef>
+                <a:spcPct val="0"/>
+              </a:spcBef>
+              <a:spcAft>
+                <a:spcPct val="0"/>
+              </a:spcAft>
+              <a:buClr>
+                <a:srgbClr val="000000"/>
+              </a:buClr>
+              <a:buSzPct val="100000"/>
+              <a:buFont typeface="Arial" charset="0"/>
+              <a:tabLst>
+                <a:tab pos="746125" algn="l"/>
+              </a:tabLst>
+              <a:defRPr>
+                <a:solidFill>
+                  <a:schemeClr val="tx1"/>
+                </a:solidFill>
+                <a:latin typeface="Arial" charset="0"/>
+                <a:ea typeface="Lucida Sans Unicode" pitchFamily="34" charset="0"/>
+                <a:cs typeface="Lucida Sans Unicode" pitchFamily="34" charset="0"/>
+              </a:defRPr>
+            </a:lvl7pPr>
+            <a:lvl8pPr marL="3429000" indent="-228600" algn="ctr" defTabSz="463550" eaLnBrk="0" fontAlgn="base" hangingPunct="0">
+              <a:lnSpc>
+                <a:spcPct val="93000"/>
+              </a:lnSpc>
+              <a:spcBef>
+                <a:spcPct val="0"/>
+              </a:spcBef>
+              <a:spcAft>
+                <a:spcPct val="0"/>
+              </a:spcAft>
+              <a:buClr>
+                <a:srgbClr val="000000"/>
+              </a:buClr>
+              <a:buSzPct val="100000"/>
+              <a:buFont typeface="Arial" charset="0"/>
+              <a:tabLst>
+                <a:tab pos="746125" algn="l"/>
+              </a:tabLst>
+              <a:defRPr>
+                <a:solidFill>
+                  <a:schemeClr val="tx1"/>
+                </a:solidFill>
+                <a:latin typeface="Arial" charset="0"/>
+                <a:ea typeface="Lucida Sans Unicode" pitchFamily="34" charset="0"/>
+                <a:cs typeface="Lucida Sans Unicode" pitchFamily="34" charset="0"/>
+              </a:defRPr>
+            </a:lvl8pPr>
+            <a:lvl9pPr marL="3886200" indent="-228600" algn="ctr" defTabSz="463550" eaLnBrk="0" fontAlgn="base" hangingPunct="0">
+              <a:lnSpc>
+                <a:spcPct val="93000"/>
+              </a:lnSpc>
+              <a:spcBef>
+                <a:spcPct val="0"/>
+              </a:spcBef>
+              <a:spcAft>
+                <a:spcPct val="0"/>
+              </a:spcAft>
+              <a:buClr>
+                <a:srgbClr val="000000"/>
+              </a:buClr>
+              <a:buSzPct val="100000"/>
+              <a:buFont typeface="Arial" charset="0"/>
+              <a:tabLst>
+                <a:tab pos="746125" algn="l"/>
+              </a:tabLst>
+              <a:defRPr>
+                <a:solidFill>
+                  <a:schemeClr val="tx1"/>
+                </a:solidFill>
+                <a:latin typeface="Arial" charset="0"/>
+                <a:ea typeface="Lucida Sans Unicode" pitchFamily="34" charset="0"/>
+                <a:cs typeface="Lucida Sans Unicode" pitchFamily="34" charset="0"/>
+              </a:defRPr>
+            </a:lvl9pPr>
+          </a:lstStyle>
+          <a:p>
+            <a:pPr eaLnBrk="1" hangingPunct="1"/>
+            <a:r>
+              <a:rPr lang="en-US" altLang="de-DE" smtClean="0">
+                <a:solidFill>
+                  <a:srgbClr val="000000"/>
+                </a:solidFill>
+                <a:latin typeface="Stafford" pitchFamily="2" charset="0"/>
+              </a:rPr>
+              <a:t>|  </a:t>
+            </a:r>
+            <a:fld id="{6775A062-1A8A-4084-8B81-E33BA407A859}" type="slidenum">
+              <a:rPr lang="en-US" altLang="de-DE" smtClean="0">
+                <a:solidFill>
+                  <a:srgbClr val="000000"/>
+                </a:solidFill>
+                <a:latin typeface="Stafford" pitchFamily="2" charset="0"/>
+              </a:rPr>
+              <a:pPr eaLnBrk="1" hangingPunct="1"/>
+              <a:t>6</a:t>
+            </a:fld>
+            <a:endParaRPr lang="en-US" altLang="de-DE" smtClean="0">
+              <a:solidFill>
+                <a:srgbClr val="000000"/>
+              </a:solidFill>
+              <a:latin typeface="Stafford" pitchFamily="2" charset="0"/>
+            </a:endParaRPr>
+          </a:p>
+        </p:txBody>
+      </p:sp>
+    </p:spTree>
+    <p:extLst>
+      <p:ext uri="{BB962C8B-B14F-4D97-AF65-F5344CB8AC3E}">
+        <p14:creationId xmlns:p14="http://schemas.microsoft.com/office/powerpoint/2010/main" val="2604565681"/>
+      </p:ext>
+    </p:extLst>
+  </p:cSld>
+  <p:clrMapOvr>
+    <a:masterClrMapping/>
+  </p:clrMapOvr>
+</p:notes>
+</file>
+
+<file path=ppt/notesSlides/notesSlide4.xml><?xml version="1.0" encoding="utf-8"?>
+<p:notes xmlns:a="http://schemas.openxmlformats.org/drawingml/2006/main" xmlns:r="http://schemas.openxmlformats.org/officeDocument/2006/relationships" xmlns:p="http://schemas.openxmlformats.org/presentationml/2006/main">
+  <p:cSld>
+    <p:spTree>
+      <p:nvGrpSpPr>
+        <p:cNvPr id="1" name=""/>
+        <p:cNvGrpSpPr/>
+        <p:nvPr/>
+      </p:nvGrpSpPr>
+      <p:grpSpPr>
+        <a:xfrm>
+          <a:off x="0" y="0"/>
+          <a:ext cx="0" cy="0"/>
+          <a:chOff x="0" y="0"/>
+          <a:chExt cx="0" cy="0"/>
+        </a:xfrm>
+      </p:grpSpPr>
+      <p:sp>
+        <p:nvSpPr>
+          <p:cNvPr id="53250" name="Folienbildplatzhalter 1"/>
+          <p:cNvSpPr>
+            <a:spLocks noGrp="1" noRot="1" noChangeAspect="1" noTextEdit="1"/>
+          </p:cNvSpPr>
+          <p:nvPr>
+            <p:ph type="sldImg"/>
+          </p:nvPr>
+        </p:nvSpPr>
+        <p:spPr>
+          <a:ln/>
+        </p:spPr>
+      </p:sp>
+      <p:sp>
+        <p:nvSpPr>
+          <p:cNvPr id="53251" name="Notizenplatzhalter 2"/>
+          <p:cNvSpPr>
+            <a:spLocks noGrp="1"/>
+          </p:cNvSpPr>
+          <p:nvPr>
+            <p:ph type="body" idx="1"/>
+          </p:nvPr>
+        </p:nvSpPr>
+        <p:spPr>
+          <a:noFill/>
+          <a:extLst>
+            <a:ext uri="{909E8E84-426E-40DD-AFC4-6F175D3DCCD1}">
+              <a14:hiddenFill xmlns:a14="http://schemas.microsoft.com/office/drawing/2010/main">
+                <a:solidFill>
+                  <a:srgbClr val="FFFFFF"/>
+                </a:solidFill>
+              </a14:hiddenFill>
+            </a:ext>
+            <a:ext uri="{91240B29-F687-4F45-9708-019B960494DF}">
+              <a14:hiddenLine xmlns:a14="http://schemas.microsoft.com/office/drawing/2010/main" w="9525">
+                <a:solidFill>
+                  <a:srgbClr val="000000"/>
+                </a:solidFill>
+                <a:miter lim="800000"/>
+                <a:headEnd/>
+                <a:tailEnd/>
+              </a14:hiddenLine>
+            </a:ext>
+          </a:extLst>
+        </p:spPr>
+        <p:txBody>
+          <a:bodyPr/>
+          <a:lstStyle/>
+          <a:p>
+            <a:pPr marL="0" indent="0">
+              <a:buFontTx/>
+              <a:buNone/>
+            </a:pPr>
+            <a:endParaRPr lang="de-DE" altLang="de-DE" b="1" i="0" dirty="0" smtClean="0">
+              <a:latin typeface="Times New Roman" pitchFamily="16" charset="0"/>
+            </a:endParaRPr>
+          </a:p>
+        </p:txBody>
+      </p:sp>
+      <p:sp>
+        <p:nvSpPr>
+          <p:cNvPr id="53252" name="Datumsplatzhalter 3"/>
+          <p:cNvSpPr>
+            <a:spLocks noGrp="1"/>
+          </p:cNvSpPr>
+          <p:nvPr>
+            <p:ph type="dt" sz="quarter"/>
+          </p:nvPr>
+        </p:nvSpPr>
+        <p:spPr>
+          <a:noFill/>
+          <a:extLst>
+            <a:ext uri="{909E8E84-426E-40DD-AFC4-6F175D3DCCD1}">
+              <a14:hiddenFill xmlns:a14="http://schemas.microsoft.com/office/drawing/2010/main">
+                <a:solidFill>
+                  <a:srgbClr val="FFFFFF"/>
+                </a:solidFill>
+              </a14:hiddenFill>
+            </a:ext>
+            <a:ext uri="{91240B29-F687-4F45-9708-019B960494DF}">
+              <a14:hiddenLine xmlns:a14="http://schemas.microsoft.com/office/drawing/2010/main" w="9525">
+                <a:solidFill>
+                  <a:srgbClr val="000000"/>
+                </a:solidFill>
+                <a:miter lim="800000"/>
+                <a:headEnd/>
+                <a:tailEnd/>
+              </a14:hiddenLine>
+            </a:ext>
+          </a:extLst>
+        </p:spPr>
+        <p:txBody>
+          <a:bodyPr/>
+          <a:lstStyle>
+            <a:lvl1pPr defTabSz="463550" eaLnBrk="0" hangingPunct="0">
+              <a:tabLst>
+                <a:tab pos="746125" algn="l"/>
+                <a:tab pos="1492250" algn="l"/>
+              </a:tabLst>
+              <a:defRPr>
+                <a:solidFill>
+                  <a:schemeClr val="tx1"/>
+                </a:solidFill>
+                <a:latin typeface="Arial" charset="0"/>
+                <a:ea typeface="Lucida Sans Unicode" pitchFamily="34" charset="0"/>
+                <a:cs typeface="Lucida Sans Unicode" pitchFamily="34" charset="0"/>
+              </a:defRPr>
+            </a:lvl1pPr>
+            <a:lvl2pPr marL="742950" indent="-285750" defTabSz="463550" eaLnBrk="0" hangingPunct="0">
+              <a:tabLst>
+                <a:tab pos="746125" algn="l"/>
+                <a:tab pos="1492250" algn="l"/>
+              </a:tabLst>
+              <a:defRPr>
+                <a:solidFill>
+                  <a:schemeClr val="tx1"/>
+                </a:solidFill>
+                <a:latin typeface="Arial" charset="0"/>
+                <a:ea typeface="Lucida Sans Unicode" pitchFamily="34" charset="0"/>
+                <a:cs typeface="Lucida Sans Unicode" pitchFamily="34" charset="0"/>
+              </a:defRPr>
+            </a:lvl2pPr>
+            <a:lvl3pPr marL="1143000" indent="-228600" defTabSz="463550" eaLnBrk="0" hangingPunct="0">
+              <a:tabLst>
+                <a:tab pos="746125" algn="l"/>
+                <a:tab pos="1492250" algn="l"/>
+              </a:tabLst>
+              <a:defRPr>
+                <a:solidFill>
+                  <a:schemeClr val="tx1"/>
+                </a:solidFill>
+                <a:latin typeface="Arial" charset="0"/>
+                <a:ea typeface="Lucida Sans Unicode" pitchFamily="34" charset="0"/>
+                <a:cs typeface="Lucida Sans Unicode" pitchFamily="34" charset="0"/>
+              </a:defRPr>
+            </a:lvl3pPr>
+            <a:lvl4pPr marL="1600200" indent="-228600" defTabSz="463550" eaLnBrk="0" hangingPunct="0">
+              <a:tabLst>
+                <a:tab pos="746125" algn="l"/>
+                <a:tab pos="1492250" algn="l"/>
+              </a:tabLst>
+              <a:defRPr>
+                <a:solidFill>
+                  <a:schemeClr val="tx1"/>
+                </a:solidFill>
+                <a:latin typeface="Arial" charset="0"/>
+                <a:ea typeface="Lucida Sans Unicode" pitchFamily="34" charset="0"/>
+                <a:cs typeface="Lucida Sans Unicode" pitchFamily="34" charset="0"/>
+              </a:defRPr>
+            </a:lvl4pPr>
+            <a:lvl5pPr marL="2057400" indent="-228600" defTabSz="463550" eaLnBrk="0" hangingPunct="0">
+              <a:tabLst>
+                <a:tab pos="746125" algn="l"/>
+                <a:tab pos="1492250" algn="l"/>
+              </a:tabLst>
+              <a:defRPr>
+                <a:solidFill>
+                  <a:schemeClr val="tx1"/>
+                </a:solidFill>
+                <a:latin typeface="Arial" charset="0"/>
+                <a:ea typeface="Lucida Sans Unicode" pitchFamily="34" charset="0"/>
+                <a:cs typeface="Lucida Sans Unicode" pitchFamily="34" charset="0"/>
+              </a:defRPr>
+            </a:lvl5pPr>
+            <a:lvl6pPr marL="2514600" indent="-228600" algn="ctr" defTabSz="463550" eaLnBrk="0" fontAlgn="base" hangingPunct="0">
+              <a:lnSpc>
+                <a:spcPct val="93000"/>
+              </a:lnSpc>
+              <a:spcBef>
+                <a:spcPct val="0"/>
+              </a:spcBef>
+              <a:spcAft>
+                <a:spcPct val="0"/>
+              </a:spcAft>
+              <a:buClr>
+                <a:srgbClr val="000000"/>
+              </a:buClr>
+              <a:buSzPct val="100000"/>
+              <a:buFont typeface="Arial" charset="0"/>
+              <a:tabLst>
+                <a:tab pos="746125" algn="l"/>
+                <a:tab pos="1492250" algn="l"/>
+              </a:tabLst>
+              <a:defRPr>
+                <a:solidFill>
+                  <a:schemeClr val="tx1"/>
+                </a:solidFill>
+                <a:latin typeface="Arial" charset="0"/>
+                <a:ea typeface="Lucida Sans Unicode" pitchFamily="34" charset="0"/>
+                <a:cs typeface="Lucida Sans Unicode" pitchFamily="34" charset="0"/>
+              </a:defRPr>
+            </a:lvl6pPr>
+            <a:lvl7pPr marL="2971800" indent="-228600" algn="ctr" defTabSz="463550" eaLnBrk="0" fontAlgn="base" hangingPunct="0">
+              <a:lnSpc>
+                <a:spcPct val="93000"/>
+              </a:lnSpc>
+              <a:spcBef>
+                <a:spcPct val="0"/>
+              </a:spcBef>
+              <a:spcAft>
+                <a:spcPct val="0"/>
+              </a:spcAft>
+              <a:buClr>
+                <a:srgbClr val="000000"/>
+              </a:buClr>
+              <a:buSzPct val="100000"/>
+              <a:buFont typeface="Arial" charset="0"/>
+              <a:tabLst>
+                <a:tab pos="746125" algn="l"/>
+                <a:tab pos="1492250" algn="l"/>
+              </a:tabLst>
+              <a:defRPr>
+                <a:solidFill>
+                  <a:schemeClr val="tx1"/>
+                </a:solidFill>
+                <a:latin typeface="Arial" charset="0"/>
+                <a:ea typeface="Lucida Sans Unicode" pitchFamily="34" charset="0"/>
+                <a:cs typeface="Lucida Sans Unicode" pitchFamily="34" charset="0"/>
+              </a:defRPr>
+            </a:lvl7pPr>
+            <a:lvl8pPr marL="3429000" indent="-228600" algn="ctr" defTabSz="463550" eaLnBrk="0" fontAlgn="base" hangingPunct="0">
+              <a:lnSpc>
+                <a:spcPct val="93000"/>
+              </a:lnSpc>
+              <a:spcBef>
+                <a:spcPct val="0"/>
+              </a:spcBef>
+              <a:spcAft>
+                <a:spcPct val="0"/>
+              </a:spcAft>
+              <a:buClr>
+                <a:srgbClr val="000000"/>
+              </a:buClr>
+              <a:buSzPct val="100000"/>
+              <a:buFont typeface="Arial" charset="0"/>
+              <a:tabLst>
+                <a:tab pos="746125" algn="l"/>
+                <a:tab pos="1492250" algn="l"/>
+              </a:tabLst>
+              <a:defRPr>
+                <a:solidFill>
+                  <a:schemeClr val="tx1"/>
+                </a:solidFill>
+                <a:latin typeface="Arial" charset="0"/>
+                <a:ea typeface="Lucida Sans Unicode" pitchFamily="34" charset="0"/>
+                <a:cs typeface="Lucida Sans Unicode" pitchFamily="34" charset="0"/>
+              </a:defRPr>
+            </a:lvl8pPr>
+            <a:lvl9pPr marL="3886200" indent="-228600" algn="ctr" defTabSz="463550" eaLnBrk="0" fontAlgn="base" hangingPunct="0">
+              <a:lnSpc>
+                <a:spcPct val="93000"/>
+              </a:lnSpc>
+              <a:spcBef>
+                <a:spcPct val="0"/>
+              </a:spcBef>
+              <a:spcAft>
+                <a:spcPct val="0"/>
+              </a:spcAft>
+              <a:buClr>
+                <a:srgbClr val="000000"/>
+              </a:buClr>
+              <a:buSzPct val="100000"/>
+              <a:buFont typeface="Arial" charset="0"/>
+              <a:tabLst>
+                <a:tab pos="746125" algn="l"/>
+                <a:tab pos="1492250" algn="l"/>
+              </a:tabLst>
+              <a:defRPr>
+                <a:solidFill>
+                  <a:schemeClr val="tx1"/>
+                </a:solidFill>
+                <a:latin typeface="Arial" charset="0"/>
+                <a:ea typeface="Lucida Sans Unicode" pitchFamily="34" charset="0"/>
+                <a:cs typeface="Lucida Sans Unicode" pitchFamily="34" charset="0"/>
+              </a:defRPr>
+            </a:lvl9pPr>
+          </a:lstStyle>
+          <a:p>
+            <a:pPr eaLnBrk="1" hangingPunct="1"/>
+            <a:r>
+              <a:rPr lang="en-US" altLang="de-DE" smtClean="0">
+                <a:solidFill>
+                  <a:srgbClr val="000000"/>
+                </a:solidFill>
+                <a:latin typeface="Stafford" pitchFamily="2" charset="0"/>
+              </a:rPr>
+              <a:t>November 19, 2007</a:t>
+            </a:r>
+          </a:p>
+        </p:txBody>
+      </p:sp>
+      <p:sp>
+        <p:nvSpPr>
+          <p:cNvPr id="53253" name="Fußzeilenplatzhalter 4"/>
+          <p:cNvSpPr>
+            <a:spLocks noGrp="1"/>
+          </p:cNvSpPr>
+          <p:nvPr>
+            <p:ph type="ftr" sz="quarter"/>
+          </p:nvPr>
+        </p:nvSpPr>
+        <p:spPr>
+          <a:noFill/>
+          <a:extLst>
+            <a:ext uri="{909E8E84-426E-40DD-AFC4-6F175D3DCCD1}">
+              <a14:hiddenFill xmlns:a14="http://schemas.microsoft.com/office/drawing/2010/main">
+                <a:solidFill>
+                  <a:srgbClr val="FFFFFF"/>
+                </a:solidFill>
+              </a14:hiddenFill>
+            </a:ext>
+            <a:ext uri="{91240B29-F687-4F45-9708-019B960494DF}">
+              <a14:hiddenLine xmlns:a14="http://schemas.microsoft.com/office/drawing/2010/main" w="9525">
+                <a:solidFill>
+                  <a:srgbClr val="000000"/>
+                </a:solidFill>
+                <a:miter lim="800000"/>
+                <a:headEnd/>
+                <a:tailEnd/>
+              </a14:hiddenLine>
+            </a:ext>
+          </a:extLst>
+        </p:spPr>
+        <p:txBody>
+          <a:bodyPr/>
+          <a:lstStyle>
+            <a:lvl1pPr defTabSz="463550" eaLnBrk="0" hangingPunct="0">
+              <a:tabLst>
+                <a:tab pos="746125" algn="l"/>
+                <a:tab pos="1492250" algn="l"/>
+                <a:tab pos="2238375" algn="l"/>
+                <a:tab pos="2986088" algn="l"/>
+                <a:tab pos="3732213" algn="l"/>
+              </a:tabLst>
+              <a:defRPr>
+                <a:solidFill>
+                  <a:schemeClr val="tx1"/>
+                </a:solidFill>
+                <a:latin typeface="Arial" charset="0"/>
+                <a:ea typeface="Lucida Sans Unicode" pitchFamily="34" charset="0"/>
+                <a:cs typeface="Lucida Sans Unicode" pitchFamily="34" charset="0"/>
+              </a:defRPr>
+            </a:lvl1pPr>
+            <a:lvl2pPr marL="742950" indent="-285750" defTabSz="463550" eaLnBrk="0" hangingPunct="0">
+              <a:tabLst>
+                <a:tab pos="746125" algn="l"/>
+                <a:tab pos="1492250" algn="l"/>
+                <a:tab pos="2238375" algn="l"/>
+                <a:tab pos="2986088" algn="l"/>
+                <a:tab pos="3732213" algn="l"/>
+              </a:tabLst>
+              <a:defRPr>
+                <a:solidFill>
+                  <a:schemeClr val="tx1"/>
+                </a:solidFill>
+                <a:latin typeface="Arial" charset="0"/>
+                <a:ea typeface="Lucida Sans Unicode" pitchFamily="34" charset="0"/>
+                <a:cs typeface="Lucida Sans Unicode" pitchFamily="34" charset="0"/>
+              </a:defRPr>
+            </a:lvl2pPr>
+            <a:lvl3pPr marL="1143000" indent="-228600" defTabSz="463550" eaLnBrk="0" hangingPunct="0">
+              <a:tabLst>
+                <a:tab pos="746125" algn="l"/>
+                <a:tab pos="1492250" algn="l"/>
+                <a:tab pos="2238375" algn="l"/>
+                <a:tab pos="2986088" algn="l"/>
+                <a:tab pos="3732213" algn="l"/>
+              </a:tabLst>
+              <a:defRPr>
+                <a:solidFill>
+                  <a:schemeClr val="tx1"/>
+                </a:solidFill>
+                <a:latin typeface="Arial" charset="0"/>
+                <a:ea typeface="Lucida Sans Unicode" pitchFamily="34" charset="0"/>
+                <a:cs typeface="Lucida Sans Unicode" pitchFamily="34" charset="0"/>
+              </a:defRPr>
+            </a:lvl3pPr>
+            <a:lvl4pPr marL="1600200" indent="-228600" defTabSz="463550" eaLnBrk="0" hangingPunct="0">
+              <a:tabLst>
+                <a:tab pos="746125" algn="l"/>
+                <a:tab pos="1492250" algn="l"/>
+                <a:tab pos="2238375" algn="l"/>
+                <a:tab pos="2986088" algn="l"/>
+                <a:tab pos="3732213" algn="l"/>
+              </a:tabLst>
+              <a:defRPr>
+                <a:solidFill>
+                  <a:schemeClr val="tx1"/>
+                </a:solidFill>
+                <a:latin typeface="Arial" charset="0"/>
+                <a:ea typeface="Lucida Sans Unicode" pitchFamily="34" charset="0"/>
+                <a:cs typeface="Lucida Sans Unicode" pitchFamily="34" charset="0"/>
+              </a:defRPr>
+            </a:lvl4pPr>
+            <a:lvl5pPr marL="2057400" indent="-228600" defTabSz="463550" eaLnBrk="0" hangingPunct="0">
+              <a:tabLst>
+                <a:tab pos="746125" algn="l"/>
+                <a:tab pos="1492250" algn="l"/>
+                <a:tab pos="2238375" algn="l"/>
+                <a:tab pos="2986088" algn="l"/>
+                <a:tab pos="3732213" algn="l"/>
+              </a:tabLst>
+              <a:defRPr>
+                <a:solidFill>
+                  <a:schemeClr val="tx1"/>
+                </a:solidFill>
+                <a:latin typeface="Arial" charset="0"/>
+                <a:ea typeface="Lucida Sans Unicode" pitchFamily="34" charset="0"/>
+                <a:cs typeface="Lucida Sans Unicode" pitchFamily="34" charset="0"/>
+              </a:defRPr>
+            </a:lvl5pPr>
+            <a:lvl6pPr marL="2514600" indent="-228600" algn="ctr" defTabSz="463550" eaLnBrk="0" fontAlgn="base" hangingPunct="0">
+              <a:lnSpc>
+                <a:spcPct val="93000"/>
+              </a:lnSpc>
+              <a:spcBef>
+                <a:spcPct val="0"/>
+              </a:spcBef>
+              <a:spcAft>
+                <a:spcPct val="0"/>
+              </a:spcAft>
+              <a:buClr>
+                <a:srgbClr val="000000"/>
+              </a:buClr>
+              <a:buSzPct val="100000"/>
+              <a:buFont typeface="Arial" charset="0"/>
+              <a:tabLst>
+                <a:tab pos="746125" algn="l"/>
+                <a:tab pos="1492250" algn="l"/>
+                <a:tab pos="2238375" algn="l"/>
+                <a:tab pos="2986088" algn="l"/>
+                <a:tab pos="3732213" algn="l"/>
+              </a:tabLst>
+              <a:defRPr>
+                <a:solidFill>
+                  <a:schemeClr val="tx1"/>
+                </a:solidFill>
+                <a:latin typeface="Arial" charset="0"/>
+                <a:ea typeface="Lucida Sans Unicode" pitchFamily="34" charset="0"/>
+                <a:cs typeface="Lucida Sans Unicode" pitchFamily="34" charset="0"/>
+              </a:defRPr>
+            </a:lvl6pPr>
+            <a:lvl7pPr marL="2971800" indent="-228600" algn="ctr" defTabSz="463550" eaLnBrk="0" fontAlgn="base" hangingPunct="0">
+              <a:lnSpc>
+                <a:spcPct val="93000"/>
+              </a:lnSpc>
+              <a:spcBef>
+                <a:spcPct val="0"/>
+              </a:spcBef>
+              <a:spcAft>
+                <a:spcPct val="0"/>
+              </a:spcAft>
+              <a:buClr>
+                <a:srgbClr val="000000"/>
+              </a:buClr>
+              <a:buSzPct val="100000"/>
+              <a:buFont typeface="Arial" charset="0"/>
+              <a:tabLst>
+                <a:tab pos="746125" algn="l"/>
+                <a:tab pos="1492250" algn="l"/>
+                <a:tab pos="2238375" algn="l"/>
+                <a:tab pos="2986088" algn="l"/>
+                <a:tab pos="3732213" algn="l"/>
+              </a:tabLst>
+              <a:defRPr>
+                <a:solidFill>
+                  <a:schemeClr val="tx1"/>
+                </a:solidFill>
+                <a:latin typeface="Arial" charset="0"/>
+                <a:ea typeface="Lucida Sans Unicode" pitchFamily="34" charset="0"/>
+                <a:cs typeface="Lucida Sans Unicode" pitchFamily="34" charset="0"/>
+              </a:defRPr>
+            </a:lvl7pPr>
+            <a:lvl8pPr marL="3429000" indent="-228600" algn="ctr" defTabSz="463550" eaLnBrk="0" fontAlgn="base" hangingPunct="0">
+              <a:lnSpc>
+                <a:spcPct val="93000"/>
+              </a:lnSpc>
+              <a:spcBef>
+                <a:spcPct val="0"/>
+              </a:spcBef>
+              <a:spcAft>
+                <a:spcPct val="0"/>
+              </a:spcAft>
+              <a:buClr>
+                <a:srgbClr val="000000"/>
+              </a:buClr>
+              <a:buSzPct val="100000"/>
+              <a:buFont typeface="Arial" charset="0"/>
+              <a:tabLst>
+                <a:tab pos="746125" algn="l"/>
+                <a:tab pos="1492250" algn="l"/>
+                <a:tab pos="2238375" algn="l"/>
+                <a:tab pos="2986088" algn="l"/>
+                <a:tab pos="3732213" algn="l"/>
+              </a:tabLst>
+              <a:defRPr>
+                <a:solidFill>
+                  <a:schemeClr val="tx1"/>
+                </a:solidFill>
+                <a:latin typeface="Arial" charset="0"/>
+                <a:ea typeface="Lucida Sans Unicode" pitchFamily="34" charset="0"/>
+                <a:cs typeface="Lucida Sans Unicode" pitchFamily="34" charset="0"/>
+              </a:defRPr>
+            </a:lvl8pPr>
+            <a:lvl9pPr marL="3886200" indent="-228600" algn="ctr" defTabSz="463550" eaLnBrk="0" fontAlgn="base" hangingPunct="0">
+              <a:lnSpc>
+                <a:spcPct val="93000"/>
+              </a:lnSpc>
+              <a:spcBef>
+                <a:spcPct val="0"/>
+              </a:spcBef>
+              <a:spcAft>
+                <a:spcPct val="0"/>
+              </a:spcAft>
+              <a:buClr>
+                <a:srgbClr val="000000"/>
+              </a:buClr>
+              <a:buSzPct val="100000"/>
+              <a:buFont typeface="Arial" charset="0"/>
+              <a:tabLst>
+                <a:tab pos="746125" algn="l"/>
+                <a:tab pos="1492250" algn="l"/>
+                <a:tab pos="2238375" algn="l"/>
+                <a:tab pos="2986088" algn="l"/>
+                <a:tab pos="3732213" algn="l"/>
+              </a:tabLst>
+              <a:defRPr>
+                <a:solidFill>
+                  <a:schemeClr val="tx1"/>
+                </a:solidFill>
+                <a:latin typeface="Arial" charset="0"/>
+                <a:ea typeface="Lucida Sans Unicode" pitchFamily="34" charset="0"/>
+                <a:cs typeface="Lucida Sans Unicode" pitchFamily="34" charset="0"/>
+              </a:defRPr>
+            </a:lvl9pPr>
+          </a:lstStyle>
+          <a:p>
+            <a:pPr eaLnBrk="1" hangingPunct="1"/>
+            <a:r>
+              <a:rPr lang="en-US" altLang="de-DE" smtClean="0">
+                <a:solidFill>
+                  <a:srgbClr val="000000"/>
+                </a:solidFill>
+                <a:latin typeface="Stafford" pitchFamily="2" charset="0"/>
+              </a:rPr>
+              <a:t>|  </a:t>
+            </a:r>
+          </a:p>
+        </p:txBody>
+      </p:sp>
+      <p:sp>
+        <p:nvSpPr>
+          <p:cNvPr id="53254" name="Foliennummernplatzhalter 5"/>
+          <p:cNvSpPr>
+            <a:spLocks noGrp="1"/>
+          </p:cNvSpPr>
+          <p:nvPr>
+            <p:ph type="sldNum" sz="quarter"/>
+          </p:nvPr>
+        </p:nvSpPr>
+        <p:spPr>
+          <a:noFill/>
+          <a:extLst>
+            <a:ext uri="{909E8E84-426E-40DD-AFC4-6F175D3DCCD1}">
+              <a14:hiddenFill xmlns:a14="http://schemas.microsoft.com/office/drawing/2010/main">
+                <a:solidFill>
+                  <a:srgbClr val="FFFFFF"/>
+                </a:solidFill>
+              </a14:hiddenFill>
+            </a:ext>
+            <a:ext uri="{91240B29-F687-4F45-9708-019B960494DF}">
+              <a14:hiddenLine xmlns:a14="http://schemas.microsoft.com/office/drawing/2010/main" w="9525">
+                <a:solidFill>
+                  <a:srgbClr val="000000"/>
+                </a:solidFill>
+                <a:miter lim="800000"/>
+                <a:headEnd/>
+                <a:tailEnd/>
+              </a14:hiddenLine>
+            </a:ext>
+          </a:extLst>
+        </p:spPr>
+        <p:txBody>
+          <a:bodyPr/>
+          <a:lstStyle>
+            <a:lvl1pPr defTabSz="463550" eaLnBrk="0" hangingPunct="0">
+              <a:tabLst>
+                <a:tab pos="746125" algn="l"/>
+              </a:tabLst>
+              <a:defRPr>
+                <a:solidFill>
+                  <a:schemeClr val="tx1"/>
+                </a:solidFill>
+                <a:latin typeface="Arial" charset="0"/>
+                <a:ea typeface="Lucida Sans Unicode" pitchFamily="34" charset="0"/>
+                <a:cs typeface="Lucida Sans Unicode" pitchFamily="34" charset="0"/>
+              </a:defRPr>
+            </a:lvl1pPr>
+            <a:lvl2pPr marL="742950" indent="-285750" defTabSz="463550" eaLnBrk="0" hangingPunct="0">
+              <a:tabLst>
+                <a:tab pos="746125" algn="l"/>
+              </a:tabLst>
+              <a:defRPr>
+                <a:solidFill>
+                  <a:schemeClr val="tx1"/>
+                </a:solidFill>
+                <a:latin typeface="Arial" charset="0"/>
+                <a:ea typeface="Lucida Sans Unicode" pitchFamily="34" charset="0"/>
+                <a:cs typeface="Lucida Sans Unicode" pitchFamily="34" charset="0"/>
+              </a:defRPr>
+            </a:lvl2pPr>
+            <a:lvl3pPr marL="1143000" indent="-228600" defTabSz="463550" eaLnBrk="0" hangingPunct="0">
+              <a:tabLst>
+                <a:tab pos="746125" algn="l"/>
+              </a:tabLst>
+              <a:defRPr>
+                <a:solidFill>
+                  <a:schemeClr val="tx1"/>
+                </a:solidFill>
+                <a:latin typeface="Arial" charset="0"/>
+                <a:ea typeface="Lucida Sans Unicode" pitchFamily="34" charset="0"/>
+                <a:cs typeface="Lucida Sans Unicode" pitchFamily="34" charset="0"/>
+              </a:defRPr>
+            </a:lvl3pPr>
+            <a:lvl4pPr marL="1600200" indent="-228600" defTabSz="463550" eaLnBrk="0" hangingPunct="0">
+              <a:tabLst>
+                <a:tab pos="746125" algn="l"/>
+              </a:tabLst>
+              <a:defRPr>
+                <a:solidFill>
+                  <a:schemeClr val="tx1"/>
+                </a:solidFill>
+                <a:latin typeface="Arial" charset="0"/>
+                <a:ea typeface="Lucida Sans Unicode" pitchFamily="34" charset="0"/>
+                <a:cs typeface="Lucida Sans Unicode" pitchFamily="34" charset="0"/>
+              </a:defRPr>
+            </a:lvl4pPr>
+            <a:lvl5pPr marL="2057400" indent="-228600" defTabSz="463550" eaLnBrk="0" hangingPunct="0">
+              <a:tabLst>
+                <a:tab pos="746125" algn="l"/>
+              </a:tabLst>
+              <a:defRPr>
+                <a:solidFill>
+                  <a:schemeClr val="tx1"/>
+                </a:solidFill>
+                <a:latin typeface="Arial" charset="0"/>
+                <a:ea typeface="Lucida Sans Unicode" pitchFamily="34" charset="0"/>
+                <a:cs typeface="Lucida Sans Unicode" pitchFamily="34" charset="0"/>
+              </a:defRPr>
+            </a:lvl5pPr>
+            <a:lvl6pPr marL="2514600" indent="-228600" algn="ctr" defTabSz="463550" eaLnBrk="0" fontAlgn="base" hangingPunct="0">
+              <a:lnSpc>
+                <a:spcPct val="93000"/>
+              </a:lnSpc>
+              <a:spcBef>
+                <a:spcPct val="0"/>
+              </a:spcBef>
+              <a:spcAft>
+                <a:spcPct val="0"/>
+              </a:spcAft>
+              <a:buClr>
+                <a:srgbClr val="000000"/>
+              </a:buClr>
+              <a:buSzPct val="100000"/>
+              <a:buFont typeface="Arial" charset="0"/>
+              <a:tabLst>
+                <a:tab pos="746125" algn="l"/>
+              </a:tabLst>
+              <a:defRPr>
+                <a:solidFill>
+                  <a:schemeClr val="tx1"/>
+                </a:solidFill>
+                <a:latin typeface="Arial" charset="0"/>
+                <a:ea typeface="Lucida Sans Unicode" pitchFamily="34" charset="0"/>
+                <a:cs typeface="Lucida Sans Unicode" pitchFamily="34" charset="0"/>
+              </a:defRPr>
+            </a:lvl6pPr>
+            <a:lvl7pPr marL="2971800" indent="-228600" algn="ctr" defTabSz="463550" eaLnBrk="0" fontAlgn="base" hangingPunct="0">
+              <a:lnSpc>
+                <a:spcPct val="93000"/>
+              </a:lnSpc>
+              <a:spcBef>
+                <a:spcPct val="0"/>
+              </a:spcBef>
+              <a:spcAft>
+                <a:spcPct val="0"/>
+              </a:spcAft>
+              <a:buClr>
+                <a:srgbClr val="000000"/>
+              </a:buClr>
+              <a:buSzPct val="100000"/>
+              <a:buFont typeface="Arial" charset="0"/>
+              <a:tabLst>
+                <a:tab pos="746125" algn="l"/>
+              </a:tabLst>
+              <a:defRPr>
+                <a:solidFill>
+                  <a:schemeClr val="tx1"/>
+                </a:solidFill>
+                <a:latin typeface="Arial" charset="0"/>
+                <a:ea typeface="Lucida Sans Unicode" pitchFamily="34" charset="0"/>
+                <a:cs typeface="Lucida Sans Unicode" pitchFamily="34" charset="0"/>
+              </a:defRPr>
+            </a:lvl7pPr>
+            <a:lvl8pPr marL="3429000" indent="-228600" algn="ctr" defTabSz="463550" eaLnBrk="0" fontAlgn="base" hangingPunct="0">
+              <a:lnSpc>
+                <a:spcPct val="93000"/>
+              </a:lnSpc>
+              <a:spcBef>
+                <a:spcPct val="0"/>
+              </a:spcBef>
+              <a:spcAft>
+                <a:spcPct val="0"/>
+              </a:spcAft>
+              <a:buClr>
+                <a:srgbClr val="000000"/>
+              </a:buClr>
+              <a:buSzPct val="100000"/>
+              <a:buFont typeface="Arial" charset="0"/>
+              <a:tabLst>
+                <a:tab pos="746125" algn="l"/>
+              </a:tabLst>
+              <a:defRPr>
+                <a:solidFill>
+                  <a:schemeClr val="tx1"/>
+                </a:solidFill>
+                <a:latin typeface="Arial" charset="0"/>
+                <a:ea typeface="Lucida Sans Unicode" pitchFamily="34" charset="0"/>
+                <a:cs typeface="Lucida Sans Unicode" pitchFamily="34" charset="0"/>
+              </a:defRPr>
+            </a:lvl8pPr>
+            <a:lvl9pPr marL="3886200" indent="-228600" algn="ctr" defTabSz="463550" eaLnBrk="0" fontAlgn="base" hangingPunct="0">
+              <a:lnSpc>
+                <a:spcPct val="93000"/>
+              </a:lnSpc>
+              <a:spcBef>
+                <a:spcPct val="0"/>
+              </a:spcBef>
+              <a:spcAft>
+                <a:spcPct val="0"/>
+              </a:spcAft>
+              <a:buClr>
+                <a:srgbClr val="000000"/>
+              </a:buClr>
+              <a:buSzPct val="100000"/>
+              <a:buFont typeface="Arial" charset="0"/>
+              <a:tabLst>
+                <a:tab pos="746125" algn="l"/>
+              </a:tabLst>
+              <a:defRPr>
+                <a:solidFill>
+                  <a:schemeClr val="tx1"/>
+                </a:solidFill>
+                <a:latin typeface="Arial" charset="0"/>
+                <a:ea typeface="Lucida Sans Unicode" pitchFamily="34" charset="0"/>
+                <a:cs typeface="Lucida Sans Unicode" pitchFamily="34" charset="0"/>
+              </a:defRPr>
+            </a:lvl9pPr>
+          </a:lstStyle>
+          <a:p>
+            <a:pPr eaLnBrk="1" hangingPunct="1"/>
+            <a:r>
+              <a:rPr lang="en-US" altLang="de-DE" smtClean="0">
+                <a:solidFill>
+                  <a:srgbClr val="000000"/>
+                </a:solidFill>
+                <a:latin typeface="Stafford" pitchFamily="2" charset="0"/>
+              </a:rPr>
+              <a:t>|  </a:t>
+            </a:r>
+            <a:fld id="{6775A062-1A8A-4084-8B81-E33BA407A859}" type="slidenum">
+              <a:rPr lang="en-US" altLang="de-DE" smtClean="0">
+                <a:solidFill>
+                  <a:srgbClr val="000000"/>
+                </a:solidFill>
+                <a:latin typeface="Stafford" pitchFamily="2" charset="0"/>
+              </a:rPr>
+              <a:pPr eaLnBrk="1" hangingPunct="1"/>
+              <a:t>7</a:t>
+            </a:fld>
+            <a:endParaRPr lang="en-US" altLang="de-DE" smtClean="0">
+              <a:solidFill>
+                <a:srgbClr val="000000"/>
+              </a:solidFill>
+              <a:latin typeface="Stafford" pitchFamily="2" charset="0"/>
+            </a:endParaRPr>
+          </a:p>
+        </p:txBody>
+      </p:sp>
+    </p:spTree>
+    <p:extLst>
+      <p:ext uri="{BB962C8B-B14F-4D97-AF65-F5344CB8AC3E}">
+        <p14:creationId xmlns:p14="http://schemas.microsoft.com/office/powerpoint/2010/main" val="3549373985"/>
+      </p:ext>
+    </p:extLst>
+  </p:cSld>
+  <p:clrMapOvr>
+    <a:masterClrMapping/>
+  </p:clrMapOvr>
+</p:notes>
+</file>
+
 <file path=ppt/slideLayouts/slideLayout1.xml><?xml version="1.0" encoding="utf-8"?>
 <p:sldLayout xmlns:a="http://schemas.openxmlformats.org/drawingml/2006/main" xmlns:r="http://schemas.openxmlformats.org/officeDocument/2006/relationships" xmlns:p="http://schemas.openxmlformats.org/presentationml/2006/main" showMasterSp="0" type="title" preserve="1">
   <p:cSld name="Titelfolie">
@@ -7350,7 +9069,7 @@
           <a:graphicData uri="http://schemas.openxmlformats.org/presentationml/2006/ole">
             <mc:AlternateContent xmlns:mc="http://schemas.openxmlformats.org/markup-compatibility/2006">
               <mc:Choice xmlns:v="urn:schemas-microsoft-com:vml" Requires="v">
-                <p:oleObj spid="_x0000_s1929" r:id="rId16" imgW="1038370" imgH="980952" progId="">
+                <p:oleObj spid="_x0000_s1935" r:id="rId16" imgW="1038370" imgH="980952" progId="">
                   <p:embed/>
                 </p:oleObj>
               </mc:Choice>
@@ -7788,7 +9507,7 @@
                 </a:lnSpc>
                 <a:defRPr/>
               </a:pPr>
-              <a:t>02.09.2016</a:t>
+              <a:t>05.09.2016</a:t>
             </a:fld>
             <a:r>
               <a:rPr lang="en-GB" altLang="de-DE" sz="1000" smtClean="0">
@@ -9414,16 +11133,17 @@
             </a:r>
             <a:r>
               <a:rPr lang="en-US" dirty="0" smtClean="0"/>
-              <a:t> auf C++11 </a:t>
-            </a:r>
-            <a:r>
-              <a:rPr lang="en-US" dirty="0" err="1" smtClean="0"/>
-              <a:t>legen</a:t>
-            </a:r>
-            <a:r>
-              <a:rPr lang="en-US" dirty="0" smtClean="0"/>
-              <a:t>?</a:t>
-            </a:r>
+              <a:t> auf </a:t>
+            </a:r>
+            <a:r>
+              <a:rPr lang="en-US" smtClean="0"/>
+              <a:t>C</a:t>
+            </a:r>
+            <a:r>
+              <a:rPr lang="en-US" smtClean="0"/>
+              <a:t>++(11) legen (= weniger Fokus auf C)?</a:t>
+            </a:r>
+            <a:endParaRPr lang="en-US" dirty="0" smtClean="0"/>
           </a:p>
           <a:p>
             <a:pPr marL="692150" lvl="1" indent="-342900">
@@ -9616,11 +11336,15 @@
           <a:lstStyle/>
           <a:p>
             <a:r>
+              <a:rPr lang="de-DE" altLang="de-DE"/>
+              <a:t>Tag 3:</a:t>
+            </a:r>
+            <a:r>
               <a:rPr lang="de-DE" altLang="de-DE" smtClean="0">
                 <a:latin typeface="Consolas" panose="020B0609020204030204" pitchFamily="49" charset="0"/>
                 <a:cs typeface="Consolas" panose="020B0609020204030204" pitchFamily="49" charset="0"/>
               </a:rPr>
-              <a:t>Tag 3: *</a:t>
+              <a:t> *</a:t>
             </a:r>
             <a:r>
               <a:rPr lang="de-DE" altLang="de-DE" smtClean="0"/>
@@ -9790,7 +11514,7 @@
       </p:grpSpPr>
       <p:sp>
         <p:nvSpPr>
-          <p:cNvPr id="2" name="Titel 1"/>
+          <p:cNvPr id="15362" name="Titel 1"/>
           <p:cNvSpPr>
             <a:spLocks noGrp="1"/>
           </p:cNvSpPr>
@@ -9804,23 +11528,96 @@
           <a:lstStyle/>
           <a:p>
             <a:r>
-              <a:rPr lang="en-US" smtClean="0"/>
-              <a:t>Folien von 2015</a:t>
-            </a:r>
-            <a:endParaRPr lang="en-US"/>
+              <a:rPr lang="de-DE" altLang="de-DE" smtClean="0"/>
+              <a:t>Tag 3:</a:t>
+            </a:r>
+            <a:r>
+              <a:rPr lang="de-DE" altLang="de-DE" smtClean="0"/>
+              <a:t> Nachmittag</a:t>
+            </a:r>
+            <a:endParaRPr lang="de-DE" altLang="de-DE" dirty="0" smtClean="0"/>
+          </a:p>
+        </p:txBody>
+      </p:sp>
+      <p:sp>
+        <p:nvSpPr>
+          <p:cNvPr id="2" name="Inhaltsplatzhalter 1"/>
+          <p:cNvSpPr>
+            <a:spLocks noGrp="1"/>
+          </p:cNvSpPr>
+          <p:nvPr>
+            <p:ph idx="1"/>
+          </p:nvPr>
+        </p:nvSpPr>
+        <p:spPr/>
+        <p:txBody>
+          <a:bodyPr/>
+          <a:lstStyle/>
+          <a:p>
+            <a:r>
+              <a:rPr lang="de-DE" altLang="de-DE" b="1" smtClean="0"/>
+              <a:t>Übrigens</a:t>
+            </a:r>
+            <a:r>
+              <a:rPr lang="de-DE" altLang="de-DE" smtClean="0"/>
+              <a:t>: Nicht vergessen, hin und wieder mal zu pullen</a:t>
+            </a:r>
+          </a:p>
+          <a:p>
+            <a:pPr marL="342900" indent="-342900">
+              <a:buFontTx/>
+              <a:buChar char="-"/>
+            </a:pPr>
+            <a:r>
+              <a:rPr lang="de-DE" altLang="de-DE" smtClean="0"/>
+              <a:t>Beide Repositories</a:t>
+            </a:r>
+          </a:p>
+          <a:p>
+            <a:pPr marL="342900" indent="-342900">
+              <a:buFontTx/>
+              <a:buChar char="-"/>
+            </a:pPr>
+            <a:r>
+              <a:rPr lang="de-DE" b="1" smtClean="0"/>
+              <a:t>Eher </a:t>
+            </a:r>
+            <a:r>
+              <a:rPr lang="de-DE" b="1"/>
+              <a:t>kleine Bugfixes.</a:t>
+            </a:r>
+            <a:endParaRPr lang="en-US" b="1"/>
+          </a:p>
+          <a:p>
+            <a:pPr marL="342900" indent="-342900">
+              <a:buFontTx/>
+              <a:buChar char="-"/>
+            </a:pPr>
+            <a:r>
+              <a:rPr lang="de-DE" smtClean="0"/>
+              <a:t>Foliennummerierung sollte stabil bleiben</a:t>
+            </a:r>
           </a:p>
         </p:txBody>
       </p:sp>
     </p:spTree>
     <p:extLst>
       <p:ext uri="{BB962C8B-B14F-4D97-AF65-F5344CB8AC3E}">
-        <p14:creationId xmlns:p14="http://schemas.microsoft.com/office/powerpoint/2010/main" val="409010217"/>
+        <p14:creationId xmlns:p14="http://schemas.microsoft.com/office/powerpoint/2010/main" val="1909812110"/>
       </p:ext>
     </p:extLst>
   </p:cSld>
   <p:clrMapOvr>
     <a:masterClrMapping/>
   </p:clrMapOvr>
+  <mc:AlternateContent xmlns:mc="http://schemas.openxmlformats.org/markup-compatibility/2006" xmlns:p14="http://schemas.microsoft.com/office/powerpoint/2010/main">
+    <mc:Choice Requires="p14">
+      <p:transition spd="slow" p14:dur="2000"/>
+    </mc:Choice>
+    <mc:Fallback xmlns="">
+      <p:transition spd="slow"/>
+    </mc:Fallback>
+  </mc:AlternateContent>
   <p:timing>
     <p:tnLst>
       <p:par>
@@ -9850,7 +11647,7 @@
       </p:grpSpPr>
       <p:sp>
         <p:nvSpPr>
-          <p:cNvPr id="7" name="Titel 6"/>
+          <p:cNvPr id="15362" name="Titel 1"/>
           <p:cNvSpPr>
             <a:spLocks noGrp="1"/>
           </p:cNvSpPr>
@@ -9864,24 +11661,20 @@
           <a:lstStyle/>
           <a:p>
             <a:r>
-              <a:rPr lang="en-US" dirty="0" smtClean="0"/>
-              <a:t>Tag 2: </a:t>
-            </a:r>
-            <a:r>
-              <a:rPr lang="en-US" dirty="0" err="1" smtClean="0"/>
-              <a:t>Rückschau</a:t>
-            </a:r>
-            <a:r>
-              <a:rPr lang="en-US" dirty="0" smtClean="0"/>
-              <a:t> und Warm Up</a:t>
-            </a:r>
-            <a:endParaRPr lang="en-US" dirty="0"/>
+              <a:rPr lang="de-DE" altLang="de-DE" smtClean="0"/>
+              <a:t>Tag 4:</a:t>
+            </a:r>
+            <a:r>
+              <a:rPr lang="de-DE" altLang="de-DE" smtClean="0"/>
+              <a:t> Rückschau und Aufwärmübungen</a:t>
+            </a:r>
+            <a:endParaRPr lang="de-DE" altLang="de-DE" dirty="0" smtClean="0"/>
           </a:p>
         </p:txBody>
       </p:sp>
       <p:sp>
         <p:nvSpPr>
-          <p:cNvPr id="8" name="Inhaltsplatzhalter 7"/>
+          <p:cNvPr id="2" name="Inhaltsplatzhalter 1"/>
           <p:cNvSpPr>
             <a:spLocks noGrp="1"/>
           </p:cNvSpPr>
@@ -9894,137 +11687,24 @@
           <a:bodyPr/>
           <a:lstStyle/>
           <a:p>
+            <a:r>
+              <a:rPr lang="de-DE" altLang="de-DE" b="1" smtClean="0"/>
+              <a:t>Übrigens</a:t>
+            </a:r>
+            <a:r>
+              <a:rPr lang="de-DE" altLang="de-DE" smtClean="0"/>
+              <a:t>: Nicht vergessen, hin und wieder mal zu pullen</a:t>
+            </a:r>
+          </a:p>
+          <a:p>
             <a:pPr marL="342900" indent="-342900">
               <a:buFontTx/>
               <a:buChar char="-"/>
             </a:pPr>
             <a:r>
-              <a:rPr lang="en-US" b="1" dirty="0" smtClean="0"/>
-              <a:t>Feedback</a:t>
-            </a:r>
-            <a:r>
-              <a:rPr lang="en-US" dirty="0" smtClean="0"/>
-              <a:t> </a:t>
-            </a:r>
-            <a:r>
-              <a:rPr lang="en-US" dirty="0" err="1" smtClean="0"/>
-              <a:t>zur</a:t>
-            </a:r>
-            <a:r>
-              <a:rPr lang="en-US" dirty="0" smtClean="0"/>
-              <a:t> </a:t>
-            </a:r>
-            <a:r>
-              <a:rPr lang="en-US" dirty="0" err="1" smtClean="0"/>
-              <a:t>ersten</a:t>
-            </a:r>
-            <a:r>
-              <a:rPr lang="en-US" dirty="0" smtClean="0"/>
-              <a:t> </a:t>
-            </a:r>
-            <a:r>
-              <a:rPr lang="en-US" dirty="0" err="1" smtClean="0"/>
-              <a:t>Übung</a:t>
-            </a:r>
-            <a:r>
-              <a:rPr lang="en-US" dirty="0" smtClean="0"/>
-              <a:t>? </a:t>
-            </a:r>
-          </a:p>
-          <a:p>
-            <a:pPr marL="692150" lvl="1" indent="-342900">
-              <a:buFontTx/>
-              <a:buChar char="-"/>
-            </a:pPr>
-            <a:r>
-              <a:rPr lang="en-US" dirty="0" smtClean="0"/>
-              <a:t>Was war gut?</a:t>
-            </a:r>
-          </a:p>
-          <a:p>
-            <a:pPr marL="692150" lvl="1" indent="-342900">
-              <a:buFontTx/>
-              <a:buChar char="-"/>
-            </a:pPr>
-            <a:r>
-              <a:rPr lang="en-US" dirty="0"/>
-              <a:t>W</a:t>
-            </a:r>
-            <a:r>
-              <a:rPr lang="en-US" dirty="0" smtClean="0"/>
-              <a:t>as </a:t>
-            </a:r>
-            <a:r>
-              <a:rPr lang="en-US" dirty="0" err="1" smtClean="0"/>
-              <a:t>können</a:t>
-            </a:r>
-            <a:r>
-              <a:rPr lang="en-US" dirty="0" smtClean="0"/>
-              <a:t> </a:t>
-            </a:r>
-            <a:r>
-              <a:rPr lang="en-US" dirty="0" err="1" smtClean="0"/>
-              <a:t>wir</a:t>
-            </a:r>
-            <a:r>
-              <a:rPr lang="en-US" dirty="0" smtClean="0"/>
-              <a:t> </a:t>
-            </a:r>
-            <a:r>
-              <a:rPr lang="en-US" dirty="0" err="1" smtClean="0"/>
-              <a:t>noch</a:t>
-            </a:r>
-            <a:r>
-              <a:rPr lang="en-US" dirty="0" smtClean="0"/>
-              <a:t> </a:t>
-            </a:r>
-            <a:r>
-              <a:rPr lang="en-US" dirty="0" err="1" smtClean="0"/>
-              <a:t>verbessern</a:t>
-            </a:r>
-            <a:r>
-              <a:rPr lang="en-US" dirty="0" smtClean="0"/>
-              <a:t>?</a:t>
-            </a:r>
-          </a:p>
-          <a:p>
-            <a:pPr marL="692150" lvl="1" indent="-342900">
-              <a:buFontTx/>
-              <a:buChar char="-"/>
-            </a:pPr>
-            <a:r>
-              <a:rPr lang="en-US" dirty="0" err="1" smtClean="0"/>
-              <a:t>Bitte</a:t>
-            </a:r>
-            <a:r>
-              <a:rPr lang="en-US" dirty="0" smtClean="0"/>
-              <a:t> den </a:t>
-            </a:r>
-            <a:r>
-              <a:rPr lang="en-US" dirty="0" err="1" smtClean="0"/>
-              <a:t>Fortschritt</a:t>
-            </a:r>
-            <a:r>
-              <a:rPr lang="en-US" dirty="0" smtClean="0"/>
-              <a:t> auf der </a:t>
-            </a:r>
-            <a:r>
-              <a:rPr lang="en-US" dirty="0" err="1" smtClean="0"/>
-              <a:t>Unterschriftenliste</a:t>
-            </a:r>
-            <a:r>
-              <a:rPr lang="en-US" dirty="0"/>
-              <a:t> </a:t>
-            </a:r>
-            <a:r>
-              <a:rPr lang="en-US" dirty="0" smtClean="0"/>
-              <a:t>per Stich </a:t>
-            </a:r>
-            <a:r>
-              <a:rPr lang="en-US" dirty="0" err="1" smtClean="0"/>
-              <a:t>markieren</a:t>
-            </a:r>
-            <a:endParaRPr lang="en-US" dirty="0" smtClean="0"/>
+              <a:rPr lang="de-DE" altLang="de-DE" smtClean="0"/>
+              <a:t>Beide Repositories</a:t>
+            </a:r>
           </a:p>
           <a:p>
             <a:pPr marL="342900" indent="-342900">
@@ -10032,22 +11712,14 @@
               <a:buChar char="-"/>
             </a:pPr>
             <a:r>
-              <a:rPr lang="en-US" b="1" dirty="0" err="1" smtClean="0"/>
-              <a:t>Aktueller</a:t>
-            </a:r>
-            <a:r>
-              <a:rPr lang="en-US" b="1" dirty="0" smtClean="0"/>
-              <a:t> Stand </a:t>
-            </a:r>
-            <a:r>
-              <a:rPr lang="en-US" dirty="0" smtClean="0"/>
-              <a:t>der </a:t>
-            </a:r>
-            <a:r>
-              <a:rPr lang="en-US" dirty="0" err="1" smtClean="0"/>
-              <a:t>Übungsbearbeitung</a:t>
-            </a:r>
-            <a:endParaRPr lang="en-US" dirty="0" smtClean="0"/>
+              <a:rPr lang="de-DE" b="1" smtClean="0"/>
+              <a:t>Eher </a:t>
+            </a:r>
+            <a:r>
+              <a:rPr lang="de-DE" b="1"/>
+              <a:t>kleine Bugfixes.</a:t>
+            </a:r>
+            <a:endParaRPr lang="en-US" b="1"/>
           </a:p>
           <a:p>
             <a:pPr marL="342900" indent="-342900">
@@ -10055,1418 +11727,36 @@
               <a:buChar char="-"/>
             </a:pPr>
             <a:r>
-              <a:rPr lang="en-US" dirty="0" err="1" smtClean="0"/>
-              <a:t>Mindestens</a:t>
-            </a:r>
-            <a:r>
-              <a:rPr lang="en-US" dirty="0" smtClean="0"/>
-              <a:t> </a:t>
-            </a:r>
-            <a:r>
-              <a:rPr lang="en-US" b="1" dirty="0" err="1" smtClean="0"/>
-              <a:t>einmal</a:t>
-            </a:r>
-            <a:r>
-              <a:rPr lang="en-US" b="1" dirty="0" smtClean="0"/>
-              <a:t> am Tag</a:t>
-            </a:r>
-            <a:r>
-              <a:rPr lang="en-US" dirty="0" smtClean="0"/>
-              <a:t>…</a:t>
-            </a:r>
-          </a:p>
-          <a:p>
-            <a:pPr marL="692150" lvl="1" indent="-342900">
-              <a:buFontTx/>
-              <a:buChar char="-"/>
-            </a:pPr>
-            <a:r>
-              <a:rPr lang="en-US" dirty="0" smtClean="0"/>
-              <a:t>… </a:t>
-            </a:r>
-            <a:r>
-              <a:rPr lang="en-US" dirty="0" err="1" smtClean="0"/>
-              <a:t>Übungsrepository</a:t>
-            </a:r>
-            <a:r>
-              <a:rPr lang="en-US" dirty="0" smtClean="0"/>
-              <a:t> </a:t>
-            </a:r>
-            <a:r>
-              <a:rPr lang="en-US" dirty="0" err="1" smtClean="0"/>
-              <a:t>pullen</a:t>
-            </a:r>
-            <a:endParaRPr lang="en-US" dirty="0"/>
-          </a:p>
-          <a:p>
-            <a:pPr marL="692150" lvl="1" indent="-342900">
-              <a:buFontTx/>
-              <a:buChar char="-"/>
-            </a:pPr>
-            <a:r>
-              <a:rPr lang="en-US" dirty="0" smtClean="0"/>
-              <a:t>… ins Moodle </a:t>
-            </a:r>
-            <a:r>
-              <a:rPr lang="en-US" dirty="0" err="1" smtClean="0"/>
-              <a:t>schauen</a:t>
-            </a:r>
-            <a:r>
-              <a:rPr lang="en-US" dirty="0" smtClean="0"/>
-              <a:t> </a:t>
-            </a:r>
-            <a:r>
-              <a:rPr lang="en-US" dirty="0" smtClean="0">
-                <a:sym typeface="Wingdings" panose="05000000000000000000" pitchFamily="2" charset="2"/>
-              </a:rPr>
-              <a:t></a:t>
-            </a:r>
-            <a:r>
-              <a:rPr lang="en-US" dirty="0" err="1" smtClean="0">
-                <a:sym typeface="Wingdings" panose="05000000000000000000" pitchFamily="2" charset="2"/>
-              </a:rPr>
-              <a:t>Tipps</a:t>
-            </a:r>
-            <a:r>
-              <a:rPr lang="en-US" dirty="0" smtClean="0">
-                <a:sym typeface="Wingdings" panose="05000000000000000000" pitchFamily="2" charset="2"/>
-              </a:rPr>
-              <a:t> </a:t>
-            </a:r>
-            <a:r>
-              <a:rPr lang="en-US" smtClean="0">
-                <a:sym typeface="Wingdings" panose="05000000000000000000" pitchFamily="2" charset="2"/>
-              </a:rPr>
-              <a:t>und Hinweise</a:t>
-            </a:r>
-            <a:endParaRPr lang="en-US" dirty="0" smtClean="0"/>
+              <a:rPr lang="de-DE" smtClean="0"/>
+              <a:t>Foliennummerierung sollte stabil bleiben</a:t>
+            </a:r>
           </a:p>
         </p:txBody>
       </p:sp>
     </p:spTree>
     <p:extLst>
       <p:ext uri="{BB962C8B-B14F-4D97-AF65-F5344CB8AC3E}">
-        <p14:creationId xmlns:p14="http://schemas.microsoft.com/office/powerpoint/2010/main" val="1442479412"/>
+        <p14:creationId xmlns:p14="http://schemas.microsoft.com/office/powerpoint/2010/main" val="1170982419"/>
       </p:ext>
     </p:extLst>
   </p:cSld>
   <p:clrMapOvr>
     <a:masterClrMapping/>
   </p:clrMapOvr>
+  <mc:AlternateContent xmlns:mc="http://schemas.openxmlformats.org/markup-compatibility/2006" xmlns:p14="http://schemas.microsoft.com/office/powerpoint/2010/main">
+    <mc:Choice Requires="p14">
+      <p:transition spd="slow" p14:dur="2000"/>
+    </mc:Choice>
+    <mc:Fallback xmlns="">
+      <p:transition spd="slow"/>
+    </mc:Fallback>
+  </mc:AlternateContent>
   <p:timing>
     <p:tnLst>
       <p:par>
-        <p:cTn id="1" dur="indefinite" restart="never" nodeType="tmRoot">
-          <p:childTnLst>
-            <p:seq concurrent="1" nextAc="seek">
-              <p:cTn id="2" dur="indefinite" nodeType="mainSeq">
-                <p:childTnLst>
-                  <p:par>
-                    <p:cTn id="3" fill="hold">
-                      <p:stCondLst>
-                        <p:cond delay="indefinite"/>
-                      </p:stCondLst>
-                      <p:childTnLst>
-                        <p:par>
-                          <p:cTn id="4" fill="hold">
-                            <p:stCondLst>
-                              <p:cond delay="0"/>
-                            </p:stCondLst>
-                            <p:childTnLst>
-                              <p:par>
-                                <p:cTn id="5" presetID="1" presetClass="entr" presetSubtype="0" fill="hold" nodeType="clickEffect">
-                                  <p:stCondLst>
-                                    <p:cond delay="0"/>
-                                  </p:stCondLst>
-                                  <p:childTnLst>
-                                    <p:set>
-                                      <p:cBhvr>
-                                        <p:cTn id="6" dur="1" fill="hold">
-                                          <p:stCondLst>
-                                            <p:cond delay="0"/>
-                                          </p:stCondLst>
-                                        </p:cTn>
-                                        <p:tgtEl>
-                                          <p:spTgt spid="8">
-                                            <p:txEl>
-                                              <p:pRg st="0" end="0"/>
-                                            </p:txEl>
-                                          </p:spTgt>
-                                        </p:tgtEl>
-                                        <p:attrNameLst>
-                                          <p:attrName>style.visibility</p:attrName>
-                                        </p:attrNameLst>
-                                      </p:cBhvr>
-                                      <p:to>
-                                        <p:strVal val="visible"/>
-                                      </p:to>
-                                    </p:set>
-                                  </p:childTnLst>
-                                </p:cTn>
-                              </p:par>
-                              <p:par>
-                                <p:cTn id="7" presetID="1" presetClass="entr" presetSubtype="0" fill="hold" nodeType="withEffect">
-                                  <p:stCondLst>
-                                    <p:cond delay="0"/>
-                                  </p:stCondLst>
-                                  <p:childTnLst>
-                                    <p:set>
-                                      <p:cBhvr>
-                                        <p:cTn id="8" dur="1" fill="hold">
-                                          <p:stCondLst>
-                                            <p:cond delay="0"/>
-                                          </p:stCondLst>
-                                        </p:cTn>
-                                        <p:tgtEl>
-                                          <p:spTgt spid="8">
-                                            <p:txEl>
-                                              <p:pRg st="1" end="1"/>
-                                            </p:txEl>
-                                          </p:spTgt>
-                                        </p:tgtEl>
-                                        <p:attrNameLst>
-                                          <p:attrName>style.visibility</p:attrName>
-                                        </p:attrNameLst>
-                                      </p:cBhvr>
-                                      <p:to>
-                                        <p:strVal val="visible"/>
-                                      </p:to>
-                                    </p:set>
-                                  </p:childTnLst>
-                                </p:cTn>
-                              </p:par>
-                              <p:par>
-                                <p:cTn id="9" presetID="1" presetClass="entr" presetSubtype="0" fill="hold" nodeType="withEffect">
-                                  <p:stCondLst>
-                                    <p:cond delay="0"/>
-                                  </p:stCondLst>
-                                  <p:childTnLst>
-                                    <p:set>
-                                      <p:cBhvr>
-                                        <p:cTn id="10" dur="1" fill="hold">
-                                          <p:stCondLst>
-                                            <p:cond delay="0"/>
-                                          </p:stCondLst>
-                                        </p:cTn>
-                                        <p:tgtEl>
-                                          <p:spTgt spid="8">
-                                            <p:txEl>
-                                              <p:pRg st="2" end="2"/>
-                                            </p:txEl>
-                                          </p:spTgt>
-                                        </p:tgtEl>
-                                        <p:attrNameLst>
-                                          <p:attrName>style.visibility</p:attrName>
-                                        </p:attrNameLst>
-                                      </p:cBhvr>
-                                      <p:to>
-                                        <p:strVal val="visible"/>
-                                      </p:to>
-                                    </p:set>
-                                  </p:childTnLst>
-                                </p:cTn>
-                              </p:par>
-                              <p:par>
-                                <p:cTn id="11" presetID="1" presetClass="entr" presetSubtype="0" fill="hold" nodeType="withEffect">
-                                  <p:stCondLst>
-                                    <p:cond delay="0"/>
-                                  </p:stCondLst>
-                                  <p:childTnLst>
-                                    <p:set>
-                                      <p:cBhvr>
-                                        <p:cTn id="12" dur="1" fill="hold">
-                                          <p:stCondLst>
-                                            <p:cond delay="0"/>
-                                          </p:stCondLst>
-                                        </p:cTn>
-                                        <p:tgtEl>
-                                          <p:spTgt spid="8">
-                                            <p:txEl>
-                                              <p:pRg st="3" end="3"/>
-                                            </p:txEl>
-                                          </p:spTgt>
-                                        </p:tgtEl>
-                                        <p:attrNameLst>
-                                          <p:attrName>style.visibility</p:attrName>
-                                        </p:attrNameLst>
-                                      </p:cBhvr>
-                                      <p:to>
-                                        <p:strVal val="visible"/>
-                                      </p:to>
-                                    </p:set>
-                                  </p:childTnLst>
-                                </p:cTn>
-                              </p:par>
-                            </p:childTnLst>
-                          </p:cTn>
-                        </p:par>
-                      </p:childTnLst>
-                    </p:cTn>
-                  </p:par>
-                  <p:par>
-                    <p:cTn id="13" fill="hold">
-                      <p:stCondLst>
-                        <p:cond delay="indefinite"/>
-                      </p:stCondLst>
-                      <p:childTnLst>
-                        <p:par>
-                          <p:cTn id="14" fill="hold">
-                            <p:stCondLst>
-                              <p:cond delay="0"/>
-                            </p:stCondLst>
-                            <p:childTnLst>
-                              <p:par>
-                                <p:cTn id="15" presetID="1" presetClass="entr" presetSubtype="0" fill="hold" nodeType="clickEffect">
-                                  <p:stCondLst>
-                                    <p:cond delay="0"/>
-                                  </p:stCondLst>
-                                  <p:childTnLst>
-                                    <p:set>
-                                      <p:cBhvr>
-                                        <p:cTn id="16" dur="1" fill="hold">
-                                          <p:stCondLst>
-                                            <p:cond delay="0"/>
-                                          </p:stCondLst>
-                                        </p:cTn>
-                                        <p:tgtEl>
-                                          <p:spTgt spid="8">
-                                            <p:txEl>
-                                              <p:pRg st="4" end="4"/>
-                                            </p:txEl>
-                                          </p:spTgt>
-                                        </p:tgtEl>
-                                        <p:attrNameLst>
-                                          <p:attrName>style.visibility</p:attrName>
-                                        </p:attrNameLst>
-                                      </p:cBhvr>
-                                      <p:to>
-                                        <p:strVal val="visible"/>
-                                      </p:to>
-                                    </p:set>
-                                  </p:childTnLst>
-                                </p:cTn>
-                              </p:par>
-                            </p:childTnLst>
-                          </p:cTn>
-                        </p:par>
-                      </p:childTnLst>
-                    </p:cTn>
-                  </p:par>
-                  <p:par>
-                    <p:cTn id="17" fill="hold">
-                      <p:stCondLst>
-                        <p:cond delay="indefinite"/>
-                      </p:stCondLst>
-                      <p:childTnLst>
-                        <p:par>
-                          <p:cTn id="18" fill="hold">
-                            <p:stCondLst>
-                              <p:cond delay="0"/>
-                            </p:stCondLst>
-                            <p:childTnLst>
-                              <p:par>
-                                <p:cTn id="19" presetID="1" presetClass="entr" presetSubtype="0" fill="hold" nodeType="clickEffect">
-                                  <p:stCondLst>
-                                    <p:cond delay="0"/>
-                                  </p:stCondLst>
-                                  <p:childTnLst>
-                                    <p:set>
-                                      <p:cBhvr>
-                                        <p:cTn id="20" dur="1" fill="hold">
-                                          <p:stCondLst>
-                                            <p:cond delay="0"/>
-                                          </p:stCondLst>
-                                        </p:cTn>
-                                        <p:tgtEl>
-                                          <p:spTgt spid="8">
-                                            <p:txEl>
-                                              <p:pRg st="5" end="5"/>
-                                            </p:txEl>
-                                          </p:spTgt>
-                                        </p:tgtEl>
-                                        <p:attrNameLst>
-                                          <p:attrName>style.visibility</p:attrName>
-                                        </p:attrNameLst>
-                                      </p:cBhvr>
-                                      <p:to>
-                                        <p:strVal val="visible"/>
-                                      </p:to>
-                                    </p:set>
-                                  </p:childTnLst>
-                                </p:cTn>
-                              </p:par>
-                              <p:par>
-                                <p:cTn id="21" presetID="1" presetClass="entr" presetSubtype="0" fill="hold" nodeType="withEffect">
-                                  <p:stCondLst>
-                                    <p:cond delay="0"/>
-                                  </p:stCondLst>
-                                  <p:childTnLst>
-                                    <p:set>
-                                      <p:cBhvr>
-                                        <p:cTn id="22" dur="1" fill="hold">
-                                          <p:stCondLst>
-                                            <p:cond delay="0"/>
-                                          </p:stCondLst>
-                                        </p:cTn>
-                                        <p:tgtEl>
-                                          <p:spTgt spid="8">
-                                            <p:txEl>
-                                              <p:pRg st="6" end="6"/>
-                                            </p:txEl>
-                                          </p:spTgt>
-                                        </p:tgtEl>
-                                        <p:attrNameLst>
-                                          <p:attrName>style.visibility</p:attrName>
-                                        </p:attrNameLst>
-                                      </p:cBhvr>
-                                      <p:to>
-                                        <p:strVal val="visible"/>
-                                      </p:to>
-                                    </p:set>
-                                  </p:childTnLst>
-                                </p:cTn>
-                              </p:par>
-                              <p:par>
-                                <p:cTn id="23" presetID="1" presetClass="entr" presetSubtype="0" fill="hold" nodeType="withEffect">
-                                  <p:stCondLst>
-                                    <p:cond delay="0"/>
-                                  </p:stCondLst>
-                                  <p:childTnLst>
-                                    <p:set>
-                                      <p:cBhvr>
-                                        <p:cTn id="24" dur="1" fill="hold">
-                                          <p:stCondLst>
-                                            <p:cond delay="0"/>
-                                          </p:stCondLst>
-                                        </p:cTn>
-                                        <p:tgtEl>
-                                          <p:spTgt spid="8">
-                                            <p:txEl>
-                                              <p:pRg st="7" end="7"/>
-                                            </p:txEl>
-                                          </p:spTgt>
-                                        </p:tgtEl>
-                                        <p:attrNameLst>
-                                          <p:attrName>style.visibility</p:attrName>
-                                        </p:attrNameLst>
-                                      </p:cBhvr>
-                                      <p:to>
-                                        <p:strVal val="visible"/>
-                                      </p:to>
-                                    </p:set>
-                                  </p:childTnLst>
-                                </p:cTn>
-                              </p:par>
-                            </p:childTnLst>
-                          </p:cTn>
-                        </p:par>
-                      </p:childTnLst>
-                    </p:cTn>
-                  </p:par>
-                </p:childTnLst>
-              </p:cTn>
-              <p:prevCondLst>
-                <p:cond evt="onPrev" delay="0">
-                  <p:tgtEl>
-                    <p:sldTgt/>
-                  </p:tgtEl>
-                </p:cond>
-              </p:prevCondLst>
-              <p:nextCondLst>
-                <p:cond evt="onNext" delay="0">
-                  <p:tgtEl>
-                    <p:sldTgt/>
-                  </p:tgtEl>
-                </p:cond>
-              </p:nextCondLst>
-            </p:seq>
-          </p:childTnLst>
-        </p:cTn>
+        <p:cTn id="1" dur="indefinite" restart="never" nodeType="tmRoot"/>
       </p:par>
     </p:tnLst>
-  </p:timing>
-</p:sld>
-</file>
-
-<file path=ppt/slides/slide8.xml><?xml version="1.0" encoding="utf-8"?>
-<p:sld xmlns:a="http://schemas.openxmlformats.org/drawingml/2006/main" xmlns:r="http://schemas.openxmlformats.org/officeDocument/2006/relationships" xmlns:p="http://schemas.openxmlformats.org/presentationml/2006/main">
-  <p:cSld>
-    <p:spTree>
-      <p:nvGrpSpPr>
-        <p:cNvPr id="1" name=""/>
-        <p:cNvGrpSpPr/>
-        <p:nvPr/>
-      </p:nvGrpSpPr>
-      <p:grpSpPr>
-        <a:xfrm>
-          <a:off x="0" y="0"/>
-          <a:ext cx="0" cy="0"/>
-          <a:chOff x="0" y="0"/>
-          <a:chExt cx="0" cy="0"/>
-        </a:xfrm>
-      </p:grpSpPr>
-      <p:sp>
-        <p:nvSpPr>
-          <p:cNvPr id="2" name="Titel 1"/>
-          <p:cNvSpPr>
-            <a:spLocks noGrp="1"/>
-          </p:cNvSpPr>
-          <p:nvPr>
-            <p:ph type="title"/>
-          </p:nvPr>
-        </p:nvSpPr>
-        <p:spPr/>
-        <p:txBody>
-          <a:bodyPr/>
-          <a:lstStyle/>
-          <a:p>
-            <a:r>
-              <a:rPr lang="en-US" dirty="0" smtClean="0"/>
-              <a:t>Tag 3: </a:t>
-            </a:r>
-            <a:r>
-              <a:rPr lang="en-US" dirty="0" err="1" smtClean="0"/>
-              <a:t>Rückschau</a:t>
-            </a:r>
-            <a:r>
-              <a:rPr lang="en-US" dirty="0" smtClean="0"/>
-              <a:t> und Warm Up </a:t>
-            </a:r>
-            <a:endParaRPr lang="en-US" dirty="0"/>
-          </a:p>
-        </p:txBody>
-      </p:sp>
-      <p:sp>
-        <p:nvSpPr>
-          <p:cNvPr id="3" name="Inhaltsplatzhalter 2"/>
-          <p:cNvSpPr>
-            <a:spLocks noGrp="1"/>
-          </p:cNvSpPr>
-          <p:nvPr>
-            <p:ph idx="1"/>
-          </p:nvPr>
-        </p:nvSpPr>
-        <p:spPr/>
-        <p:txBody>
-          <a:bodyPr/>
-          <a:lstStyle/>
-          <a:p>
-            <a:r>
-              <a:rPr lang="en-US" sz="1600" b="1" dirty="0">
-                <a:solidFill>
-                  <a:srgbClr val="7F0055"/>
-                </a:solidFill>
-                <a:latin typeface="Consolas" panose="020B0609020204030204" pitchFamily="49" charset="0"/>
-                <a:cs typeface="Consolas" panose="020B0609020204030204" pitchFamily="49" charset="0"/>
-              </a:rPr>
-              <a:t>#include</a:t>
-            </a:r>
-            <a:r>
-              <a:rPr lang="en-US" sz="1600" b="1" dirty="0">
-                <a:solidFill>
-                  <a:srgbClr val="000000"/>
-                </a:solidFill>
-                <a:latin typeface="Consolas" panose="020B0609020204030204" pitchFamily="49" charset="0"/>
-                <a:cs typeface="Consolas" panose="020B0609020204030204" pitchFamily="49" charset="0"/>
-              </a:rPr>
-              <a:t> </a:t>
-            </a:r>
-            <a:r>
-              <a:rPr lang="en-US" sz="1600" b="1" dirty="0">
-                <a:solidFill>
-                  <a:srgbClr val="2A00FF"/>
-                </a:solidFill>
-                <a:latin typeface="Consolas" panose="020B0609020204030204" pitchFamily="49" charset="0"/>
-                <a:cs typeface="Consolas" panose="020B0609020204030204" pitchFamily="49" charset="0"/>
-              </a:rPr>
-              <a:t>&lt;</a:t>
-            </a:r>
-            <a:r>
-              <a:rPr lang="en-US" sz="1600" b="1" dirty="0" err="1">
-                <a:solidFill>
-                  <a:srgbClr val="2A00FF"/>
-                </a:solidFill>
-                <a:latin typeface="Consolas" panose="020B0609020204030204" pitchFamily="49" charset="0"/>
-                <a:cs typeface="Consolas" panose="020B0609020204030204" pitchFamily="49" charset="0"/>
-              </a:rPr>
-              <a:t>iostream</a:t>
-            </a:r>
-            <a:r>
-              <a:rPr lang="en-US" sz="1600" b="1" dirty="0">
-                <a:solidFill>
-                  <a:srgbClr val="2A00FF"/>
-                </a:solidFill>
-                <a:latin typeface="Consolas" panose="020B0609020204030204" pitchFamily="49" charset="0"/>
-                <a:cs typeface="Consolas" panose="020B0609020204030204" pitchFamily="49" charset="0"/>
-              </a:rPr>
-              <a:t>&gt;</a:t>
-            </a:r>
-          </a:p>
-          <a:p>
-            <a:endParaRPr lang="en-US" sz="1600" dirty="0">
-              <a:latin typeface="Consolas" panose="020B0609020204030204" pitchFamily="49" charset="0"/>
-              <a:cs typeface="Consolas" panose="020B0609020204030204" pitchFamily="49" charset="0"/>
-            </a:endParaRPr>
-          </a:p>
-          <a:p>
-            <a:r>
-              <a:rPr lang="en-US" sz="1600" b="1" dirty="0">
-                <a:solidFill>
-                  <a:srgbClr val="7F0055"/>
-                </a:solidFill>
-                <a:latin typeface="Consolas" panose="020B0609020204030204" pitchFamily="49" charset="0"/>
-                <a:cs typeface="Consolas" panose="020B0609020204030204" pitchFamily="49" charset="0"/>
-              </a:rPr>
-              <a:t>class</a:t>
-            </a:r>
-            <a:r>
-              <a:rPr lang="en-US" sz="1600" b="1" dirty="0">
-                <a:solidFill>
-                  <a:srgbClr val="000000"/>
-                </a:solidFill>
-                <a:latin typeface="Consolas" panose="020B0609020204030204" pitchFamily="49" charset="0"/>
-                <a:cs typeface="Consolas" panose="020B0609020204030204" pitchFamily="49" charset="0"/>
-              </a:rPr>
-              <a:t> </a:t>
-            </a:r>
-            <a:r>
-              <a:rPr lang="en-US" sz="1600" b="1" dirty="0">
-                <a:solidFill>
-                  <a:srgbClr val="005032"/>
-                </a:solidFill>
-                <a:latin typeface="Consolas" panose="020B0609020204030204" pitchFamily="49" charset="0"/>
-                <a:cs typeface="Consolas" panose="020B0609020204030204" pitchFamily="49" charset="0"/>
-              </a:rPr>
-              <a:t>C</a:t>
-            </a:r>
-            <a:r>
-              <a:rPr lang="en-US" sz="1600" b="1" dirty="0">
-                <a:solidFill>
-                  <a:srgbClr val="000000"/>
-                </a:solidFill>
-                <a:latin typeface="Consolas" panose="020B0609020204030204" pitchFamily="49" charset="0"/>
-                <a:cs typeface="Consolas" panose="020B0609020204030204" pitchFamily="49" charset="0"/>
-              </a:rPr>
-              <a:t> {</a:t>
-            </a:r>
-          </a:p>
-          <a:p>
-            <a:r>
-              <a:rPr lang="en-US" sz="1600" b="1" dirty="0">
-                <a:solidFill>
-                  <a:srgbClr val="7F0055"/>
-                </a:solidFill>
-                <a:latin typeface="Consolas" panose="020B0609020204030204" pitchFamily="49" charset="0"/>
-                <a:cs typeface="Consolas" panose="020B0609020204030204" pitchFamily="49" charset="0"/>
-              </a:rPr>
-              <a:t>public</a:t>
-            </a:r>
-            <a:r>
-              <a:rPr lang="en-US" sz="1600" b="1" dirty="0">
-                <a:solidFill>
-                  <a:srgbClr val="000000"/>
-                </a:solidFill>
-                <a:latin typeface="Consolas" panose="020B0609020204030204" pitchFamily="49" charset="0"/>
-                <a:cs typeface="Consolas" panose="020B0609020204030204" pitchFamily="49" charset="0"/>
-              </a:rPr>
-              <a:t>:</a:t>
-            </a:r>
-          </a:p>
-          <a:p>
-            <a:r>
-              <a:rPr lang="en-US" sz="1600" b="1" dirty="0" smtClean="0">
-                <a:solidFill>
-                  <a:srgbClr val="7F0055"/>
-                </a:solidFill>
-                <a:latin typeface="Courier New" panose="02070309020205020404" pitchFamily="49" charset="0"/>
-              </a:rPr>
-              <a:t>	explicit</a:t>
-            </a:r>
-            <a:r>
-              <a:rPr lang="en-US" sz="1600" b="1" dirty="0" smtClean="0">
-                <a:solidFill>
-                  <a:srgbClr val="000000"/>
-                </a:solidFill>
-                <a:latin typeface="Courier New" panose="02070309020205020404" pitchFamily="49" charset="0"/>
-              </a:rPr>
-              <a:t> </a:t>
-            </a:r>
-            <a:r>
-              <a:rPr lang="en-US" sz="1600" b="1" dirty="0">
-                <a:solidFill>
-                  <a:srgbClr val="000000"/>
-                </a:solidFill>
-                <a:latin typeface="Courier New" panose="02070309020205020404" pitchFamily="49" charset="0"/>
-              </a:rPr>
-              <a:t>C(</a:t>
-            </a:r>
-            <a:r>
-              <a:rPr lang="en-US" sz="1600" b="1" dirty="0" err="1">
-                <a:solidFill>
-                  <a:srgbClr val="7F0055"/>
-                </a:solidFill>
-                <a:latin typeface="Courier New" panose="02070309020205020404" pitchFamily="49" charset="0"/>
-              </a:rPr>
-              <a:t>int</a:t>
-            </a:r>
-            <a:r>
-              <a:rPr lang="en-US" sz="1600" b="1" dirty="0">
-                <a:solidFill>
-                  <a:srgbClr val="000000"/>
-                </a:solidFill>
-                <a:latin typeface="Courier New" panose="02070309020205020404" pitchFamily="49" charset="0"/>
-              </a:rPr>
-              <a:t> </a:t>
-            </a:r>
-            <a:r>
-              <a:rPr lang="en-US" sz="1600" b="1" dirty="0" err="1">
-                <a:solidFill>
-                  <a:srgbClr val="000000"/>
-                </a:solidFill>
-                <a:latin typeface="Courier New" panose="02070309020205020404" pitchFamily="49" charset="0"/>
-              </a:rPr>
-              <a:t>i</a:t>
-            </a:r>
-            <a:r>
-              <a:rPr lang="en-US" sz="1600" b="1" dirty="0">
-                <a:solidFill>
-                  <a:srgbClr val="000000"/>
-                </a:solidFill>
-                <a:latin typeface="Courier New" panose="02070309020205020404" pitchFamily="49" charset="0"/>
-              </a:rPr>
-              <a:t>) :</a:t>
-            </a:r>
-            <a:r>
-              <a:rPr lang="en-US" sz="1600" b="1" dirty="0" err="1">
-                <a:solidFill>
-                  <a:srgbClr val="0000C0"/>
-                </a:solidFill>
-                <a:latin typeface="Courier New" panose="02070309020205020404" pitchFamily="49" charset="0"/>
-              </a:rPr>
-              <a:t>myInt</a:t>
-            </a:r>
-            <a:r>
-              <a:rPr lang="en-US" sz="1600" b="1" dirty="0">
-                <a:solidFill>
-                  <a:srgbClr val="000000"/>
-                </a:solidFill>
-                <a:latin typeface="Courier New" panose="02070309020205020404" pitchFamily="49" charset="0"/>
-              </a:rPr>
-              <a:t>(</a:t>
-            </a:r>
-            <a:r>
-              <a:rPr lang="en-US" sz="1600" b="1" dirty="0" err="1">
-                <a:solidFill>
-                  <a:srgbClr val="000000"/>
-                </a:solidFill>
-                <a:latin typeface="Courier New" panose="02070309020205020404" pitchFamily="49" charset="0"/>
-              </a:rPr>
-              <a:t>i</a:t>
-            </a:r>
-            <a:r>
-              <a:rPr lang="en-US" sz="1600" b="1" dirty="0">
-                <a:solidFill>
-                  <a:srgbClr val="000000"/>
-                </a:solidFill>
-                <a:latin typeface="Courier New" panose="02070309020205020404" pitchFamily="49" charset="0"/>
-              </a:rPr>
-              <a:t>) {}</a:t>
-            </a:r>
-          </a:p>
-          <a:p>
-            <a:r>
-              <a:rPr lang="en-US" sz="1600" b="1" dirty="0" smtClean="0">
-                <a:solidFill>
-                  <a:srgbClr val="7F0055"/>
-                </a:solidFill>
-                <a:latin typeface="Consolas" panose="020B0609020204030204" pitchFamily="49" charset="0"/>
-                <a:cs typeface="Consolas" panose="020B0609020204030204" pitchFamily="49" charset="0"/>
-              </a:rPr>
-              <a:t>	</a:t>
-            </a:r>
-            <a:r>
-              <a:rPr lang="en-US" sz="1600" b="1" dirty="0" err="1" smtClean="0">
-                <a:solidFill>
-                  <a:srgbClr val="7F0055"/>
-                </a:solidFill>
-                <a:latin typeface="Consolas" panose="020B0609020204030204" pitchFamily="49" charset="0"/>
-                <a:cs typeface="Consolas" panose="020B0609020204030204" pitchFamily="49" charset="0"/>
-              </a:rPr>
-              <a:t>const</a:t>
-            </a:r>
-            <a:r>
-              <a:rPr lang="en-US" sz="1600" b="1" dirty="0" smtClean="0">
-                <a:solidFill>
-                  <a:srgbClr val="000000"/>
-                </a:solidFill>
-                <a:latin typeface="Consolas" panose="020B0609020204030204" pitchFamily="49" charset="0"/>
-                <a:cs typeface="Consolas" panose="020B0609020204030204" pitchFamily="49" charset="0"/>
-              </a:rPr>
-              <a:t> </a:t>
-            </a:r>
-            <a:r>
-              <a:rPr lang="en-US" sz="1600" b="1" dirty="0" err="1">
-                <a:solidFill>
-                  <a:srgbClr val="7F0055"/>
-                </a:solidFill>
-                <a:latin typeface="Consolas" panose="020B0609020204030204" pitchFamily="49" charset="0"/>
-                <a:cs typeface="Consolas" panose="020B0609020204030204" pitchFamily="49" charset="0"/>
-              </a:rPr>
-              <a:t>int</a:t>
-            </a:r>
-            <a:r>
-              <a:rPr lang="en-US" sz="1600" b="1" dirty="0">
-                <a:solidFill>
-                  <a:srgbClr val="000000"/>
-                </a:solidFill>
-                <a:latin typeface="Consolas" panose="020B0609020204030204" pitchFamily="49" charset="0"/>
-                <a:cs typeface="Consolas" panose="020B0609020204030204" pitchFamily="49" charset="0"/>
-              </a:rPr>
-              <a:t> </a:t>
-            </a:r>
-            <a:r>
-              <a:rPr lang="en-US" sz="1600" b="1" dirty="0" err="1">
-                <a:solidFill>
-                  <a:srgbClr val="0000C0"/>
-                </a:solidFill>
-                <a:latin typeface="Consolas" panose="020B0609020204030204" pitchFamily="49" charset="0"/>
-                <a:cs typeface="Consolas" panose="020B0609020204030204" pitchFamily="49" charset="0"/>
-              </a:rPr>
-              <a:t>myInt</a:t>
-            </a:r>
-            <a:r>
-              <a:rPr lang="en-US" sz="1600" b="1" dirty="0">
-                <a:solidFill>
-                  <a:srgbClr val="000000"/>
-                </a:solidFill>
-                <a:latin typeface="Consolas" panose="020B0609020204030204" pitchFamily="49" charset="0"/>
-                <a:cs typeface="Consolas" panose="020B0609020204030204" pitchFamily="49" charset="0"/>
-              </a:rPr>
-              <a:t>;</a:t>
-            </a:r>
-          </a:p>
-          <a:p>
-            <a:r>
-              <a:rPr lang="en-US" sz="1600" dirty="0" smtClean="0">
-                <a:solidFill>
-                  <a:srgbClr val="000000"/>
-                </a:solidFill>
-                <a:latin typeface="Consolas" panose="020B0609020204030204" pitchFamily="49" charset="0"/>
-                <a:cs typeface="Consolas" panose="020B0609020204030204" pitchFamily="49" charset="0"/>
-              </a:rPr>
-              <a:t>};</a:t>
-            </a:r>
-          </a:p>
-          <a:p>
-            <a:endParaRPr lang="en-US" sz="1600" dirty="0">
-              <a:solidFill>
-                <a:srgbClr val="000000"/>
-              </a:solidFill>
-              <a:latin typeface="Consolas" panose="020B0609020204030204" pitchFamily="49" charset="0"/>
-              <a:cs typeface="Consolas" panose="020B0609020204030204" pitchFamily="49" charset="0"/>
-            </a:endParaRPr>
-          </a:p>
-          <a:p>
-            <a:r>
-              <a:rPr lang="en-US" sz="1600" b="1" dirty="0" smtClean="0">
-                <a:solidFill>
-                  <a:srgbClr val="7F0055"/>
-                </a:solidFill>
-                <a:latin typeface="Consolas" panose="020B0609020204030204" pitchFamily="49" charset="0"/>
-                <a:cs typeface="Consolas" panose="020B0609020204030204" pitchFamily="49" charset="0"/>
-              </a:rPr>
-              <a:t>void</a:t>
-            </a:r>
-            <a:r>
-              <a:rPr lang="en-US" sz="1600" b="1" dirty="0" smtClean="0">
-                <a:solidFill>
-                  <a:srgbClr val="000000"/>
-                </a:solidFill>
-                <a:latin typeface="Consolas" panose="020B0609020204030204" pitchFamily="49" charset="0"/>
-                <a:cs typeface="Consolas" panose="020B0609020204030204" pitchFamily="49" charset="0"/>
-              </a:rPr>
-              <a:t> </a:t>
-            </a:r>
-            <a:r>
-              <a:rPr lang="en-US" sz="1600" b="1" dirty="0" err="1">
-                <a:solidFill>
-                  <a:srgbClr val="000000"/>
-                </a:solidFill>
-                <a:latin typeface="Consolas" panose="020B0609020204030204" pitchFamily="49" charset="0"/>
-                <a:cs typeface="Consolas" panose="020B0609020204030204" pitchFamily="49" charset="0"/>
-              </a:rPr>
-              <a:t>myFunction</a:t>
-            </a:r>
-            <a:r>
-              <a:rPr lang="en-US" sz="1600" b="1" dirty="0">
-                <a:solidFill>
-                  <a:srgbClr val="000000"/>
-                </a:solidFill>
-                <a:latin typeface="Consolas" panose="020B0609020204030204" pitchFamily="49" charset="0"/>
-                <a:cs typeface="Consolas" panose="020B0609020204030204" pitchFamily="49" charset="0"/>
-              </a:rPr>
-              <a:t>(</a:t>
-            </a:r>
-            <a:r>
-              <a:rPr lang="en-US" sz="1600" b="1" dirty="0">
-                <a:solidFill>
-                  <a:srgbClr val="005032"/>
-                </a:solidFill>
-                <a:latin typeface="Consolas" panose="020B0609020204030204" pitchFamily="49" charset="0"/>
-                <a:cs typeface="Consolas" panose="020B0609020204030204" pitchFamily="49" charset="0"/>
-              </a:rPr>
-              <a:t>C</a:t>
-            </a:r>
-            <a:r>
-              <a:rPr lang="en-US" sz="1600" b="1" dirty="0">
-                <a:solidFill>
-                  <a:srgbClr val="000000"/>
-                </a:solidFill>
-                <a:latin typeface="Consolas" panose="020B0609020204030204" pitchFamily="49" charset="0"/>
-                <a:cs typeface="Consolas" panose="020B0609020204030204" pitchFamily="49" charset="0"/>
-              </a:rPr>
-              <a:t> c) {</a:t>
-            </a:r>
-          </a:p>
-          <a:p>
-            <a:r>
-              <a:rPr lang="en-US" sz="1600" dirty="0" smtClean="0">
-                <a:solidFill>
-                  <a:srgbClr val="000000"/>
-                </a:solidFill>
-                <a:latin typeface="Consolas" panose="020B0609020204030204" pitchFamily="49" charset="0"/>
-                <a:cs typeface="Consolas" panose="020B0609020204030204" pitchFamily="49" charset="0"/>
-              </a:rPr>
-              <a:t>	</a:t>
-            </a:r>
-            <a:r>
-              <a:rPr lang="en-US" sz="1600" dirty="0" err="1" smtClean="0">
-                <a:solidFill>
-                  <a:srgbClr val="000000"/>
-                </a:solidFill>
-                <a:latin typeface="Consolas" panose="020B0609020204030204" pitchFamily="49" charset="0"/>
-                <a:cs typeface="Consolas" panose="020B0609020204030204" pitchFamily="49" charset="0"/>
-              </a:rPr>
-              <a:t>std</a:t>
-            </a:r>
-            <a:r>
-              <a:rPr lang="en-US" sz="1600" dirty="0">
-                <a:solidFill>
-                  <a:srgbClr val="000000"/>
-                </a:solidFill>
-                <a:latin typeface="Consolas" panose="020B0609020204030204" pitchFamily="49" charset="0"/>
-                <a:cs typeface="Consolas" panose="020B0609020204030204" pitchFamily="49" charset="0"/>
-              </a:rPr>
-              <a:t>::</a:t>
-            </a:r>
-            <a:r>
-              <a:rPr lang="en-US" sz="1600" dirty="0" err="1">
-                <a:solidFill>
-                  <a:srgbClr val="000000"/>
-                </a:solidFill>
-                <a:latin typeface="Consolas" panose="020B0609020204030204" pitchFamily="49" charset="0"/>
-                <a:cs typeface="Consolas" panose="020B0609020204030204" pitchFamily="49" charset="0"/>
-              </a:rPr>
-              <a:t>cout</a:t>
-            </a:r>
-            <a:r>
-              <a:rPr lang="en-US" sz="1600" dirty="0">
-                <a:solidFill>
-                  <a:srgbClr val="000000"/>
-                </a:solidFill>
-                <a:latin typeface="Consolas" panose="020B0609020204030204" pitchFamily="49" charset="0"/>
-                <a:cs typeface="Consolas" panose="020B0609020204030204" pitchFamily="49" charset="0"/>
-              </a:rPr>
-              <a:t> &lt;&lt; </a:t>
-            </a:r>
-            <a:r>
-              <a:rPr lang="en-US" sz="1600" dirty="0">
-                <a:solidFill>
-                  <a:srgbClr val="2A00FF"/>
-                </a:solidFill>
-                <a:latin typeface="Consolas" panose="020B0609020204030204" pitchFamily="49" charset="0"/>
-                <a:cs typeface="Consolas" panose="020B0609020204030204" pitchFamily="49" charset="0"/>
-              </a:rPr>
-              <a:t>"</a:t>
-            </a:r>
-            <a:r>
-              <a:rPr lang="en-US" sz="1600" dirty="0" err="1">
-                <a:solidFill>
-                  <a:srgbClr val="2A00FF"/>
-                </a:solidFill>
-                <a:latin typeface="Consolas" panose="020B0609020204030204" pitchFamily="49" charset="0"/>
-                <a:cs typeface="Consolas" panose="020B0609020204030204" pitchFamily="49" charset="0"/>
-              </a:rPr>
-              <a:t>c.myInt</a:t>
-            </a:r>
-            <a:r>
-              <a:rPr lang="en-US" sz="1600" dirty="0">
-                <a:solidFill>
-                  <a:srgbClr val="2A00FF"/>
-                </a:solidFill>
-                <a:latin typeface="Consolas" panose="020B0609020204030204" pitchFamily="49" charset="0"/>
-                <a:cs typeface="Consolas" panose="020B0609020204030204" pitchFamily="49" charset="0"/>
-              </a:rPr>
-              <a:t>: "</a:t>
-            </a:r>
-            <a:r>
-              <a:rPr lang="en-US" sz="1600" dirty="0">
-                <a:solidFill>
-                  <a:srgbClr val="000000"/>
-                </a:solidFill>
-                <a:latin typeface="Consolas" panose="020B0609020204030204" pitchFamily="49" charset="0"/>
-                <a:cs typeface="Consolas" panose="020B0609020204030204" pitchFamily="49" charset="0"/>
-              </a:rPr>
-              <a:t> &lt;&lt; </a:t>
-            </a:r>
-            <a:r>
-              <a:rPr lang="en-US" sz="1600" dirty="0" err="1">
-                <a:solidFill>
-                  <a:srgbClr val="000000"/>
-                </a:solidFill>
-                <a:latin typeface="Consolas" panose="020B0609020204030204" pitchFamily="49" charset="0"/>
-                <a:cs typeface="Consolas" panose="020B0609020204030204" pitchFamily="49" charset="0"/>
-              </a:rPr>
-              <a:t>c.</a:t>
-            </a:r>
-            <a:r>
-              <a:rPr lang="en-US" sz="1600" dirty="0" err="1">
-                <a:solidFill>
-                  <a:srgbClr val="0000C0"/>
-                </a:solidFill>
-                <a:latin typeface="Consolas" panose="020B0609020204030204" pitchFamily="49" charset="0"/>
-                <a:cs typeface="Consolas" panose="020B0609020204030204" pitchFamily="49" charset="0"/>
-              </a:rPr>
-              <a:t>myInt</a:t>
-            </a:r>
-            <a:r>
-              <a:rPr lang="en-US" sz="1600" dirty="0">
-                <a:solidFill>
-                  <a:srgbClr val="000000"/>
-                </a:solidFill>
-                <a:latin typeface="Consolas" panose="020B0609020204030204" pitchFamily="49" charset="0"/>
-                <a:cs typeface="Consolas" panose="020B0609020204030204" pitchFamily="49" charset="0"/>
-              </a:rPr>
-              <a:t> &lt;&lt; </a:t>
-            </a:r>
-            <a:r>
-              <a:rPr lang="en-US" sz="1600" dirty="0" err="1">
-                <a:solidFill>
-                  <a:srgbClr val="000000"/>
-                </a:solidFill>
-                <a:latin typeface="Consolas" panose="020B0609020204030204" pitchFamily="49" charset="0"/>
-                <a:cs typeface="Consolas" panose="020B0609020204030204" pitchFamily="49" charset="0"/>
-              </a:rPr>
-              <a:t>std</a:t>
-            </a:r>
-            <a:r>
-              <a:rPr lang="en-US" sz="1600" dirty="0">
-                <a:solidFill>
-                  <a:srgbClr val="000000"/>
-                </a:solidFill>
-                <a:latin typeface="Consolas" panose="020B0609020204030204" pitchFamily="49" charset="0"/>
-                <a:cs typeface="Consolas" panose="020B0609020204030204" pitchFamily="49" charset="0"/>
-              </a:rPr>
-              <a:t>::</a:t>
-            </a:r>
-            <a:r>
-              <a:rPr lang="en-US" sz="1600" b="1" dirty="0" err="1">
-                <a:solidFill>
-                  <a:srgbClr val="642880"/>
-                </a:solidFill>
-                <a:latin typeface="Consolas" panose="020B0609020204030204" pitchFamily="49" charset="0"/>
-                <a:cs typeface="Consolas" panose="020B0609020204030204" pitchFamily="49" charset="0"/>
-              </a:rPr>
-              <a:t>endl</a:t>
-            </a:r>
-            <a:r>
-              <a:rPr lang="en-US" sz="1600" b="1" dirty="0">
-                <a:solidFill>
-                  <a:srgbClr val="000000"/>
-                </a:solidFill>
-                <a:latin typeface="Consolas" panose="020B0609020204030204" pitchFamily="49" charset="0"/>
-                <a:cs typeface="Consolas" panose="020B0609020204030204" pitchFamily="49" charset="0"/>
-              </a:rPr>
-              <a:t>;</a:t>
-            </a:r>
-          </a:p>
-          <a:p>
-            <a:r>
-              <a:rPr lang="en-US" sz="1600" dirty="0">
-                <a:solidFill>
-                  <a:srgbClr val="000000"/>
-                </a:solidFill>
-                <a:latin typeface="Consolas" panose="020B0609020204030204" pitchFamily="49" charset="0"/>
-                <a:cs typeface="Consolas" panose="020B0609020204030204" pitchFamily="49" charset="0"/>
-              </a:rPr>
-              <a:t>}</a:t>
-            </a:r>
-          </a:p>
-          <a:p>
-            <a:endParaRPr lang="en-US" sz="1600" dirty="0">
-              <a:latin typeface="Consolas" panose="020B0609020204030204" pitchFamily="49" charset="0"/>
-              <a:cs typeface="Consolas" panose="020B0609020204030204" pitchFamily="49" charset="0"/>
-            </a:endParaRPr>
-          </a:p>
-          <a:p>
-            <a:r>
-              <a:rPr lang="en-US" sz="1600" b="1" dirty="0" err="1">
-                <a:solidFill>
-                  <a:srgbClr val="7F0055"/>
-                </a:solidFill>
-                <a:latin typeface="Consolas" panose="020B0609020204030204" pitchFamily="49" charset="0"/>
-                <a:cs typeface="Consolas" panose="020B0609020204030204" pitchFamily="49" charset="0"/>
-              </a:rPr>
-              <a:t>int</a:t>
-            </a:r>
-            <a:r>
-              <a:rPr lang="en-US" sz="1600" b="1" dirty="0">
-                <a:solidFill>
-                  <a:srgbClr val="000000"/>
-                </a:solidFill>
-                <a:latin typeface="Consolas" panose="020B0609020204030204" pitchFamily="49" charset="0"/>
-                <a:cs typeface="Consolas" panose="020B0609020204030204" pitchFamily="49" charset="0"/>
-              </a:rPr>
-              <a:t> main() {</a:t>
-            </a:r>
-          </a:p>
-          <a:p>
-            <a:r>
-              <a:rPr lang="en-US" sz="1600" dirty="0" smtClean="0">
-                <a:solidFill>
-                  <a:srgbClr val="000000"/>
-                </a:solidFill>
-                <a:latin typeface="Consolas" panose="020B0609020204030204" pitchFamily="49" charset="0"/>
-                <a:cs typeface="Consolas" panose="020B0609020204030204" pitchFamily="49" charset="0"/>
-              </a:rPr>
-              <a:t>	</a:t>
-            </a:r>
-            <a:r>
-              <a:rPr lang="en-US" sz="1600" dirty="0" err="1" smtClean="0">
-                <a:solidFill>
-                  <a:srgbClr val="000000"/>
-                </a:solidFill>
-                <a:latin typeface="Consolas" panose="020B0609020204030204" pitchFamily="49" charset="0"/>
-                <a:cs typeface="Consolas" panose="020B0609020204030204" pitchFamily="49" charset="0"/>
-              </a:rPr>
-              <a:t>myFunction</a:t>
-            </a:r>
-            <a:r>
-              <a:rPr lang="en-US" sz="1600" dirty="0" smtClean="0">
-                <a:solidFill>
-                  <a:srgbClr val="000000"/>
-                </a:solidFill>
-                <a:latin typeface="Consolas" panose="020B0609020204030204" pitchFamily="49" charset="0"/>
-                <a:cs typeface="Consolas" panose="020B0609020204030204" pitchFamily="49" charset="0"/>
-              </a:rPr>
-              <a:t>(3);</a:t>
-            </a:r>
-            <a:endParaRPr lang="en-US" sz="1600" dirty="0">
-              <a:latin typeface="Consolas" panose="020B0609020204030204" pitchFamily="49" charset="0"/>
-              <a:cs typeface="Consolas" panose="020B0609020204030204" pitchFamily="49" charset="0"/>
-            </a:endParaRPr>
-          </a:p>
-          <a:p>
-            <a:r>
-              <a:rPr lang="en-US" sz="1600" b="1" dirty="0" smtClean="0">
-                <a:solidFill>
-                  <a:srgbClr val="7F0055"/>
-                </a:solidFill>
-                <a:latin typeface="Consolas" panose="020B0609020204030204" pitchFamily="49" charset="0"/>
-                <a:cs typeface="Consolas" panose="020B0609020204030204" pitchFamily="49" charset="0"/>
-              </a:rPr>
-              <a:t>	return</a:t>
-            </a:r>
-            <a:r>
-              <a:rPr lang="en-US" sz="1600" b="1" dirty="0" smtClean="0">
-                <a:solidFill>
-                  <a:srgbClr val="000000"/>
-                </a:solidFill>
-                <a:latin typeface="Consolas" panose="020B0609020204030204" pitchFamily="49" charset="0"/>
-                <a:cs typeface="Consolas" panose="020B0609020204030204" pitchFamily="49" charset="0"/>
-              </a:rPr>
-              <a:t> </a:t>
-            </a:r>
-            <a:r>
-              <a:rPr lang="en-US" sz="1600" b="1" dirty="0">
-                <a:solidFill>
-                  <a:srgbClr val="000000"/>
-                </a:solidFill>
-                <a:latin typeface="Consolas" panose="020B0609020204030204" pitchFamily="49" charset="0"/>
-                <a:cs typeface="Consolas" panose="020B0609020204030204" pitchFamily="49" charset="0"/>
-              </a:rPr>
-              <a:t>0;</a:t>
-            </a:r>
-          </a:p>
-          <a:p>
-            <a:r>
-              <a:rPr lang="en-US" sz="1600" dirty="0">
-                <a:solidFill>
-                  <a:srgbClr val="000000"/>
-                </a:solidFill>
-                <a:latin typeface="Consolas" panose="020B0609020204030204" pitchFamily="49" charset="0"/>
-                <a:cs typeface="Consolas" panose="020B0609020204030204" pitchFamily="49" charset="0"/>
-              </a:rPr>
-              <a:t>}</a:t>
-            </a:r>
-          </a:p>
-          <a:p>
-            <a:endParaRPr lang="en-US" sz="1600" dirty="0">
-              <a:latin typeface="Consolas" panose="020B0609020204030204" pitchFamily="49" charset="0"/>
-              <a:cs typeface="Consolas" panose="020B0609020204030204" pitchFamily="49" charset="0"/>
-            </a:endParaRPr>
-          </a:p>
-        </p:txBody>
-      </p:sp>
-      <p:sp>
-        <p:nvSpPr>
-          <p:cNvPr id="4" name="Rechteck 3"/>
-          <p:cNvSpPr/>
-          <p:nvPr/>
-        </p:nvSpPr>
-        <p:spPr bwMode="auto">
-          <a:xfrm>
-            <a:off x="1187624" y="2636912"/>
-            <a:ext cx="1080120" cy="288032"/>
-          </a:xfrm>
-          <a:prstGeom prst="rect">
-            <a:avLst/>
-          </a:prstGeom>
-          <a:solidFill>
-            <a:schemeClr val="bg1"/>
-          </a:solidFill>
-          <a:ln w="9525">
-            <a:noFill/>
-            <a:miter lim="800000"/>
-            <a:headEnd/>
-            <a:tailEnd/>
-          </a:ln>
-          <a:extLst/>
-        </p:spPr>
-        <p:txBody>
-          <a:bodyPr rtlCol="0" anchor="ctr">
-            <a:spAutoFit/>
-          </a:bodyPr>
-          <a:lstStyle/>
-          <a:p>
-            <a:pPr algn="ctr" eaLnBrk="1" hangingPunct="1">
-              <a:spcBef>
-                <a:spcPct val="0"/>
-              </a:spcBef>
-              <a:buSzTx/>
-              <a:buFont typeface="Arial" charset="0"/>
-              <a:buNone/>
-            </a:pPr>
-            <a:endParaRPr lang="en-US" sz="1400" dirty="0" err="1">
-              <a:solidFill>
-                <a:srgbClr val="7F0055"/>
-              </a:solidFill>
-              <a:latin typeface="Consolas" pitchFamily="49" charset="0"/>
-            </a:endParaRPr>
-          </a:p>
-        </p:txBody>
-      </p:sp>
-      <p:sp>
-        <p:nvSpPr>
-          <p:cNvPr id="5" name="Abgerundete rechteckige Legende 4"/>
-          <p:cNvSpPr/>
-          <p:nvPr/>
-        </p:nvSpPr>
-        <p:spPr bwMode="auto">
-          <a:xfrm>
-            <a:off x="3563888" y="5229200"/>
-            <a:ext cx="3888432" cy="545539"/>
-          </a:xfrm>
-          <a:prstGeom prst="wedgeRoundRectCallout">
-            <a:avLst>
-              <a:gd name="adj1" fmla="val -65625"/>
-              <a:gd name="adj2" fmla="val -1353"/>
-              <a:gd name="adj3" fmla="val 16667"/>
-            </a:avLst>
-          </a:prstGeom>
-          <a:solidFill>
-            <a:schemeClr val="tx1"/>
-          </a:solidFill>
-          <a:ln w="9525">
-            <a:solidFill>
-              <a:srgbClr val="000000"/>
-            </a:solidFill>
-            <a:miter lim="800000"/>
-            <a:headEnd/>
-            <a:tailEnd/>
-          </a:ln>
-          <a:extLst/>
-        </p:spPr>
-        <p:txBody>
-          <a:bodyPr rtlCol="0" anchor="ctr">
-            <a:spAutoFit/>
-          </a:bodyPr>
-          <a:lstStyle/>
-          <a:p>
-            <a:pPr algn="l"/>
-            <a:r>
-              <a:rPr lang="en-US" sz="1400" b="1">
-                <a:solidFill>
-                  <a:schemeClr val="bg1"/>
-                </a:solidFill>
-                <a:latin typeface="Segoe UI" panose="020B0502040204020203" pitchFamily="34" charset="0"/>
-              </a:rPr>
-              <a:t> Invalid arguments ' Candidates are: void </a:t>
-            </a:r>
-          </a:p>
-          <a:p>
-            <a:pPr algn="l"/>
-            <a:r>
-              <a:rPr lang="en-US" sz="1400" b="1">
-                <a:solidFill>
-                  <a:schemeClr val="bg1"/>
-                </a:solidFill>
-                <a:latin typeface="Segoe UI" panose="020B0502040204020203" pitchFamily="34" charset="0"/>
-              </a:rPr>
-              <a:t> myFunction(C)</a:t>
-            </a:r>
-            <a:endParaRPr lang="en-US" sz="1400" b="1" dirty="0" err="1">
-              <a:solidFill>
-                <a:schemeClr val="bg1"/>
-              </a:solidFill>
-              <a:latin typeface="Consolas" pitchFamily="49" charset="0"/>
-            </a:endParaRPr>
-          </a:p>
-        </p:txBody>
-      </p:sp>
-    </p:spTree>
-    <p:extLst>
-      <p:ext uri="{BB962C8B-B14F-4D97-AF65-F5344CB8AC3E}">
-        <p14:creationId xmlns:p14="http://schemas.microsoft.com/office/powerpoint/2010/main" val="1515927319"/>
-      </p:ext>
-    </p:extLst>
-  </p:cSld>
-  <p:clrMapOvr>
-    <a:masterClrMapping/>
-  </p:clrMapOvr>
-  <p:timing>
-    <p:tnLst>
-      <p:par>
-        <p:cTn id="1" dur="indefinite" restart="never" nodeType="tmRoot">
-          <p:childTnLst>
-            <p:seq concurrent="1" nextAc="seek">
-              <p:cTn id="2" dur="indefinite" nodeType="mainSeq">
-                <p:childTnLst>
-                  <p:par>
-                    <p:cTn id="3" fill="hold">
-                      <p:stCondLst>
-                        <p:cond delay="indefinite"/>
-                      </p:stCondLst>
-                      <p:childTnLst>
-                        <p:par>
-                          <p:cTn id="4" fill="hold">
-                            <p:stCondLst>
-                              <p:cond delay="0"/>
-                            </p:stCondLst>
-                            <p:childTnLst>
-                              <p:par>
-                                <p:cTn id="5" presetID="1" presetClass="exit" presetSubtype="0" fill="hold" grpId="0" nodeType="clickEffect">
-                                  <p:stCondLst>
-                                    <p:cond delay="0"/>
-                                  </p:stCondLst>
-                                  <p:childTnLst>
-                                    <p:set>
-                                      <p:cBhvr>
-                                        <p:cTn id="6" dur="1" fill="hold">
-                                          <p:stCondLst>
-                                            <p:cond delay="0"/>
-                                          </p:stCondLst>
-                                        </p:cTn>
-                                        <p:tgtEl>
-                                          <p:spTgt spid="4"/>
-                                        </p:tgtEl>
-                                        <p:attrNameLst>
-                                          <p:attrName>style.visibility</p:attrName>
-                                        </p:attrNameLst>
-                                      </p:cBhvr>
-                                      <p:to>
-                                        <p:strVal val="hidden"/>
-                                      </p:to>
-                                    </p:set>
-                                  </p:childTnLst>
-                                </p:cTn>
-                              </p:par>
-                            </p:childTnLst>
-                          </p:cTn>
-                        </p:par>
-                      </p:childTnLst>
-                    </p:cTn>
-                  </p:par>
-                  <p:par>
-                    <p:cTn id="7" fill="hold">
-                      <p:stCondLst>
-                        <p:cond delay="indefinite"/>
-                      </p:stCondLst>
-                      <p:childTnLst>
-                        <p:par>
-                          <p:cTn id="8" fill="hold">
-                            <p:stCondLst>
-                              <p:cond delay="0"/>
-                            </p:stCondLst>
-                            <p:childTnLst>
-                              <p:par>
-                                <p:cTn id="9" presetID="1" presetClass="entr" presetSubtype="0" fill="hold" grpId="0" nodeType="clickEffect">
-                                  <p:stCondLst>
-                                    <p:cond delay="0"/>
-                                  </p:stCondLst>
-                                  <p:childTnLst>
-                                    <p:set>
-                                      <p:cBhvr>
-                                        <p:cTn id="10" dur="1" fill="hold">
-                                          <p:stCondLst>
-                                            <p:cond delay="0"/>
-                                          </p:stCondLst>
-                                        </p:cTn>
-                                        <p:tgtEl>
-                                          <p:spTgt spid="5"/>
-                                        </p:tgtEl>
-                                        <p:attrNameLst>
-                                          <p:attrName>style.visibility</p:attrName>
-                                        </p:attrNameLst>
-                                      </p:cBhvr>
-                                      <p:to>
-                                        <p:strVal val="visible"/>
-                                      </p:to>
-                                    </p:set>
-                                  </p:childTnLst>
-                                </p:cTn>
-                              </p:par>
-                            </p:childTnLst>
-                          </p:cTn>
-                        </p:par>
-                      </p:childTnLst>
-                    </p:cTn>
-                  </p:par>
-                </p:childTnLst>
-              </p:cTn>
-              <p:prevCondLst>
-                <p:cond evt="onPrev" delay="0">
-                  <p:tgtEl>
-                    <p:sldTgt/>
-                  </p:tgtEl>
-                </p:cond>
-              </p:prevCondLst>
-              <p:nextCondLst>
-                <p:cond evt="onNext" delay="0">
-                  <p:tgtEl>
-                    <p:sldTgt/>
-                  </p:tgtEl>
-                </p:cond>
-              </p:nextCondLst>
-            </p:seq>
-          </p:childTnLst>
-        </p:cTn>
-      </p:par>
-    </p:tnLst>
-    <p:bldLst>
-      <p:bldP spid="4" grpId="0" animBg="1"/>
-      <p:bldP spid="5" grpId="0" animBg="1"/>
-    </p:bldLst>
   </p:timing>
 </p:sld>
 </file>

</xml_diff>

<commit_message>
Bugfixes in layout and bubbles
</commit_message>
<xml_diff>
--- a/2016/week1__recap_and_warmup_slides.pptx
+++ b/2016/week1__recap_and_warmup_slides.pptx
@@ -5,10 +5,10 @@
     <p:sldMasterId id="2147483650" r:id="rId1"/>
   </p:sldMasterIdLst>
   <p:notesMasterIdLst>
-    <p:notesMasterId r:id="rId9"/>
+    <p:notesMasterId r:id="rId8"/>
   </p:notesMasterIdLst>
   <p:handoutMasterIdLst>
-    <p:handoutMasterId r:id="rId10"/>
+    <p:handoutMasterId r:id="rId9"/>
   </p:handoutMasterIdLst>
   <p:sldIdLst>
     <p:sldId id="454" r:id="rId2"/>
@@ -16,8 +16,7 @@
     <p:sldId id="456" r:id="rId4"/>
     <p:sldId id="457" r:id="rId5"/>
     <p:sldId id="465" r:id="rId6"/>
-    <p:sldId id="466" r:id="rId7"/>
-    <p:sldId id="467" r:id="rId8"/>
+    <p:sldId id="467" r:id="rId7"/>
   </p:sldIdLst>
   <p:sldSz cx="9144000" cy="6858000" type="screen4x3"/>
   <p:notesSz cx="7099300" cy="10234613"/>
@@ -196,7 +195,6 @@
             <p14:sldId id="456"/>
             <p14:sldId id="457"/>
             <p14:sldId id="465"/>
-            <p14:sldId id="466"/>
             <p14:sldId id="467"/>
           </p14:sldIdLst>
         </p14:section>
@@ -2981,87 +2979,6 @@
               <a:buFontTx/>
               <a:buNone/>
             </a:pPr>
-            <a:r>
-              <a:rPr lang="de-DE" altLang="de-DE" i="0" dirty="0" err="1" smtClean="0">
-                <a:latin typeface="Times New Roman" pitchFamily="16" charset="0"/>
-              </a:rPr>
-              <a:t>Asterisk</a:t>
-            </a:r>
-            <a:r>
-              <a:rPr lang="de-DE" altLang="de-DE" i="0" dirty="0" smtClean="0">
-                <a:latin typeface="Times New Roman" pitchFamily="16" charset="0"/>
-              </a:rPr>
-              <a:t>: (i) Als Teil des </a:t>
-            </a:r>
-            <a:r>
-              <a:rPr lang="de-DE" altLang="de-DE" b="1" i="0" dirty="0" smtClean="0">
-                <a:latin typeface="Times New Roman" pitchFamily="16" charset="0"/>
-              </a:rPr>
-              <a:t>Typs</a:t>
-            </a:r>
-            <a:r>
-              <a:rPr lang="de-DE" altLang="de-DE" i="0" dirty="0" smtClean="0">
-                <a:latin typeface="Times New Roman" pitchFamily="16" charset="0"/>
-              </a:rPr>
-              <a:t> bei Pointern, (ii) Als </a:t>
-            </a:r>
-            <a:r>
-              <a:rPr lang="de-DE" altLang="de-DE" i="0" dirty="0" err="1" smtClean="0">
-                <a:latin typeface="Times New Roman" pitchFamily="16" charset="0"/>
-              </a:rPr>
-              <a:t>Dereferenzierungs</a:t>
-            </a:r>
-            <a:r>
-              <a:rPr lang="de-DE" altLang="de-DE" b="1" i="0" dirty="0" err="1" smtClean="0">
-                <a:latin typeface="Times New Roman" pitchFamily="16" charset="0"/>
-              </a:rPr>
-              <a:t>operator</a:t>
-            </a:r>
-            <a:endParaRPr lang="de-DE" altLang="de-DE" b="1" i="0" dirty="0" smtClean="0">
-              <a:latin typeface="Times New Roman" pitchFamily="16" charset="0"/>
-            </a:endParaRPr>
-          </a:p>
-          <a:p>
-            <a:pPr marL="0" indent="0">
-              <a:buFontTx/>
-              <a:buNone/>
-            </a:pPr>
-            <a:r>
-              <a:rPr lang="de-DE" altLang="de-DE" i="0" dirty="0" err="1" smtClean="0">
-                <a:latin typeface="Times New Roman" pitchFamily="16" charset="0"/>
-              </a:rPr>
-              <a:t>Ampersand</a:t>
-            </a:r>
-            <a:r>
-              <a:rPr lang="de-DE" altLang="de-DE" i="0" dirty="0" smtClean="0">
-                <a:latin typeface="Times New Roman" pitchFamily="16" charset="0"/>
-              </a:rPr>
-              <a:t>: (i) Als Teil des </a:t>
-            </a:r>
-            <a:r>
-              <a:rPr lang="de-DE" altLang="de-DE" b="1" i="0" dirty="0" smtClean="0">
-                <a:latin typeface="Times New Roman" pitchFamily="16" charset="0"/>
-              </a:rPr>
-              <a:t>Typs</a:t>
-            </a:r>
-            <a:r>
-              <a:rPr lang="de-DE" altLang="de-DE" i="0" dirty="0" smtClean="0">
-                <a:latin typeface="Times New Roman" pitchFamily="16" charset="0"/>
-              </a:rPr>
-              <a:t> bei</a:t>
-            </a:r>
-            <a:r>
-              <a:rPr lang="de-DE" altLang="de-DE" i="0" baseline="0" dirty="0" smtClean="0">
-                <a:latin typeface="Times New Roman" pitchFamily="16" charset="0"/>
-              </a:rPr>
-              <a:t> Referenzen, (ii) Als Adress</a:t>
-            </a:r>
-            <a:r>
-              <a:rPr lang="de-DE" altLang="de-DE" b="1" i="0" baseline="0" dirty="0" smtClean="0">
-                <a:latin typeface="Times New Roman" pitchFamily="16" charset="0"/>
-              </a:rPr>
-              <a:t>operator</a:t>
-            </a:r>
             <a:endParaRPr lang="de-DE" altLang="de-DE" b="1" i="0" dirty="0" smtClean="0">
               <a:latin typeface="Times New Roman" pitchFamily="16" charset="0"/>
             </a:endParaRPr>
@@ -3788,826 +3705,6 @@
               </a:rPr>
               <a:pPr eaLnBrk="1" hangingPunct="1"/>
               <a:t>6</a:t>
-            </a:fld>
-            <a:endParaRPr lang="en-US" altLang="de-DE" smtClean="0">
-              <a:solidFill>
-                <a:srgbClr val="000000"/>
-              </a:solidFill>
-              <a:latin typeface="Stafford" pitchFamily="2" charset="0"/>
-            </a:endParaRPr>
-          </a:p>
-        </p:txBody>
-      </p:sp>
-    </p:spTree>
-    <p:extLst>
-      <p:ext uri="{BB962C8B-B14F-4D97-AF65-F5344CB8AC3E}">
-        <p14:creationId xmlns:p14="http://schemas.microsoft.com/office/powerpoint/2010/main" val="2604565681"/>
-      </p:ext>
-    </p:extLst>
-  </p:cSld>
-  <p:clrMapOvr>
-    <a:masterClrMapping/>
-  </p:clrMapOvr>
-</p:notes>
-</file>
-
-<file path=ppt/notesSlides/notesSlide4.xml><?xml version="1.0" encoding="utf-8"?>
-<p:notes xmlns:a="http://schemas.openxmlformats.org/drawingml/2006/main" xmlns:r="http://schemas.openxmlformats.org/officeDocument/2006/relationships" xmlns:p="http://schemas.openxmlformats.org/presentationml/2006/main">
-  <p:cSld>
-    <p:spTree>
-      <p:nvGrpSpPr>
-        <p:cNvPr id="1" name=""/>
-        <p:cNvGrpSpPr/>
-        <p:nvPr/>
-      </p:nvGrpSpPr>
-      <p:grpSpPr>
-        <a:xfrm>
-          <a:off x="0" y="0"/>
-          <a:ext cx="0" cy="0"/>
-          <a:chOff x="0" y="0"/>
-          <a:chExt cx="0" cy="0"/>
-        </a:xfrm>
-      </p:grpSpPr>
-      <p:sp>
-        <p:nvSpPr>
-          <p:cNvPr id="53250" name="Folienbildplatzhalter 1"/>
-          <p:cNvSpPr>
-            <a:spLocks noGrp="1" noRot="1" noChangeAspect="1" noTextEdit="1"/>
-          </p:cNvSpPr>
-          <p:nvPr>
-            <p:ph type="sldImg"/>
-          </p:nvPr>
-        </p:nvSpPr>
-        <p:spPr>
-          <a:ln/>
-        </p:spPr>
-      </p:sp>
-      <p:sp>
-        <p:nvSpPr>
-          <p:cNvPr id="53251" name="Notizenplatzhalter 2"/>
-          <p:cNvSpPr>
-            <a:spLocks noGrp="1"/>
-          </p:cNvSpPr>
-          <p:nvPr>
-            <p:ph type="body" idx="1"/>
-          </p:nvPr>
-        </p:nvSpPr>
-        <p:spPr>
-          <a:noFill/>
-          <a:extLst>
-            <a:ext uri="{909E8E84-426E-40DD-AFC4-6F175D3DCCD1}">
-              <a14:hiddenFill xmlns:a14="http://schemas.microsoft.com/office/drawing/2010/main">
-                <a:solidFill>
-                  <a:srgbClr val="FFFFFF"/>
-                </a:solidFill>
-              </a14:hiddenFill>
-            </a:ext>
-            <a:ext uri="{91240B29-F687-4F45-9708-019B960494DF}">
-              <a14:hiddenLine xmlns:a14="http://schemas.microsoft.com/office/drawing/2010/main" w="9525">
-                <a:solidFill>
-                  <a:srgbClr val="000000"/>
-                </a:solidFill>
-                <a:miter lim="800000"/>
-                <a:headEnd/>
-                <a:tailEnd/>
-              </a14:hiddenLine>
-            </a:ext>
-          </a:extLst>
-        </p:spPr>
-        <p:txBody>
-          <a:bodyPr/>
-          <a:lstStyle/>
-          <a:p>
-            <a:pPr marL="0" indent="0">
-              <a:buFontTx/>
-              <a:buNone/>
-            </a:pPr>
-            <a:endParaRPr lang="de-DE" altLang="de-DE" b="1" i="0" dirty="0" smtClean="0">
-              <a:latin typeface="Times New Roman" pitchFamily="16" charset="0"/>
-            </a:endParaRPr>
-          </a:p>
-        </p:txBody>
-      </p:sp>
-      <p:sp>
-        <p:nvSpPr>
-          <p:cNvPr id="53252" name="Datumsplatzhalter 3"/>
-          <p:cNvSpPr>
-            <a:spLocks noGrp="1"/>
-          </p:cNvSpPr>
-          <p:nvPr>
-            <p:ph type="dt" sz="quarter"/>
-          </p:nvPr>
-        </p:nvSpPr>
-        <p:spPr>
-          <a:noFill/>
-          <a:extLst>
-            <a:ext uri="{909E8E84-426E-40DD-AFC4-6F175D3DCCD1}">
-              <a14:hiddenFill xmlns:a14="http://schemas.microsoft.com/office/drawing/2010/main">
-                <a:solidFill>
-                  <a:srgbClr val="FFFFFF"/>
-                </a:solidFill>
-              </a14:hiddenFill>
-            </a:ext>
-            <a:ext uri="{91240B29-F687-4F45-9708-019B960494DF}">
-              <a14:hiddenLine xmlns:a14="http://schemas.microsoft.com/office/drawing/2010/main" w="9525">
-                <a:solidFill>
-                  <a:srgbClr val="000000"/>
-                </a:solidFill>
-                <a:miter lim="800000"/>
-                <a:headEnd/>
-                <a:tailEnd/>
-              </a14:hiddenLine>
-            </a:ext>
-          </a:extLst>
-        </p:spPr>
-        <p:txBody>
-          <a:bodyPr/>
-          <a:lstStyle>
-            <a:lvl1pPr defTabSz="463550" eaLnBrk="0" hangingPunct="0">
-              <a:tabLst>
-                <a:tab pos="746125" algn="l"/>
-                <a:tab pos="1492250" algn="l"/>
-              </a:tabLst>
-              <a:defRPr>
-                <a:solidFill>
-                  <a:schemeClr val="tx1"/>
-                </a:solidFill>
-                <a:latin typeface="Arial" charset="0"/>
-                <a:ea typeface="Lucida Sans Unicode" pitchFamily="34" charset="0"/>
-                <a:cs typeface="Lucida Sans Unicode" pitchFamily="34" charset="0"/>
-              </a:defRPr>
-            </a:lvl1pPr>
-            <a:lvl2pPr marL="742950" indent="-285750" defTabSz="463550" eaLnBrk="0" hangingPunct="0">
-              <a:tabLst>
-                <a:tab pos="746125" algn="l"/>
-                <a:tab pos="1492250" algn="l"/>
-              </a:tabLst>
-              <a:defRPr>
-                <a:solidFill>
-                  <a:schemeClr val="tx1"/>
-                </a:solidFill>
-                <a:latin typeface="Arial" charset="0"/>
-                <a:ea typeface="Lucida Sans Unicode" pitchFamily="34" charset="0"/>
-                <a:cs typeface="Lucida Sans Unicode" pitchFamily="34" charset="0"/>
-              </a:defRPr>
-            </a:lvl2pPr>
-            <a:lvl3pPr marL="1143000" indent="-228600" defTabSz="463550" eaLnBrk="0" hangingPunct="0">
-              <a:tabLst>
-                <a:tab pos="746125" algn="l"/>
-                <a:tab pos="1492250" algn="l"/>
-              </a:tabLst>
-              <a:defRPr>
-                <a:solidFill>
-                  <a:schemeClr val="tx1"/>
-                </a:solidFill>
-                <a:latin typeface="Arial" charset="0"/>
-                <a:ea typeface="Lucida Sans Unicode" pitchFamily="34" charset="0"/>
-                <a:cs typeface="Lucida Sans Unicode" pitchFamily="34" charset="0"/>
-              </a:defRPr>
-            </a:lvl3pPr>
-            <a:lvl4pPr marL="1600200" indent="-228600" defTabSz="463550" eaLnBrk="0" hangingPunct="0">
-              <a:tabLst>
-                <a:tab pos="746125" algn="l"/>
-                <a:tab pos="1492250" algn="l"/>
-              </a:tabLst>
-              <a:defRPr>
-                <a:solidFill>
-                  <a:schemeClr val="tx1"/>
-                </a:solidFill>
-                <a:latin typeface="Arial" charset="0"/>
-                <a:ea typeface="Lucida Sans Unicode" pitchFamily="34" charset="0"/>
-                <a:cs typeface="Lucida Sans Unicode" pitchFamily="34" charset="0"/>
-              </a:defRPr>
-            </a:lvl4pPr>
-            <a:lvl5pPr marL="2057400" indent="-228600" defTabSz="463550" eaLnBrk="0" hangingPunct="0">
-              <a:tabLst>
-                <a:tab pos="746125" algn="l"/>
-                <a:tab pos="1492250" algn="l"/>
-              </a:tabLst>
-              <a:defRPr>
-                <a:solidFill>
-                  <a:schemeClr val="tx1"/>
-                </a:solidFill>
-                <a:latin typeface="Arial" charset="0"/>
-                <a:ea typeface="Lucida Sans Unicode" pitchFamily="34" charset="0"/>
-                <a:cs typeface="Lucida Sans Unicode" pitchFamily="34" charset="0"/>
-              </a:defRPr>
-            </a:lvl5pPr>
-            <a:lvl6pPr marL="2514600" indent="-228600" algn="ctr" defTabSz="463550" eaLnBrk="0" fontAlgn="base" hangingPunct="0">
-              <a:lnSpc>
-                <a:spcPct val="93000"/>
-              </a:lnSpc>
-              <a:spcBef>
-                <a:spcPct val="0"/>
-              </a:spcBef>
-              <a:spcAft>
-                <a:spcPct val="0"/>
-              </a:spcAft>
-              <a:buClr>
-                <a:srgbClr val="000000"/>
-              </a:buClr>
-              <a:buSzPct val="100000"/>
-              <a:buFont typeface="Arial" charset="0"/>
-              <a:tabLst>
-                <a:tab pos="746125" algn="l"/>
-                <a:tab pos="1492250" algn="l"/>
-              </a:tabLst>
-              <a:defRPr>
-                <a:solidFill>
-                  <a:schemeClr val="tx1"/>
-                </a:solidFill>
-                <a:latin typeface="Arial" charset="0"/>
-                <a:ea typeface="Lucida Sans Unicode" pitchFamily="34" charset="0"/>
-                <a:cs typeface="Lucida Sans Unicode" pitchFamily="34" charset="0"/>
-              </a:defRPr>
-            </a:lvl6pPr>
-            <a:lvl7pPr marL="2971800" indent="-228600" algn="ctr" defTabSz="463550" eaLnBrk="0" fontAlgn="base" hangingPunct="0">
-              <a:lnSpc>
-                <a:spcPct val="93000"/>
-              </a:lnSpc>
-              <a:spcBef>
-                <a:spcPct val="0"/>
-              </a:spcBef>
-              <a:spcAft>
-                <a:spcPct val="0"/>
-              </a:spcAft>
-              <a:buClr>
-                <a:srgbClr val="000000"/>
-              </a:buClr>
-              <a:buSzPct val="100000"/>
-              <a:buFont typeface="Arial" charset="0"/>
-              <a:tabLst>
-                <a:tab pos="746125" algn="l"/>
-                <a:tab pos="1492250" algn="l"/>
-              </a:tabLst>
-              <a:defRPr>
-                <a:solidFill>
-                  <a:schemeClr val="tx1"/>
-                </a:solidFill>
-                <a:latin typeface="Arial" charset="0"/>
-                <a:ea typeface="Lucida Sans Unicode" pitchFamily="34" charset="0"/>
-                <a:cs typeface="Lucida Sans Unicode" pitchFamily="34" charset="0"/>
-              </a:defRPr>
-            </a:lvl7pPr>
-            <a:lvl8pPr marL="3429000" indent="-228600" algn="ctr" defTabSz="463550" eaLnBrk="0" fontAlgn="base" hangingPunct="0">
-              <a:lnSpc>
-                <a:spcPct val="93000"/>
-              </a:lnSpc>
-              <a:spcBef>
-                <a:spcPct val="0"/>
-              </a:spcBef>
-              <a:spcAft>
-                <a:spcPct val="0"/>
-              </a:spcAft>
-              <a:buClr>
-                <a:srgbClr val="000000"/>
-              </a:buClr>
-              <a:buSzPct val="100000"/>
-              <a:buFont typeface="Arial" charset="0"/>
-              <a:tabLst>
-                <a:tab pos="746125" algn="l"/>
-                <a:tab pos="1492250" algn="l"/>
-              </a:tabLst>
-              <a:defRPr>
-                <a:solidFill>
-                  <a:schemeClr val="tx1"/>
-                </a:solidFill>
-                <a:latin typeface="Arial" charset="0"/>
-                <a:ea typeface="Lucida Sans Unicode" pitchFamily="34" charset="0"/>
-                <a:cs typeface="Lucida Sans Unicode" pitchFamily="34" charset="0"/>
-              </a:defRPr>
-            </a:lvl8pPr>
-            <a:lvl9pPr marL="3886200" indent="-228600" algn="ctr" defTabSz="463550" eaLnBrk="0" fontAlgn="base" hangingPunct="0">
-              <a:lnSpc>
-                <a:spcPct val="93000"/>
-              </a:lnSpc>
-              <a:spcBef>
-                <a:spcPct val="0"/>
-              </a:spcBef>
-              <a:spcAft>
-                <a:spcPct val="0"/>
-              </a:spcAft>
-              <a:buClr>
-                <a:srgbClr val="000000"/>
-              </a:buClr>
-              <a:buSzPct val="100000"/>
-              <a:buFont typeface="Arial" charset="0"/>
-              <a:tabLst>
-                <a:tab pos="746125" algn="l"/>
-                <a:tab pos="1492250" algn="l"/>
-              </a:tabLst>
-              <a:defRPr>
-                <a:solidFill>
-                  <a:schemeClr val="tx1"/>
-                </a:solidFill>
-                <a:latin typeface="Arial" charset="0"/>
-                <a:ea typeface="Lucida Sans Unicode" pitchFamily="34" charset="0"/>
-                <a:cs typeface="Lucida Sans Unicode" pitchFamily="34" charset="0"/>
-              </a:defRPr>
-            </a:lvl9pPr>
-          </a:lstStyle>
-          <a:p>
-            <a:pPr eaLnBrk="1" hangingPunct="1"/>
-            <a:r>
-              <a:rPr lang="en-US" altLang="de-DE" smtClean="0">
-                <a:solidFill>
-                  <a:srgbClr val="000000"/>
-                </a:solidFill>
-                <a:latin typeface="Stafford" pitchFamily="2" charset="0"/>
-              </a:rPr>
-              <a:t>November 19, 2007</a:t>
-            </a:r>
-          </a:p>
-        </p:txBody>
-      </p:sp>
-      <p:sp>
-        <p:nvSpPr>
-          <p:cNvPr id="53253" name="Fußzeilenplatzhalter 4"/>
-          <p:cNvSpPr>
-            <a:spLocks noGrp="1"/>
-          </p:cNvSpPr>
-          <p:nvPr>
-            <p:ph type="ftr" sz="quarter"/>
-          </p:nvPr>
-        </p:nvSpPr>
-        <p:spPr>
-          <a:noFill/>
-          <a:extLst>
-            <a:ext uri="{909E8E84-426E-40DD-AFC4-6F175D3DCCD1}">
-              <a14:hiddenFill xmlns:a14="http://schemas.microsoft.com/office/drawing/2010/main">
-                <a:solidFill>
-                  <a:srgbClr val="FFFFFF"/>
-                </a:solidFill>
-              </a14:hiddenFill>
-            </a:ext>
-            <a:ext uri="{91240B29-F687-4F45-9708-019B960494DF}">
-              <a14:hiddenLine xmlns:a14="http://schemas.microsoft.com/office/drawing/2010/main" w="9525">
-                <a:solidFill>
-                  <a:srgbClr val="000000"/>
-                </a:solidFill>
-                <a:miter lim="800000"/>
-                <a:headEnd/>
-                <a:tailEnd/>
-              </a14:hiddenLine>
-            </a:ext>
-          </a:extLst>
-        </p:spPr>
-        <p:txBody>
-          <a:bodyPr/>
-          <a:lstStyle>
-            <a:lvl1pPr defTabSz="463550" eaLnBrk="0" hangingPunct="0">
-              <a:tabLst>
-                <a:tab pos="746125" algn="l"/>
-                <a:tab pos="1492250" algn="l"/>
-                <a:tab pos="2238375" algn="l"/>
-                <a:tab pos="2986088" algn="l"/>
-                <a:tab pos="3732213" algn="l"/>
-              </a:tabLst>
-              <a:defRPr>
-                <a:solidFill>
-                  <a:schemeClr val="tx1"/>
-                </a:solidFill>
-                <a:latin typeface="Arial" charset="0"/>
-                <a:ea typeface="Lucida Sans Unicode" pitchFamily="34" charset="0"/>
-                <a:cs typeface="Lucida Sans Unicode" pitchFamily="34" charset="0"/>
-              </a:defRPr>
-            </a:lvl1pPr>
-            <a:lvl2pPr marL="742950" indent="-285750" defTabSz="463550" eaLnBrk="0" hangingPunct="0">
-              <a:tabLst>
-                <a:tab pos="746125" algn="l"/>
-                <a:tab pos="1492250" algn="l"/>
-                <a:tab pos="2238375" algn="l"/>
-                <a:tab pos="2986088" algn="l"/>
-                <a:tab pos="3732213" algn="l"/>
-              </a:tabLst>
-              <a:defRPr>
-                <a:solidFill>
-                  <a:schemeClr val="tx1"/>
-                </a:solidFill>
-                <a:latin typeface="Arial" charset="0"/>
-                <a:ea typeface="Lucida Sans Unicode" pitchFamily="34" charset="0"/>
-                <a:cs typeface="Lucida Sans Unicode" pitchFamily="34" charset="0"/>
-              </a:defRPr>
-            </a:lvl2pPr>
-            <a:lvl3pPr marL="1143000" indent="-228600" defTabSz="463550" eaLnBrk="0" hangingPunct="0">
-              <a:tabLst>
-                <a:tab pos="746125" algn="l"/>
-                <a:tab pos="1492250" algn="l"/>
-                <a:tab pos="2238375" algn="l"/>
-                <a:tab pos="2986088" algn="l"/>
-                <a:tab pos="3732213" algn="l"/>
-              </a:tabLst>
-              <a:defRPr>
-                <a:solidFill>
-                  <a:schemeClr val="tx1"/>
-                </a:solidFill>
-                <a:latin typeface="Arial" charset="0"/>
-                <a:ea typeface="Lucida Sans Unicode" pitchFamily="34" charset="0"/>
-                <a:cs typeface="Lucida Sans Unicode" pitchFamily="34" charset="0"/>
-              </a:defRPr>
-            </a:lvl3pPr>
-            <a:lvl4pPr marL="1600200" indent="-228600" defTabSz="463550" eaLnBrk="0" hangingPunct="0">
-              <a:tabLst>
-                <a:tab pos="746125" algn="l"/>
-                <a:tab pos="1492250" algn="l"/>
-                <a:tab pos="2238375" algn="l"/>
-                <a:tab pos="2986088" algn="l"/>
-                <a:tab pos="3732213" algn="l"/>
-              </a:tabLst>
-              <a:defRPr>
-                <a:solidFill>
-                  <a:schemeClr val="tx1"/>
-                </a:solidFill>
-                <a:latin typeface="Arial" charset="0"/>
-                <a:ea typeface="Lucida Sans Unicode" pitchFamily="34" charset="0"/>
-                <a:cs typeface="Lucida Sans Unicode" pitchFamily="34" charset="0"/>
-              </a:defRPr>
-            </a:lvl4pPr>
-            <a:lvl5pPr marL="2057400" indent="-228600" defTabSz="463550" eaLnBrk="0" hangingPunct="0">
-              <a:tabLst>
-                <a:tab pos="746125" algn="l"/>
-                <a:tab pos="1492250" algn="l"/>
-                <a:tab pos="2238375" algn="l"/>
-                <a:tab pos="2986088" algn="l"/>
-                <a:tab pos="3732213" algn="l"/>
-              </a:tabLst>
-              <a:defRPr>
-                <a:solidFill>
-                  <a:schemeClr val="tx1"/>
-                </a:solidFill>
-                <a:latin typeface="Arial" charset="0"/>
-                <a:ea typeface="Lucida Sans Unicode" pitchFamily="34" charset="0"/>
-                <a:cs typeface="Lucida Sans Unicode" pitchFamily="34" charset="0"/>
-              </a:defRPr>
-            </a:lvl5pPr>
-            <a:lvl6pPr marL="2514600" indent="-228600" algn="ctr" defTabSz="463550" eaLnBrk="0" fontAlgn="base" hangingPunct="0">
-              <a:lnSpc>
-                <a:spcPct val="93000"/>
-              </a:lnSpc>
-              <a:spcBef>
-                <a:spcPct val="0"/>
-              </a:spcBef>
-              <a:spcAft>
-                <a:spcPct val="0"/>
-              </a:spcAft>
-              <a:buClr>
-                <a:srgbClr val="000000"/>
-              </a:buClr>
-              <a:buSzPct val="100000"/>
-              <a:buFont typeface="Arial" charset="0"/>
-              <a:tabLst>
-                <a:tab pos="746125" algn="l"/>
-                <a:tab pos="1492250" algn="l"/>
-                <a:tab pos="2238375" algn="l"/>
-                <a:tab pos="2986088" algn="l"/>
-                <a:tab pos="3732213" algn="l"/>
-              </a:tabLst>
-              <a:defRPr>
-                <a:solidFill>
-                  <a:schemeClr val="tx1"/>
-                </a:solidFill>
-                <a:latin typeface="Arial" charset="0"/>
-                <a:ea typeface="Lucida Sans Unicode" pitchFamily="34" charset="0"/>
-                <a:cs typeface="Lucida Sans Unicode" pitchFamily="34" charset="0"/>
-              </a:defRPr>
-            </a:lvl6pPr>
-            <a:lvl7pPr marL="2971800" indent="-228600" algn="ctr" defTabSz="463550" eaLnBrk="0" fontAlgn="base" hangingPunct="0">
-              <a:lnSpc>
-                <a:spcPct val="93000"/>
-              </a:lnSpc>
-              <a:spcBef>
-                <a:spcPct val="0"/>
-              </a:spcBef>
-              <a:spcAft>
-                <a:spcPct val="0"/>
-              </a:spcAft>
-              <a:buClr>
-                <a:srgbClr val="000000"/>
-              </a:buClr>
-              <a:buSzPct val="100000"/>
-              <a:buFont typeface="Arial" charset="0"/>
-              <a:tabLst>
-                <a:tab pos="746125" algn="l"/>
-                <a:tab pos="1492250" algn="l"/>
-                <a:tab pos="2238375" algn="l"/>
-                <a:tab pos="2986088" algn="l"/>
-                <a:tab pos="3732213" algn="l"/>
-              </a:tabLst>
-              <a:defRPr>
-                <a:solidFill>
-                  <a:schemeClr val="tx1"/>
-                </a:solidFill>
-                <a:latin typeface="Arial" charset="0"/>
-                <a:ea typeface="Lucida Sans Unicode" pitchFamily="34" charset="0"/>
-                <a:cs typeface="Lucida Sans Unicode" pitchFamily="34" charset="0"/>
-              </a:defRPr>
-            </a:lvl7pPr>
-            <a:lvl8pPr marL="3429000" indent="-228600" algn="ctr" defTabSz="463550" eaLnBrk="0" fontAlgn="base" hangingPunct="0">
-              <a:lnSpc>
-                <a:spcPct val="93000"/>
-              </a:lnSpc>
-              <a:spcBef>
-                <a:spcPct val="0"/>
-              </a:spcBef>
-              <a:spcAft>
-                <a:spcPct val="0"/>
-              </a:spcAft>
-              <a:buClr>
-                <a:srgbClr val="000000"/>
-              </a:buClr>
-              <a:buSzPct val="100000"/>
-              <a:buFont typeface="Arial" charset="0"/>
-              <a:tabLst>
-                <a:tab pos="746125" algn="l"/>
-                <a:tab pos="1492250" algn="l"/>
-                <a:tab pos="2238375" algn="l"/>
-                <a:tab pos="2986088" algn="l"/>
-                <a:tab pos="3732213" algn="l"/>
-              </a:tabLst>
-              <a:defRPr>
-                <a:solidFill>
-                  <a:schemeClr val="tx1"/>
-                </a:solidFill>
-                <a:latin typeface="Arial" charset="0"/>
-                <a:ea typeface="Lucida Sans Unicode" pitchFamily="34" charset="0"/>
-                <a:cs typeface="Lucida Sans Unicode" pitchFamily="34" charset="0"/>
-              </a:defRPr>
-            </a:lvl8pPr>
-            <a:lvl9pPr marL="3886200" indent="-228600" algn="ctr" defTabSz="463550" eaLnBrk="0" fontAlgn="base" hangingPunct="0">
-              <a:lnSpc>
-                <a:spcPct val="93000"/>
-              </a:lnSpc>
-              <a:spcBef>
-                <a:spcPct val="0"/>
-              </a:spcBef>
-              <a:spcAft>
-                <a:spcPct val="0"/>
-              </a:spcAft>
-              <a:buClr>
-                <a:srgbClr val="000000"/>
-              </a:buClr>
-              <a:buSzPct val="100000"/>
-              <a:buFont typeface="Arial" charset="0"/>
-              <a:tabLst>
-                <a:tab pos="746125" algn="l"/>
-                <a:tab pos="1492250" algn="l"/>
-                <a:tab pos="2238375" algn="l"/>
-                <a:tab pos="2986088" algn="l"/>
-                <a:tab pos="3732213" algn="l"/>
-              </a:tabLst>
-              <a:defRPr>
-                <a:solidFill>
-                  <a:schemeClr val="tx1"/>
-                </a:solidFill>
-                <a:latin typeface="Arial" charset="0"/>
-                <a:ea typeface="Lucida Sans Unicode" pitchFamily="34" charset="0"/>
-                <a:cs typeface="Lucida Sans Unicode" pitchFamily="34" charset="0"/>
-              </a:defRPr>
-            </a:lvl9pPr>
-          </a:lstStyle>
-          <a:p>
-            <a:pPr eaLnBrk="1" hangingPunct="1"/>
-            <a:r>
-              <a:rPr lang="en-US" altLang="de-DE" smtClean="0">
-                <a:solidFill>
-                  <a:srgbClr val="000000"/>
-                </a:solidFill>
-                <a:latin typeface="Stafford" pitchFamily="2" charset="0"/>
-              </a:rPr>
-              <a:t>|  </a:t>
-            </a:r>
-          </a:p>
-        </p:txBody>
-      </p:sp>
-      <p:sp>
-        <p:nvSpPr>
-          <p:cNvPr id="53254" name="Foliennummernplatzhalter 5"/>
-          <p:cNvSpPr>
-            <a:spLocks noGrp="1"/>
-          </p:cNvSpPr>
-          <p:nvPr>
-            <p:ph type="sldNum" sz="quarter"/>
-          </p:nvPr>
-        </p:nvSpPr>
-        <p:spPr>
-          <a:noFill/>
-          <a:extLst>
-            <a:ext uri="{909E8E84-426E-40DD-AFC4-6F175D3DCCD1}">
-              <a14:hiddenFill xmlns:a14="http://schemas.microsoft.com/office/drawing/2010/main">
-                <a:solidFill>
-                  <a:srgbClr val="FFFFFF"/>
-                </a:solidFill>
-              </a14:hiddenFill>
-            </a:ext>
-            <a:ext uri="{91240B29-F687-4F45-9708-019B960494DF}">
-              <a14:hiddenLine xmlns:a14="http://schemas.microsoft.com/office/drawing/2010/main" w="9525">
-                <a:solidFill>
-                  <a:srgbClr val="000000"/>
-                </a:solidFill>
-                <a:miter lim="800000"/>
-                <a:headEnd/>
-                <a:tailEnd/>
-              </a14:hiddenLine>
-            </a:ext>
-          </a:extLst>
-        </p:spPr>
-        <p:txBody>
-          <a:bodyPr/>
-          <a:lstStyle>
-            <a:lvl1pPr defTabSz="463550" eaLnBrk="0" hangingPunct="0">
-              <a:tabLst>
-                <a:tab pos="746125" algn="l"/>
-              </a:tabLst>
-              <a:defRPr>
-                <a:solidFill>
-                  <a:schemeClr val="tx1"/>
-                </a:solidFill>
-                <a:latin typeface="Arial" charset="0"/>
-                <a:ea typeface="Lucida Sans Unicode" pitchFamily="34" charset="0"/>
-                <a:cs typeface="Lucida Sans Unicode" pitchFamily="34" charset="0"/>
-              </a:defRPr>
-            </a:lvl1pPr>
-            <a:lvl2pPr marL="742950" indent="-285750" defTabSz="463550" eaLnBrk="0" hangingPunct="0">
-              <a:tabLst>
-                <a:tab pos="746125" algn="l"/>
-              </a:tabLst>
-              <a:defRPr>
-                <a:solidFill>
-                  <a:schemeClr val="tx1"/>
-                </a:solidFill>
-                <a:latin typeface="Arial" charset="0"/>
-                <a:ea typeface="Lucida Sans Unicode" pitchFamily="34" charset="0"/>
-                <a:cs typeface="Lucida Sans Unicode" pitchFamily="34" charset="0"/>
-              </a:defRPr>
-            </a:lvl2pPr>
-            <a:lvl3pPr marL="1143000" indent="-228600" defTabSz="463550" eaLnBrk="0" hangingPunct="0">
-              <a:tabLst>
-                <a:tab pos="746125" algn="l"/>
-              </a:tabLst>
-              <a:defRPr>
-                <a:solidFill>
-                  <a:schemeClr val="tx1"/>
-                </a:solidFill>
-                <a:latin typeface="Arial" charset="0"/>
-                <a:ea typeface="Lucida Sans Unicode" pitchFamily="34" charset="0"/>
-                <a:cs typeface="Lucida Sans Unicode" pitchFamily="34" charset="0"/>
-              </a:defRPr>
-            </a:lvl3pPr>
-            <a:lvl4pPr marL="1600200" indent="-228600" defTabSz="463550" eaLnBrk="0" hangingPunct="0">
-              <a:tabLst>
-                <a:tab pos="746125" algn="l"/>
-              </a:tabLst>
-              <a:defRPr>
-                <a:solidFill>
-                  <a:schemeClr val="tx1"/>
-                </a:solidFill>
-                <a:latin typeface="Arial" charset="0"/>
-                <a:ea typeface="Lucida Sans Unicode" pitchFamily="34" charset="0"/>
-                <a:cs typeface="Lucida Sans Unicode" pitchFamily="34" charset="0"/>
-              </a:defRPr>
-            </a:lvl4pPr>
-            <a:lvl5pPr marL="2057400" indent="-228600" defTabSz="463550" eaLnBrk="0" hangingPunct="0">
-              <a:tabLst>
-                <a:tab pos="746125" algn="l"/>
-              </a:tabLst>
-              <a:defRPr>
-                <a:solidFill>
-                  <a:schemeClr val="tx1"/>
-                </a:solidFill>
-                <a:latin typeface="Arial" charset="0"/>
-                <a:ea typeface="Lucida Sans Unicode" pitchFamily="34" charset="0"/>
-                <a:cs typeface="Lucida Sans Unicode" pitchFamily="34" charset="0"/>
-              </a:defRPr>
-            </a:lvl5pPr>
-            <a:lvl6pPr marL="2514600" indent="-228600" algn="ctr" defTabSz="463550" eaLnBrk="0" fontAlgn="base" hangingPunct="0">
-              <a:lnSpc>
-                <a:spcPct val="93000"/>
-              </a:lnSpc>
-              <a:spcBef>
-                <a:spcPct val="0"/>
-              </a:spcBef>
-              <a:spcAft>
-                <a:spcPct val="0"/>
-              </a:spcAft>
-              <a:buClr>
-                <a:srgbClr val="000000"/>
-              </a:buClr>
-              <a:buSzPct val="100000"/>
-              <a:buFont typeface="Arial" charset="0"/>
-              <a:tabLst>
-                <a:tab pos="746125" algn="l"/>
-              </a:tabLst>
-              <a:defRPr>
-                <a:solidFill>
-                  <a:schemeClr val="tx1"/>
-                </a:solidFill>
-                <a:latin typeface="Arial" charset="0"/>
-                <a:ea typeface="Lucida Sans Unicode" pitchFamily="34" charset="0"/>
-                <a:cs typeface="Lucida Sans Unicode" pitchFamily="34" charset="0"/>
-              </a:defRPr>
-            </a:lvl6pPr>
-            <a:lvl7pPr marL="2971800" indent="-228600" algn="ctr" defTabSz="463550" eaLnBrk="0" fontAlgn="base" hangingPunct="0">
-              <a:lnSpc>
-                <a:spcPct val="93000"/>
-              </a:lnSpc>
-              <a:spcBef>
-                <a:spcPct val="0"/>
-              </a:spcBef>
-              <a:spcAft>
-                <a:spcPct val="0"/>
-              </a:spcAft>
-              <a:buClr>
-                <a:srgbClr val="000000"/>
-              </a:buClr>
-              <a:buSzPct val="100000"/>
-              <a:buFont typeface="Arial" charset="0"/>
-              <a:tabLst>
-                <a:tab pos="746125" algn="l"/>
-              </a:tabLst>
-              <a:defRPr>
-                <a:solidFill>
-                  <a:schemeClr val="tx1"/>
-                </a:solidFill>
-                <a:latin typeface="Arial" charset="0"/>
-                <a:ea typeface="Lucida Sans Unicode" pitchFamily="34" charset="0"/>
-                <a:cs typeface="Lucida Sans Unicode" pitchFamily="34" charset="0"/>
-              </a:defRPr>
-            </a:lvl7pPr>
-            <a:lvl8pPr marL="3429000" indent="-228600" algn="ctr" defTabSz="463550" eaLnBrk="0" fontAlgn="base" hangingPunct="0">
-              <a:lnSpc>
-                <a:spcPct val="93000"/>
-              </a:lnSpc>
-              <a:spcBef>
-                <a:spcPct val="0"/>
-              </a:spcBef>
-              <a:spcAft>
-                <a:spcPct val="0"/>
-              </a:spcAft>
-              <a:buClr>
-                <a:srgbClr val="000000"/>
-              </a:buClr>
-              <a:buSzPct val="100000"/>
-              <a:buFont typeface="Arial" charset="0"/>
-              <a:tabLst>
-                <a:tab pos="746125" algn="l"/>
-              </a:tabLst>
-              <a:defRPr>
-                <a:solidFill>
-                  <a:schemeClr val="tx1"/>
-                </a:solidFill>
-                <a:latin typeface="Arial" charset="0"/>
-                <a:ea typeface="Lucida Sans Unicode" pitchFamily="34" charset="0"/>
-                <a:cs typeface="Lucida Sans Unicode" pitchFamily="34" charset="0"/>
-              </a:defRPr>
-            </a:lvl8pPr>
-            <a:lvl9pPr marL="3886200" indent="-228600" algn="ctr" defTabSz="463550" eaLnBrk="0" fontAlgn="base" hangingPunct="0">
-              <a:lnSpc>
-                <a:spcPct val="93000"/>
-              </a:lnSpc>
-              <a:spcBef>
-                <a:spcPct val="0"/>
-              </a:spcBef>
-              <a:spcAft>
-                <a:spcPct val="0"/>
-              </a:spcAft>
-              <a:buClr>
-                <a:srgbClr val="000000"/>
-              </a:buClr>
-              <a:buSzPct val="100000"/>
-              <a:buFont typeface="Arial" charset="0"/>
-              <a:tabLst>
-                <a:tab pos="746125" algn="l"/>
-              </a:tabLst>
-              <a:defRPr>
-                <a:solidFill>
-                  <a:schemeClr val="tx1"/>
-                </a:solidFill>
-                <a:latin typeface="Arial" charset="0"/>
-                <a:ea typeface="Lucida Sans Unicode" pitchFamily="34" charset="0"/>
-                <a:cs typeface="Lucida Sans Unicode" pitchFamily="34" charset="0"/>
-              </a:defRPr>
-            </a:lvl9pPr>
-          </a:lstStyle>
-          <a:p>
-            <a:pPr eaLnBrk="1" hangingPunct="1"/>
-            <a:r>
-              <a:rPr lang="en-US" altLang="de-DE" smtClean="0">
-                <a:solidFill>
-                  <a:srgbClr val="000000"/>
-                </a:solidFill>
-                <a:latin typeface="Stafford" pitchFamily="2" charset="0"/>
-              </a:rPr>
-              <a:t>|  </a:t>
-            </a:r>
-            <a:fld id="{6775A062-1A8A-4084-8B81-E33BA407A859}" type="slidenum">
-              <a:rPr lang="en-US" altLang="de-DE" smtClean="0">
-                <a:solidFill>
-                  <a:srgbClr val="000000"/>
-                </a:solidFill>
-                <a:latin typeface="Stafford" pitchFamily="2" charset="0"/>
-              </a:rPr>
-              <a:pPr eaLnBrk="1" hangingPunct="1"/>
-              <a:t>7</a:t>
             </a:fld>
             <a:endParaRPr lang="en-US" altLang="de-DE" smtClean="0">
               <a:solidFill>
@@ -9069,7 +8166,7 @@
           <a:graphicData uri="http://schemas.openxmlformats.org/presentationml/2006/ole">
             <mc:AlternateContent xmlns:mc="http://schemas.openxmlformats.org/markup-compatibility/2006">
               <mc:Choice xmlns:v="urn:schemas-microsoft-com:vml" Requires="v">
-                <p:oleObj spid="_x0000_s1935" r:id="rId16" imgW="1038370" imgH="980952" progId="">
+                <p:oleObj spid="_x0000_s1936" r:id="rId16" imgW="1038370" imgH="980952" progId="">
                   <p:embed/>
                 </p:oleObj>
               </mc:Choice>
@@ -11137,11 +10234,7 @@
             </a:r>
             <a:r>
               <a:rPr lang="en-US" smtClean="0"/>
-              <a:t>C</a:t>
-            </a:r>
-            <a:r>
-              <a:rPr lang="en-US" smtClean="0"/>
-              <a:t>++(11) legen (= weniger Fokus auf C)?</a:t>
+              <a:t>C++(11) legen (= weniger Fokus auf C)?</a:t>
             </a:r>
             <a:endParaRPr lang="en-US" dirty="0" smtClean="0"/>
           </a:p>
@@ -11529,144 +10622,7 @@
           <a:p>
             <a:r>
               <a:rPr lang="de-DE" altLang="de-DE" smtClean="0"/>
-              <a:t>Tag 3:</a:t>
-            </a:r>
-            <a:r>
-              <a:rPr lang="de-DE" altLang="de-DE" smtClean="0"/>
-              <a:t> Nachmittag</a:t>
-            </a:r>
-            <a:endParaRPr lang="de-DE" altLang="de-DE" dirty="0" smtClean="0"/>
-          </a:p>
-        </p:txBody>
-      </p:sp>
-      <p:sp>
-        <p:nvSpPr>
-          <p:cNvPr id="2" name="Inhaltsplatzhalter 1"/>
-          <p:cNvSpPr>
-            <a:spLocks noGrp="1"/>
-          </p:cNvSpPr>
-          <p:nvPr>
-            <p:ph idx="1"/>
-          </p:nvPr>
-        </p:nvSpPr>
-        <p:spPr/>
-        <p:txBody>
-          <a:bodyPr/>
-          <a:lstStyle/>
-          <a:p>
-            <a:r>
-              <a:rPr lang="de-DE" altLang="de-DE" b="1" smtClean="0"/>
-              <a:t>Übrigens</a:t>
-            </a:r>
-            <a:r>
-              <a:rPr lang="de-DE" altLang="de-DE" smtClean="0"/>
-              <a:t>: Nicht vergessen, hin und wieder mal zu pullen</a:t>
-            </a:r>
-          </a:p>
-          <a:p>
-            <a:pPr marL="342900" indent="-342900">
-              <a:buFontTx/>
-              <a:buChar char="-"/>
-            </a:pPr>
-            <a:r>
-              <a:rPr lang="de-DE" altLang="de-DE" smtClean="0"/>
-              <a:t>Beide Repositories</a:t>
-            </a:r>
-          </a:p>
-          <a:p>
-            <a:pPr marL="342900" indent="-342900">
-              <a:buFontTx/>
-              <a:buChar char="-"/>
-            </a:pPr>
-            <a:r>
-              <a:rPr lang="de-DE" b="1" smtClean="0"/>
-              <a:t>Eher </a:t>
-            </a:r>
-            <a:r>
-              <a:rPr lang="de-DE" b="1"/>
-              <a:t>kleine Bugfixes.</a:t>
-            </a:r>
-            <a:endParaRPr lang="en-US" b="1"/>
-          </a:p>
-          <a:p>
-            <a:pPr marL="342900" indent="-342900">
-              <a:buFontTx/>
-              <a:buChar char="-"/>
-            </a:pPr>
-            <a:r>
-              <a:rPr lang="de-DE" smtClean="0"/>
-              <a:t>Foliennummerierung sollte stabil bleiben</a:t>
-            </a:r>
-          </a:p>
-        </p:txBody>
-      </p:sp>
-    </p:spTree>
-    <p:extLst>
-      <p:ext uri="{BB962C8B-B14F-4D97-AF65-F5344CB8AC3E}">
-        <p14:creationId xmlns:p14="http://schemas.microsoft.com/office/powerpoint/2010/main" val="1909812110"/>
-      </p:ext>
-    </p:extLst>
-  </p:cSld>
-  <p:clrMapOvr>
-    <a:masterClrMapping/>
-  </p:clrMapOvr>
-  <mc:AlternateContent xmlns:mc="http://schemas.openxmlformats.org/markup-compatibility/2006" xmlns:p14="http://schemas.microsoft.com/office/powerpoint/2010/main">
-    <mc:Choice Requires="p14">
-      <p:transition spd="slow" p14:dur="2000"/>
-    </mc:Choice>
-    <mc:Fallback xmlns="">
-      <p:transition spd="slow"/>
-    </mc:Fallback>
-  </mc:AlternateContent>
-  <p:timing>
-    <p:tnLst>
-      <p:par>
-        <p:cTn id="1" dur="indefinite" restart="never" nodeType="tmRoot"/>
-      </p:par>
-    </p:tnLst>
-  </p:timing>
-</p:sld>
-</file>
-
-<file path=ppt/slides/slide7.xml><?xml version="1.0" encoding="utf-8"?>
-<p:sld xmlns:a="http://schemas.openxmlformats.org/drawingml/2006/main" xmlns:r="http://schemas.openxmlformats.org/officeDocument/2006/relationships" xmlns:p="http://schemas.openxmlformats.org/presentationml/2006/main">
-  <p:cSld>
-    <p:spTree>
-      <p:nvGrpSpPr>
-        <p:cNvPr id="1" name=""/>
-        <p:cNvGrpSpPr/>
-        <p:nvPr/>
-      </p:nvGrpSpPr>
-      <p:grpSpPr>
-        <a:xfrm>
-          <a:off x="0" y="0"/>
-          <a:ext cx="0" cy="0"/>
-          <a:chOff x="0" y="0"/>
-          <a:chExt cx="0" cy="0"/>
-        </a:xfrm>
-      </p:grpSpPr>
-      <p:sp>
-        <p:nvSpPr>
-          <p:cNvPr id="15362" name="Titel 1"/>
-          <p:cNvSpPr>
-            <a:spLocks noGrp="1"/>
-          </p:cNvSpPr>
-          <p:nvPr>
-            <p:ph type="title"/>
-          </p:nvPr>
-        </p:nvSpPr>
-        <p:spPr/>
-        <p:txBody>
-          <a:bodyPr/>
-          <a:lstStyle/>
-          <a:p>
-            <a:r>
-              <a:rPr lang="de-DE" altLang="de-DE" smtClean="0"/>
-              <a:t>Tag 4:</a:t>
-            </a:r>
-            <a:r>
-              <a:rPr lang="de-DE" altLang="de-DE" smtClean="0"/>
-              <a:t> Rückschau und Aufwärmübungen</a:t>
+              <a:t>Tag 4: Rückschau und Aufwärmübungen</a:t>
             </a:r>
             <a:endParaRPr lang="de-DE" altLang="de-DE" dirty="0" smtClean="0"/>
           </a:p>

</xml_diff>

<commit_message>
Bugfixing: Add missing std:: prefixes and terms
</commit_message>
<xml_diff>
--- a/2016/week1__recap_and_warmup_slides.pptx
+++ b/2016/week1__recap_and_warmup_slides.pptx
@@ -5,10 +5,10 @@
     <p:sldMasterId id="2147483650" r:id="rId1"/>
   </p:sldMasterIdLst>
   <p:notesMasterIdLst>
-    <p:notesMasterId r:id="rId8"/>
+    <p:notesMasterId r:id="rId9"/>
   </p:notesMasterIdLst>
   <p:handoutMasterIdLst>
-    <p:handoutMasterId r:id="rId9"/>
+    <p:handoutMasterId r:id="rId10"/>
   </p:handoutMasterIdLst>
   <p:sldIdLst>
     <p:sldId id="454" r:id="rId2"/>
@@ -17,6 +17,7 @@
     <p:sldId id="457" r:id="rId5"/>
     <p:sldId id="465" r:id="rId6"/>
     <p:sldId id="467" r:id="rId7"/>
+    <p:sldId id="468" r:id="rId8"/>
   </p:sldIdLst>
   <p:sldSz cx="9144000" cy="6858000" type="screen4x3"/>
   <p:notesSz cx="7099300" cy="10234613"/>
@@ -196,6 +197,7 @@
             <p14:sldId id="457"/>
             <p14:sldId id="465"/>
             <p14:sldId id="467"/>
+            <p14:sldId id="468"/>
           </p14:sldIdLst>
         </p14:section>
       </p14:sectionLst>
@@ -3728,6 +3730,826 @@
 </p:notes>
 </file>
 
+<file path=ppt/notesSlides/notesSlide4.xml><?xml version="1.0" encoding="utf-8"?>
+<p:notes xmlns:a="http://schemas.openxmlformats.org/drawingml/2006/main" xmlns:r="http://schemas.openxmlformats.org/officeDocument/2006/relationships" xmlns:p="http://schemas.openxmlformats.org/presentationml/2006/main">
+  <p:cSld>
+    <p:spTree>
+      <p:nvGrpSpPr>
+        <p:cNvPr id="1" name=""/>
+        <p:cNvGrpSpPr/>
+        <p:nvPr/>
+      </p:nvGrpSpPr>
+      <p:grpSpPr>
+        <a:xfrm>
+          <a:off x="0" y="0"/>
+          <a:ext cx="0" cy="0"/>
+          <a:chOff x="0" y="0"/>
+          <a:chExt cx="0" cy="0"/>
+        </a:xfrm>
+      </p:grpSpPr>
+      <p:sp>
+        <p:nvSpPr>
+          <p:cNvPr id="53250" name="Folienbildplatzhalter 1"/>
+          <p:cNvSpPr>
+            <a:spLocks noGrp="1" noRot="1" noChangeAspect="1" noTextEdit="1"/>
+          </p:cNvSpPr>
+          <p:nvPr>
+            <p:ph type="sldImg"/>
+          </p:nvPr>
+        </p:nvSpPr>
+        <p:spPr>
+          <a:ln/>
+        </p:spPr>
+      </p:sp>
+      <p:sp>
+        <p:nvSpPr>
+          <p:cNvPr id="53251" name="Notizenplatzhalter 2"/>
+          <p:cNvSpPr>
+            <a:spLocks noGrp="1"/>
+          </p:cNvSpPr>
+          <p:nvPr>
+            <p:ph type="body" idx="1"/>
+          </p:nvPr>
+        </p:nvSpPr>
+        <p:spPr>
+          <a:noFill/>
+          <a:extLst>
+            <a:ext uri="{909E8E84-426E-40DD-AFC4-6F175D3DCCD1}">
+              <a14:hiddenFill xmlns:a14="http://schemas.microsoft.com/office/drawing/2010/main">
+                <a:solidFill>
+                  <a:srgbClr val="FFFFFF"/>
+                </a:solidFill>
+              </a14:hiddenFill>
+            </a:ext>
+            <a:ext uri="{91240B29-F687-4F45-9708-019B960494DF}">
+              <a14:hiddenLine xmlns:a14="http://schemas.microsoft.com/office/drawing/2010/main" w="9525">
+                <a:solidFill>
+                  <a:srgbClr val="000000"/>
+                </a:solidFill>
+                <a:miter lim="800000"/>
+                <a:headEnd/>
+                <a:tailEnd/>
+              </a14:hiddenLine>
+            </a:ext>
+          </a:extLst>
+        </p:spPr>
+        <p:txBody>
+          <a:bodyPr/>
+          <a:lstStyle/>
+          <a:p>
+            <a:pPr marL="0" indent="0">
+              <a:buFontTx/>
+              <a:buNone/>
+            </a:pPr>
+            <a:endParaRPr lang="de-DE" altLang="de-DE" b="1" i="0" dirty="0" smtClean="0">
+              <a:latin typeface="Times New Roman" pitchFamily="16" charset="0"/>
+            </a:endParaRPr>
+          </a:p>
+        </p:txBody>
+      </p:sp>
+      <p:sp>
+        <p:nvSpPr>
+          <p:cNvPr id="53252" name="Datumsplatzhalter 3"/>
+          <p:cNvSpPr>
+            <a:spLocks noGrp="1"/>
+          </p:cNvSpPr>
+          <p:nvPr>
+            <p:ph type="dt" sz="quarter"/>
+          </p:nvPr>
+        </p:nvSpPr>
+        <p:spPr>
+          <a:noFill/>
+          <a:extLst>
+            <a:ext uri="{909E8E84-426E-40DD-AFC4-6F175D3DCCD1}">
+              <a14:hiddenFill xmlns:a14="http://schemas.microsoft.com/office/drawing/2010/main">
+                <a:solidFill>
+                  <a:srgbClr val="FFFFFF"/>
+                </a:solidFill>
+              </a14:hiddenFill>
+            </a:ext>
+            <a:ext uri="{91240B29-F687-4F45-9708-019B960494DF}">
+              <a14:hiddenLine xmlns:a14="http://schemas.microsoft.com/office/drawing/2010/main" w="9525">
+                <a:solidFill>
+                  <a:srgbClr val="000000"/>
+                </a:solidFill>
+                <a:miter lim="800000"/>
+                <a:headEnd/>
+                <a:tailEnd/>
+              </a14:hiddenLine>
+            </a:ext>
+          </a:extLst>
+        </p:spPr>
+        <p:txBody>
+          <a:bodyPr/>
+          <a:lstStyle>
+            <a:lvl1pPr defTabSz="463550" eaLnBrk="0" hangingPunct="0">
+              <a:tabLst>
+                <a:tab pos="746125" algn="l"/>
+                <a:tab pos="1492250" algn="l"/>
+              </a:tabLst>
+              <a:defRPr>
+                <a:solidFill>
+                  <a:schemeClr val="tx1"/>
+                </a:solidFill>
+                <a:latin typeface="Arial" charset="0"/>
+                <a:ea typeface="Lucida Sans Unicode" pitchFamily="34" charset="0"/>
+                <a:cs typeface="Lucida Sans Unicode" pitchFamily="34" charset="0"/>
+              </a:defRPr>
+            </a:lvl1pPr>
+            <a:lvl2pPr marL="742950" indent="-285750" defTabSz="463550" eaLnBrk="0" hangingPunct="0">
+              <a:tabLst>
+                <a:tab pos="746125" algn="l"/>
+                <a:tab pos="1492250" algn="l"/>
+              </a:tabLst>
+              <a:defRPr>
+                <a:solidFill>
+                  <a:schemeClr val="tx1"/>
+                </a:solidFill>
+                <a:latin typeface="Arial" charset="0"/>
+                <a:ea typeface="Lucida Sans Unicode" pitchFamily="34" charset="0"/>
+                <a:cs typeface="Lucida Sans Unicode" pitchFamily="34" charset="0"/>
+              </a:defRPr>
+            </a:lvl2pPr>
+            <a:lvl3pPr marL="1143000" indent="-228600" defTabSz="463550" eaLnBrk="0" hangingPunct="0">
+              <a:tabLst>
+                <a:tab pos="746125" algn="l"/>
+                <a:tab pos="1492250" algn="l"/>
+              </a:tabLst>
+              <a:defRPr>
+                <a:solidFill>
+                  <a:schemeClr val="tx1"/>
+                </a:solidFill>
+                <a:latin typeface="Arial" charset="0"/>
+                <a:ea typeface="Lucida Sans Unicode" pitchFamily="34" charset="0"/>
+                <a:cs typeface="Lucida Sans Unicode" pitchFamily="34" charset="0"/>
+              </a:defRPr>
+            </a:lvl3pPr>
+            <a:lvl4pPr marL="1600200" indent="-228600" defTabSz="463550" eaLnBrk="0" hangingPunct="0">
+              <a:tabLst>
+                <a:tab pos="746125" algn="l"/>
+                <a:tab pos="1492250" algn="l"/>
+              </a:tabLst>
+              <a:defRPr>
+                <a:solidFill>
+                  <a:schemeClr val="tx1"/>
+                </a:solidFill>
+                <a:latin typeface="Arial" charset="0"/>
+                <a:ea typeface="Lucida Sans Unicode" pitchFamily="34" charset="0"/>
+                <a:cs typeface="Lucida Sans Unicode" pitchFamily="34" charset="0"/>
+              </a:defRPr>
+            </a:lvl4pPr>
+            <a:lvl5pPr marL="2057400" indent="-228600" defTabSz="463550" eaLnBrk="0" hangingPunct="0">
+              <a:tabLst>
+                <a:tab pos="746125" algn="l"/>
+                <a:tab pos="1492250" algn="l"/>
+              </a:tabLst>
+              <a:defRPr>
+                <a:solidFill>
+                  <a:schemeClr val="tx1"/>
+                </a:solidFill>
+                <a:latin typeface="Arial" charset="0"/>
+                <a:ea typeface="Lucida Sans Unicode" pitchFamily="34" charset="0"/>
+                <a:cs typeface="Lucida Sans Unicode" pitchFamily="34" charset="0"/>
+              </a:defRPr>
+            </a:lvl5pPr>
+            <a:lvl6pPr marL="2514600" indent="-228600" algn="ctr" defTabSz="463550" eaLnBrk="0" fontAlgn="base" hangingPunct="0">
+              <a:lnSpc>
+                <a:spcPct val="93000"/>
+              </a:lnSpc>
+              <a:spcBef>
+                <a:spcPct val="0"/>
+              </a:spcBef>
+              <a:spcAft>
+                <a:spcPct val="0"/>
+              </a:spcAft>
+              <a:buClr>
+                <a:srgbClr val="000000"/>
+              </a:buClr>
+              <a:buSzPct val="100000"/>
+              <a:buFont typeface="Arial" charset="0"/>
+              <a:tabLst>
+                <a:tab pos="746125" algn="l"/>
+                <a:tab pos="1492250" algn="l"/>
+              </a:tabLst>
+              <a:defRPr>
+                <a:solidFill>
+                  <a:schemeClr val="tx1"/>
+                </a:solidFill>
+                <a:latin typeface="Arial" charset="0"/>
+                <a:ea typeface="Lucida Sans Unicode" pitchFamily="34" charset="0"/>
+                <a:cs typeface="Lucida Sans Unicode" pitchFamily="34" charset="0"/>
+              </a:defRPr>
+            </a:lvl6pPr>
+            <a:lvl7pPr marL="2971800" indent="-228600" algn="ctr" defTabSz="463550" eaLnBrk="0" fontAlgn="base" hangingPunct="0">
+              <a:lnSpc>
+                <a:spcPct val="93000"/>
+              </a:lnSpc>
+              <a:spcBef>
+                <a:spcPct val="0"/>
+              </a:spcBef>
+              <a:spcAft>
+                <a:spcPct val="0"/>
+              </a:spcAft>
+              <a:buClr>
+                <a:srgbClr val="000000"/>
+              </a:buClr>
+              <a:buSzPct val="100000"/>
+              <a:buFont typeface="Arial" charset="0"/>
+              <a:tabLst>
+                <a:tab pos="746125" algn="l"/>
+                <a:tab pos="1492250" algn="l"/>
+              </a:tabLst>
+              <a:defRPr>
+                <a:solidFill>
+                  <a:schemeClr val="tx1"/>
+                </a:solidFill>
+                <a:latin typeface="Arial" charset="0"/>
+                <a:ea typeface="Lucida Sans Unicode" pitchFamily="34" charset="0"/>
+                <a:cs typeface="Lucida Sans Unicode" pitchFamily="34" charset="0"/>
+              </a:defRPr>
+            </a:lvl7pPr>
+            <a:lvl8pPr marL="3429000" indent="-228600" algn="ctr" defTabSz="463550" eaLnBrk="0" fontAlgn="base" hangingPunct="0">
+              <a:lnSpc>
+                <a:spcPct val="93000"/>
+              </a:lnSpc>
+              <a:spcBef>
+                <a:spcPct val="0"/>
+              </a:spcBef>
+              <a:spcAft>
+                <a:spcPct val="0"/>
+              </a:spcAft>
+              <a:buClr>
+                <a:srgbClr val="000000"/>
+              </a:buClr>
+              <a:buSzPct val="100000"/>
+              <a:buFont typeface="Arial" charset="0"/>
+              <a:tabLst>
+                <a:tab pos="746125" algn="l"/>
+                <a:tab pos="1492250" algn="l"/>
+              </a:tabLst>
+              <a:defRPr>
+                <a:solidFill>
+                  <a:schemeClr val="tx1"/>
+                </a:solidFill>
+                <a:latin typeface="Arial" charset="0"/>
+                <a:ea typeface="Lucida Sans Unicode" pitchFamily="34" charset="0"/>
+                <a:cs typeface="Lucida Sans Unicode" pitchFamily="34" charset="0"/>
+              </a:defRPr>
+            </a:lvl8pPr>
+            <a:lvl9pPr marL="3886200" indent="-228600" algn="ctr" defTabSz="463550" eaLnBrk="0" fontAlgn="base" hangingPunct="0">
+              <a:lnSpc>
+                <a:spcPct val="93000"/>
+              </a:lnSpc>
+              <a:spcBef>
+                <a:spcPct val="0"/>
+              </a:spcBef>
+              <a:spcAft>
+                <a:spcPct val="0"/>
+              </a:spcAft>
+              <a:buClr>
+                <a:srgbClr val="000000"/>
+              </a:buClr>
+              <a:buSzPct val="100000"/>
+              <a:buFont typeface="Arial" charset="0"/>
+              <a:tabLst>
+                <a:tab pos="746125" algn="l"/>
+                <a:tab pos="1492250" algn="l"/>
+              </a:tabLst>
+              <a:defRPr>
+                <a:solidFill>
+                  <a:schemeClr val="tx1"/>
+                </a:solidFill>
+                <a:latin typeface="Arial" charset="0"/>
+                <a:ea typeface="Lucida Sans Unicode" pitchFamily="34" charset="0"/>
+                <a:cs typeface="Lucida Sans Unicode" pitchFamily="34" charset="0"/>
+              </a:defRPr>
+            </a:lvl9pPr>
+          </a:lstStyle>
+          <a:p>
+            <a:pPr eaLnBrk="1" hangingPunct="1"/>
+            <a:r>
+              <a:rPr lang="en-US" altLang="de-DE" smtClean="0">
+                <a:solidFill>
+                  <a:srgbClr val="000000"/>
+                </a:solidFill>
+                <a:latin typeface="Stafford" pitchFamily="2" charset="0"/>
+              </a:rPr>
+              <a:t>November 19, 2007</a:t>
+            </a:r>
+          </a:p>
+        </p:txBody>
+      </p:sp>
+      <p:sp>
+        <p:nvSpPr>
+          <p:cNvPr id="53253" name="Fußzeilenplatzhalter 4"/>
+          <p:cNvSpPr>
+            <a:spLocks noGrp="1"/>
+          </p:cNvSpPr>
+          <p:nvPr>
+            <p:ph type="ftr" sz="quarter"/>
+          </p:nvPr>
+        </p:nvSpPr>
+        <p:spPr>
+          <a:noFill/>
+          <a:extLst>
+            <a:ext uri="{909E8E84-426E-40DD-AFC4-6F175D3DCCD1}">
+              <a14:hiddenFill xmlns:a14="http://schemas.microsoft.com/office/drawing/2010/main">
+                <a:solidFill>
+                  <a:srgbClr val="FFFFFF"/>
+                </a:solidFill>
+              </a14:hiddenFill>
+            </a:ext>
+            <a:ext uri="{91240B29-F687-4F45-9708-019B960494DF}">
+              <a14:hiddenLine xmlns:a14="http://schemas.microsoft.com/office/drawing/2010/main" w="9525">
+                <a:solidFill>
+                  <a:srgbClr val="000000"/>
+                </a:solidFill>
+                <a:miter lim="800000"/>
+                <a:headEnd/>
+                <a:tailEnd/>
+              </a14:hiddenLine>
+            </a:ext>
+          </a:extLst>
+        </p:spPr>
+        <p:txBody>
+          <a:bodyPr/>
+          <a:lstStyle>
+            <a:lvl1pPr defTabSz="463550" eaLnBrk="0" hangingPunct="0">
+              <a:tabLst>
+                <a:tab pos="746125" algn="l"/>
+                <a:tab pos="1492250" algn="l"/>
+                <a:tab pos="2238375" algn="l"/>
+                <a:tab pos="2986088" algn="l"/>
+                <a:tab pos="3732213" algn="l"/>
+              </a:tabLst>
+              <a:defRPr>
+                <a:solidFill>
+                  <a:schemeClr val="tx1"/>
+                </a:solidFill>
+                <a:latin typeface="Arial" charset="0"/>
+                <a:ea typeface="Lucida Sans Unicode" pitchFamily="34" charset="0"/>
+                <a:cs typeface="Lucida Sans Unicode" pitchFamily="34" charset="0"/>
+              </a:defRPr>
+            </a:lvl1pPr>
+            <a:lvl2pPr marL="742950" indent="-285750" defTabSz="463550" eaLnBrk="0" hangingPunct="0">
+              <a:tabLst>
+                <a:tab pos="746125" algn="l"/>
+                <a:tab pos="1492250" algn="l"/>
+                <a:tab pos="2238375" algn="l"/>
+                <a:tab pos="2986088" algn="l"/>
+                <a:tab pos="3732213" algn="l"/>
+              </a:tabLst>
+              <a:defRPr>
+                <a:solidFill>
+                  <a:schemeClr val="tx1"/>
+                </a:solidFill>
+                <a:latin typeface="Arial" charset="0"/>
+                <a:ea typeface="Lucida Sans Unicode" pitchFamily="34" charset="0"/>
+                <a:cs typeface="Lucida Sans Unicode" pitchFamily="34" charset="0"/>
+              </a:defRPr>
+            </a:lvl2pPr>
+            <a:lvl3pPr marL="1143000" indent="-228600" defTabSz="463550" eaLnBrk="0" hangingPunct="0">
+              <a:tabLst>
+                <a:tab pos="746125" algn="l"/>
+                <a:tab pos="1492250" algn="l"/>
+                <a:tab pos="2238375" algn="l"/>
+                <a:tab pos="2986088" algn="l"/>
+                <a:tab pos="3732213" algn="l"/>
+              </a:tabLst>
+              <a:defRPr>
+                <a:solidFill>
+                  <a:schemeClr val="tx1"/>
+                </a:solidFill>
+                <a:latin typeface="Arial" charset="0"/>
+                <a:ea typeface="Lucida Sans Unicode" pitchFamily="34" charset="0"/>
+                <a:cs typeface="Lucida Sans Unicode" pitchFamily="34" charset="0"/>
+              </a:defRPr>
+            </a:lvl3pPr>
+            <a:lvl4pPr marL="1600200" indent="-228600" defTabSz="463550" eaLnBrk="0" hangingPunct="0">
+              <a:tabLst>
+                <a:tab pos="746125" algn="l"/>
+                <a:tab pos="1492250" algn="l"/>
+                <a:tab pos="2238375" algn="l"/>
+                <a:tab pos="2986088" algn="l"/>
+                <a:tab pos="3732213" algn="l"/>
+              </a:tabLst>
+              <a:defRPr>
+                <a:solidFill>
+                  <a:schemeClr val="tx1"/>
+                </a:solidFill>
+                <a:latin typeface="Arial" charset="0"/>
+                <a:ea typeface="Lucida Sans Unicode" pitchFamily="34" charset="0"/>
+                <a:cs typeface="Lucida Sans Unicode" pitchFamily="34" charset="0"/>
+              </a:defRPr>
+            </a:lvl4pPr>
+            <a:lvl5pPr marL="2057400" indent="-228600" defTabSz="463550" eaLnBrk="0" hangingPunct="0">
+              <a:tabLst>
+                <a:tab pos="746125" algn="l"/>
+                <a:tab pos="1492250" algn="l"/>
+                <a:tab pos="2238375" algn="l"/>
+                <a:tab pos="2986088" algn="l"/>
+                <a:tab pos="3732213" algn="l"/>
+              </a:tabLst>
+              <a:defRPr>
+                <a:solidFill>
+                  <a:schemeClr val="tx1"/>
+                </a:solidFill>
+                <a:latin typeface="Arial" charset="0"/>
+                <a:ea typeface="Lucida Sans Unicode" pitchFamily="34" charset="0"/>
+                <a:cs typeface="Lucida Sans Unicode" pitchFamily="34" charset="0"/>
+              </a:defRPr>
+            </a:lvl5pPr>
+            <a:lvl6pPr marL="2514600" indent="-228600" algn="ctr" defTabSz="463550" eaLnBrk="0" fontAlgn="base" hangingPunct="0">
+              <a:lnSpc>
+                <a:spcPct val="93000"/>
+              </a:lnSpc>
+              <a:spcBef>
+                <a:spcPct val="0"/>
+              </a:spcBef>
+              <a:spcAft>
+                <a:spcPct val="0"/>
+              </a:spcAft>
+              <a:buClr>
+                <a:srgbClr val="000000"/>
+              </a:buClr>
+              <a:buSzPct val="100000"/>
+              <a:buFont typeface="Arial" charset="0"/>
+              <a:tabLst>
+                <a:tab pos="746125" algn="l"/>
+                <a:tab pos="1492250" algn="l"/>
+                <a:tab pos="2238375" algn="l"/>
+                <a:tab pos="2986088" algn="l"/>
+                <a:tab pos="3732213" algn="l"/>
+              </a:tabLst>
+              <a:defRPr>
+                <a:solidFill>
+                  <a:schemeClr val="tx1"/>
+                </a:solidFill>
+                <a:latin typeface="Arial" charset="0"/>
+                <a:ea typeface="Lucida Sans Unicode" pitchFamily="34" charset="0"/>
+                <a:cs typeface="Lucida Sans Unicode" pitchFamily="34" charset="0"/>
+              </a:defRPr>
+            </a:lvl6pPr>
+            <a:lvl7pPr marL="2971800" indent="-228600" algn="ctr" defTabSz="463550" eaLnBrk="0" fontAlgn="base" hangingPunct="0">
+              <a:lnSpc>
+                <a:spcPct val="93000"/>
+              </a:lnSpc>
+              <a:spcBef>
+                <a:spcPct val="0"/>
+              </a:spcBef>
+              <a:spcAft>
+                <a:spcPct val="0"/>
+              </a:spcAft>
+              <a:buClr>
+                <a:srgbClr val="000000"/>
+              </a:buClr>
+              <a:buSzPct val="100000"/>
+              <a:buFont typeface="Arial" charset="0"/>
+              <a:tabLst>
+                <a:tab pos="746125" algn="l"/>
+                <a:tab pos="1492250" algn="l"/>
+                <a:tab pos="2238375" algn="l"/>
+                <a:tab pos="2986088" algn="l"/>
+                <a:tab pos="3732213" algn="l"/>
+              </a:tabLst>
+              <a:defRPr>
+                <a:solidFill>
+                  <a:schemeClr val="tx1"/>
+                </a:solidFill>
+                <a:latin typeface="Arial" charset="0"/>
+                <a:ea typeface="Lucida Sans Unicode" pitchFamily="34" charset="0"/>
+                <a:cs typeface="Lucida Sans Unicode" pitchFamily="34" charset="0"/>
+              </a:defRPr>
+            </a:lvl7pPr>
+            <a:lvl8pPr marL="3429000" indent="-228600" algn="ctr" defTabSz="463550" eaLnBrk="0" fontAlgn="base" hangingPunct="0">
+              <a:lnSpc>
+                <a:spcPct val="93000"/>
+              </a:lnSpc>
+              <a:spcBef>
+                <a:spcPct val="0"/>
+              </a:spcBef>
+              <a:spcAft>
+                <a:spcPct val="0"/>
+              </a:spcAft>
+              <a:buClr>
+                <a:srgbClr val="000000"/>
+              </a:buClr>
+              <a:buSzPct val="100000"/>
+              <a:buFont typeface="Arial" charset="0"/>
+              <a:tabLst>
+                <a:tab pos="746125" algn="l"/>
+                <a:tab pos="1492250" algn="l"/>
+                <a:tab pos="2238375" algn="l"/>
+                <a:tab pos="2986088" algn="l"/>
+                <a:tab pos="3732213" algn="l"/>
+              </a:tabLst>
+              <a:defRPr>
+                <a:solidFill>
+                  <a:schemeClr val="tx1"/>
+                </a:solidFill>
+                <a:latin typeface="Arial" charset="0"/>
+                <a:ea typeface="Lucida Sans Unicode" pitchFamily="34" charset="0"/>
+                <a:cs typeface="Lucida Sans Unicode" pitchFamily="34" charset="0"/>
+              </a:defRPr>
+            </a:lvl8pPr>
+            <a:lvl9pPr marL="3886200" indent="-228600" algn="ctr" defTabSz="463550" eaLnBrk="0" fontAlgn="base" hangingPunct="0">
+              <a:lnSpc>
+                <a:spcPct val="93000"/>
+              </a:lnSpc>
+              <a:spcBef>
+                <a:spcPct val="0"/>
+              </a:spcBef>
+              <a:spcAft>
+                <a:spcPct val="0"/>
+              </a:spcAft>
+              <a:buClr>
+                <a:srgbClr val="000000"/>
+              </a:buClr>
+              <a:buSzPct val="100000"/>
+              <a:buFont typeface="Arial" charset="0"/>
+              <a:tabLst>
+                <a:tab pos="746125" algn="l"/>
+                <a:tab pos="1492250" algn="l"/>
+                <a:tab pos="2238375" algn="l"/>
+                <a:tab pos="2986088" algn="l"/>
+                <a:tab pos="3732213" algn="l"/>
+              </a:tabLst>
+              <a:defRPr>
+                <a:solidFill>
+                  <a:schemeClr val="tx1"/>
+                </a:solidFill>
+                <a:latin typeface="Arial" charset="0"/>
+                <a:ea typeface="Lucida Sans Unicode" pitchFamily="34" charset="0"/>
+                <a:cs typeface="Lucida Sans Unicode" pitchFamily="34" charset="0"/>
+              </a:defRPr>
+            </a:lvl9pPr>
+          </a:lstStyle>
+          <a:p>
+            <a:pPr eaLnBrk="1" hangingPunct="1"/>
+            <a:r>
+              <a:rPr lang="en-US" altLang="de-DE" smtClean="0">
+                <a:solidFill>
+                  <a:srgbClr val="000000"/>
+                </a:solidFill>
+                <a:latin typeface="Stafford" pitchFamily="2" charset="0"/>
+              </a:rPr>
+              <a:t>|  </a:t>
+            </a:r>
+          </a:p>
+        </p:txBody>
+      </p:sp>
+      <p:sp>
+        <p:nvSpPr>
+          <p:cNvPr id="53254" name="Foliennummernplatzhalter 5"/>
+          <p:cNvSpPr>
+            <a:spLocks noGrp="1"/>
+          </p:cNvSpPr>
+          <p:nvPr>
+            <p:ph type="sldNum" sz="quarter"/>
+          </p:nvPr>
+        </p:nvSpPr>
+        <p:spPr>
+          <a:noFill/>
+          <a:extLst>
+            <a:ext uri="{909E8E84-426E-40DD-AFC4-6F175D3DCCD1}">
+              <a14:hiddenFill xmlns:a14="http://schemas.microsoft.com/office/drawing/2010/main">
+                <a:solidFill>
+                  <a:srgbClr val="FFFFFF"/>
+                </a:solidFill>
+              </a14:hiddenFill>
+            </a:ext>
+            <a:ext uri="{91240B29-F687-4F45-9708-019B960494DF}">
+              <a14:hiddenLine xmlns:a14="http://schemas.microsoft.com/office/drawing/2010/main" w="9525">
+                <a:solidFill>
+                  <a:srgbClr val="000000"/>
+                </a:solidFill>
+                <a:miter lim="800000"/>
+                <a:headEnd/>
+                <a:tailEnd/>
+              </a14:hiddenLine>
+            </a:ext>
+          </a:extLst>
+        </p:spPr>
+        <p:txBody>
+          <a:bodyPr/>
+          <a:lstStyle>
+            <a:lvl1pPr defTabSz="463550" eaLnBrk="0" hangingPunct="0">
+              <a:tabLst>
+                <a:tab pos="746125" algn="l"/>
+              </a:tabLst>
+              <a:defRPr>
+                <a:solidFill>
+                  <a:schemeClr val="tx1"/>
+                </a:solidFill>
+                <a:latin typeface="Arial" charset="0"/>
+                <a:ea typeface="Lucida Sans Unicode" pitchFamily="34" charset="0"/>
+                <a:cs typeface="Lucida Sans Unicode" pitchFamily="34" charset="0"/>
+              </a:defRPr>
+            </a:lvl1pPr>
+            <a:lvl2pPr marL="742950" indent="-285750" defTabSz="463550" eaLnBrk="0" hangingPunct="0">
+              <a:tabLst>
+                <a:tab pos="746125" algn="l"/>
+              </a:tabLst>
+              <a:defRPr>
+                <a:solidFill>
+                  <a:schemeClr val="tx1"/>
+                </a:solidFill>
+                <a:latin typeface="Arial" charset="0"/>
+                <a:ea typeface="Lucida Sans Unicode" pitchFamily="34" charset="0"/>
+                <a:cs typeface="Lucida Sans Unicode" pitchFamily="34" charset="0"/>
+              </a:defRPr>
+            </a:lvl2pPr>
+            <a:lvl3pPr marL="1143000" indent="-228600" defTabSz="463550" eaLnBrk="0" hangingPunct="0">
+              <a:tabLst>
+                <a:tab pos="746125" algn="l"/>
+              </a:tabLst>
+              <a:defRPr>
+                <a:solidFill>
+                  <a:schemeClr val="tx1"/>
+                </a:solidFill>
+                <a:latin typeface="Arial" charset="0"/>
+                <a:ea typeface="Lucida Sans Unicode" pitchFamily="34" charset="0"/>
+                <a:cs typeface="Lucida Sans Unicode" pitchFamily="34" charset="0"/>
+              </a:defRPr>
+            </a:lvl3pPr>
+            <a:lvl4pPr marL="1600200" indent="-228600" defTabSz="463550" eaLnBrk="0" hangingPunct="0">
+              <a:tabLst>
+                <a:tab pos="746125" algn="l"/>
+              </a:tabLst>
+              <a:defRPr>
+                <a:solidFill>
+                  <a:schemeClr val="tx1"/>
+                </a:solidFill>
+                <a:latin typeface="Arial" charset="0"/>
+                <a:ea typeface="Lucida Sans Unicode" pitchFamily="34" charset="0"/>
+                <a:cs typeface="Lucida Sans Unicode" pitchFamily="34" charset="0"/>
+              </a:defRPr>
+            </a:lvl4pPr>
+            <a:lvl5pPr marL="2057400" indent="-228600" defTabSz="463550" eaLnBrk="0" hangingPunct="0">
+              <a:tabLst>
+                <a:tab pos="746125" algn="l"/>
+              </a:tabLst>
+              <a:defRPr>
+                <a:solidFill>
+                  <a:schemeClr val="tx1"/>
+                </a:solidFill>
+                <a:latin typeface="Arial" charset="0"/>
+                <a:ea typeface="Lucida Sans Unicode" pitchFamily="34" charset="0"/>
+                <a:cs typeface="Lucida Sans Unicode" pitchFamily="34" charset="0"/>
+              </a:defRPr>
+            </a:lvl5pPr>
+            <a:lvl6pPr marL="2514600" indent="-228600" algn="ctr" defTabSz="463550" eaLnBrk="0" fontAlgn="base" hangingPunct="0">
+              <a:lnSpc>
+                <a:spcPct val="93000"/>
+              </a:lnSpc>
+              <a:spcBef>
+                <a:spcPct val="0"/>
+              </a:spcBef>
+              <a:spcAft>
+                <a:spcPct val="0"/>
+              </a:spcAft>
+              <a:buClr>
+                <a:srgbClr val="000000"/>
+              </a:buClr>
+              <a:buSzPct val="100000"/>
+              <a:buFont typeface="Arial" charset="0"/>
+              <a:tabLst>
+                <a:tab pos="746125" algn="l"/>
+              </a:tabLst>
+              <a:defRPr>
+                <a:solidFill>
+                  <a:schemeClr val="tx1"/>
+                </a:solidFill>
+                <a:latin typeface="Arial" charset="0"/>
+                <a:ea typeface="Lucida Sans Unicode" pitchFamily="34" charset="0"/>
+                <a:cs typeface="Lucida Sans Unicode" pitchFamily="34" charset="0"/>
+              </a:defRPr>
+            </a:lvl6pPr>
+            <a:lvl7pPr marL="2971800" indent="-228600" algn="ctr" defTabSz="463550" eaLnBrk="0" fontAlgn="base" hangingPunct="0">
+              <a:lnSpc>
+                <a:spcPct val="93000"/>
+              </a:lnSpc>
+              <a:spcBef>
+                <a:spcPct val="0"/>
+              </a:spcBef>
+              <a:spcAft>
+                <a:spcPct val="0"/>
+              </a:spcAft>
+              <a:buClr>
+                <a:srgbClr val="000000"/>
+              </a:buClr>
+              <a:buSzPct val="100000"/>
+              <a:buFont typeface="Arial" charset="0"/>
+              <a:tabLst>
+                <a:tab pos="746125" algn="l"/>
+              </a:tabLst>
+              <a:defRPr>
+                <a:solidFill>
+                  <a:schemeClr val="tx1"/>
+                </a:solidFill>
+                <a:latin typeface="Arial" charset="0"/>
+                <a:ea typeface="Lucida Sans Unicode" pitchFamily="34" charset="0"/>
+                <a:cs typeface="Lucida Sans Unicode" pitchFamily="34" charset="0"/>
+              </a:defRPr>
+            </a:lvl7pPr>
+            <a:lvl8pPr marL="3429000" indent="-228600" algn="ctr" defTabSz="463550" eaLnBrk="0" fontAlgn="base" hangingPunct="0">
+              <a:lnSpc>
+                <a:spcPct val="93000"/>
+              </a:lnSpc>
+              <a:spcBef>
+                <a:spcPct val="0"/>
+              </a:spcBef>
+              <a:spcAft>
+                <a:spcPct val="0"/>
+              </a:spcAft>
+              <a:buClr>
+                <a:srgbClr val="000000"/>
+              </a:buClr>
+              <a:buSzPct val="100000"/>
+              <a:buFont typeface="Arial" charset="0"/>
+              <a:tabLst>
+                <a:tab pos="746125" algn="l"/>
+              </a:tabLst>
+              <a:defRPr>
+                <a:solidFill>
+                  <a:schemeClr val="tx1"/>
+                </a:solidFill>
+                <a:latin typeface="Arial" charset="0"/>
+                <a:ea typeface="Lucida Sans Unicode" pitchFamily="34" charset="0"/>
+                <a:cs typeface="Lucida Sans Unicode" pitchFamily="34" charset="0"/>
+              </a:defRPr>
+            </a:lvl8pPr>
+            <a:lvl9pPr marL="3886200" indent="-228600" algn="ctr" defTabSz="463550" eaLnBrk="0" fontAlgn="base" hangingPunct="0">
+              <a:lnSpc>
+                <a:spcPct val="93000"/>
+              </a:lnSpc>
+              <a:spcBef>
+                <a:spcPct val="0"/>
+              </a:spcBef>
+              <a:spcAft>
+                <a:spcPct val="0"/>
+              </a:spcAft>
+              <a:buClr>
+                <a:srgbClr val="000000"/>
+              </a:buClr>
+              <a:buSzPct val="100000"/>
+              <a:buFont typeface="Arial" charset="0"/>
+              <a:tabLst>
+                <a:tab pos="746125" algn="l"/>
+              </a:tabLst>
+              <a:defRPr>
+                <a:solidFill>
+                  <a:schemeClr val="tx1"/>
+                </a:solidFill>
+                <a:latin typeface="Arial" charset="0"/>
+                <a:ea typeface="Lucida Sans Unicode" pitchFamily="34" charset="0"/>
+                <a:cs typeface="Lucida Sans Unicode" pitchFamily="34" charset="0"/>
+              </a:defRPr>
+            </a:lvl9pPr>
+          </a:lstStyle>
+          <a:p>
+            <a:pPr eaLnBrk="1" hangingPunct="1"/>
+            <a:r>
+              <a:rPr lang="en-US" altLang="de-DE" smtClean="0">
+                <a:solidFill>
+                  <a:srgbClr val="000000"/>
+                </a:solidFill>
+                <a:latin typeface="Stafford" pitchFamily="2" charset="0"/>
+              </a:rPr>
+              <a:t>|  </a:t>
+            </a:r>
+            <a:fld id="{6775A062-1A8A-4084-8B81-E33BA407A859}" type="slidenum">
+              <a:rPr lang="en-US" altLang="de-DE" smtClean="0">
+                <a:solidFill>
+                  <a:srgbClr val="000000"/>
+                </a:solidFill>
+                <a:latin typeface="Stafford" pitchFamily="2" charset="0"/>
+              </a:rPr>
+              <a:pPr eaLnBrk="1" hangingPunct="1"/>
+              <a:t>7</a:t>
+            </a:fld>
+            <a:endParaRPr lang="en-US" altLang="de-DE" smtClean="0">
+              <a:solidFill>
+                <a:srgbClr val="000000"/>
+              </a:solidFill>
+              <a:latin typeface="Stafford" pitchFamily="2" charset="0"/>
+            </a:endParaRPr>
+          </a:p>
+        </p:txBody>
+      </p:sp>
+    </p:spTree>
+    <p:extLst>
+      <p:ext uri="{BB962C8B-B14F-4D97-AF65-F5344CB8AC3E}">
+        <p14:creationId xmlns:p14="http://schemas.microsoft.com/office/powerpoint/2010/main" val="2575126009"/>
+      </p:ext>
+    </p:extLst>
+  </p:cSld>
+  <p:clrMapOvr>
+    <a:masterClrMapping/>
+  </p:clrMapOvr>
+</p:notes>
+</file>
+
 <file path=ppt/slideLayouts/slideLayout1.xml><?xml version="1.0" encoding="utf-8"?>
 <p:sldLayout xmlns:a="http://schemas.openxmlformats.org/drawingml/2006/main" xmlns:r="http://schemas.openxmlformats.org/officeDocument/2006/relationships" xmlns:p="http://schemas.openxmlformats.org/presentationml/2006/main" showMasterSp="0" type="title" preserve="1">
   <p:cSld name="Titelfolie">
@@ -8166,7 +8988,7 @@
           <a:graphicData uri="http://schemas.openxmlformats.org/presentationml/2006/ole">
             <mc:AlternateContent xmlns:mc="http://schemas.openxmlformats.org/markup-compatibility/2006">
               <mc:Choice xmlns:v="urn:schemas-microsoft-com:vml" Requires="v">
-                <p:oleObj spid="_x0000_s1936" r:id="rId16" imgW="1038370" imgH="980952" progId="">
+                <p:oleObj spid="_x0000_s1941" r:id="rId16" imgW="1038370" imgH="980952" progId="">
                   <p:embed/>
                 </p:oleObj>
               </mc:Choice>
@@ -8604,7 +9426,7 @@
                 </a:lnSpc>
                 <a:defRPr/>
               </a:pPr>
-              <a:t>05.09.2016</a:t>
+              <a:t>06.09.2016</a:t>
             </a:fld>
             <a:r>
               <a:rPr lang="en-GB" altLang="de-DE" sz="1000" smtClean="0">
@@ -10693,6 +11515,197 @@
     <p:extLst>
       <p:ext uri="{BB962C8B-B14F-4D97-AF65-F5344CB8AC3E}">
         <p14:creationId xmlns:p14="http://schemas.microsoft.com/office/powerpoint/2010/main" val="1170982419"/>
+      </p:ext>
+    </p:extLst>
+  </p:cSld>
+  <p:clrMapOvr>
+    <a:masterClrMapping/>
+  </p:clrMapOvr>
+  <mc:AlternateContent xmlns:mc="http://schemas.openxmlformats.org/markup-compatibility/2006" xmlns:p14="http://schemas.microsoft.com/office/powerpoint/2010/main">
+    <mc:Choice Requires="p14">
+      <p:transition spd="slow" p14:dur="2000"/>
+    </mc:Choice>
+    <mc:Fallback xmlns="">
+      <p:transition spd="slow"/>
+    </mc:Fallback>
+  </mc:AlternateContent>
+  <p:timing>
+    <p:tnLst>
+      <p:par>
+        <p:cTn id="1" dur="indefinite" restart="never" nodeType="tmRoot"/>
+      </p:par>
+    </p:tnLst>
+  </p:timing>
+</p:sld>
+</file>
+
+<file path=ppt/slides/slide7.xml><?xml version="1.0" encoding="utf-8"?>
+<p:sld xmlns:a="http://schemas.openxmlformats.org/drawingml/2006/main" xmlns:r="http://schemas.openxmlformats.org/officeDocument/2006/relationships" xmlns:p="http://schemas.openxmlformats.org/presentationml/2006/main">
+  <p:cSld>
+    <p:spTree>
+      <p:nvGrpSpPr>
+        <p:cNvPr id="1" name=""/>
+        <p:cNvGrpSpPr/>
+        <p:nvPr/>
+      </p:nvGrpSpPr>
+      <p:grpSpPr>
+        <a:xfrm>
+          <a:off x="0" y="0"/>
+          <a:ext cx="0" cy="0"/>
+          <a:chOff x="0" y="0"/>
+          <a:chExt cx="0" cy="0"/>
+        </a:xfrm>
+      </p:grpSpPr>
+      <p:sp>
+        <p:nvSpPr>
+          <p:cNvPr id="15362" name="Titel 1"/>
+          <p:cNvSpPr>
+            <a:spLocks noGrp="1"/>
+          </p:cNvSpPr>
+          <p:nvPr>
+            <p:ph type="title"/>
+          </p:nvPr>
+        </p:nvSpPr>
+        <p:spPr/>
+        <p:txBody>
+          <a:bodyPr/>
+          <a:lstStyle/>
+          <a:p>
+            <a:r>
+              <a:rPr lang="de-DE" altLang="de-DE" smtClean="0"/>
+              <a:t>Tag 5: Rückschau und Aufwärmübungen</a:t>
+            </a:r>
+            <a:endParaRPr lang="de-DE" altLang="de-DE" dirty="0" smtClean="0"/>
+          </a:p>
+        </p:txBody>
+      </p:sp>
+      <p:sp>
+        <p:nvSpPr>
+          <p:cNvPr id="2" name="Inhaltsplatzhalter 1"/>
+          <p:cNvSpPr>
+            <a:spLocks noGrp="1"/>
+          </p:cNvSpPr>
+          <p:nvPr>
+            <p:ph idx="1"/>
+          </p:nvPr>
+        </p:nvSpPr>
+        <p:spPr/>
+        <p:txBody>
+          <a:bodyPr/>
+          <a:lstStyle/>
+          <a:p>
+            <a:r>
+              <a:rPr lang="de-DE" altLang="de-DE" b="1" smtClean="0"/>
+              <a:t>Aufgabe T4A4.5 ist NICHT optional</a:t>
+            </a:r>
+          </a:p>
+          <a:p>
+            <a:pPr lvl="1"/>
+            <a:r>
+              <a:rPr lang="de-DE" altLang="de-DE" smtClean="0"/>
+              <a:t>Fehler unsererseits – neue Version is online.</a:t>
+            </a:r>
+          </a:p>
+          <a:p>
+            <a:pPr lvl="1"/>
+            <a:r>
+              <a:rPr lang="de-DE" altLang="de-DE" smtClean="0"/>
+              <a:t>Noch ein Grund, regelmäßig zu pullen.</a:t>
+            </a:r>
+          </a:p>
+          <a:p>
+            <a:endParaRPr lang="de-DE" altLang="de-DE" b="1"/>
+          </a:p>
+          <a:p>
+            <a:r>
+              <a:rPr lang="de-DE" altLang="de-DE" b="1" smtClean="0"/>
+              <a:t>In </a:t>
+            </a:r>
+            <a:r>
+              <a:rPr lang="de-DE" altLang="de-DE" b="1" smtClean="0"/>
+              <a:t>der VM fehlen evtl. Header für die µC-Projekte.</a:t>
+            </a:r>
+          </a:p>
+          <a:p>
+            <a:pPr lvl="1"/>
+            <a:r>
+              <a:rPr lang="de-DE" smtClean="0"/>
+              <a:t>Bitte innerhalb des …exercises-Repos folgende Befehle aufrufen:</a:t>
+            </a:r>
+          </a:p>
+          <a:p>
+            <a:pPr lvl="2"/>
+            <a:r>
+              <a:rPr lang="en-US">
+                <a:latin typeface="Consolas" panose="020B0609020204030204" pitchFamily="49" charset="0"/>
+                <a:cs typeface="Consolas" panose="020B0609020204030204" pitchFamily="49" charset="0"/>
+              </a:rPr>
+              <a:t>git submodule </a:t>
+            </a:r>
+            <a:r>
+              <a:rPr lang="en-US" smtClean="0">
+                <a:latin typeface="Consolas" panose="020B0609020204030204" pitchFamily="49" charset="0"/>
+                <a:cs typeface="Consolas" panose="020B0609020204030204" pitchFamily="49" charset="0"/>
+              </a:rPr>
+              <a:t>init</a:t>
+            </a:r>
+          </a:p>
+          <a:p>
+            <a:pPr lvl="2"/>
+            <a:r>
+              <a:rPr lang="en-US">
+                <a:latin typeface="Consolas" panose="020B0609020204030204" pitchFamily="49" charset="0"/>
+                <a:cs typeface="Consolas" panose="020B0609020204030204" pitchFamily="49" charset="0"/>
+              </a:rPr>
+              <a:t>git submodule update </a:t>
+            </a:r>
+            <a:r>
+              <a:rPr lang="en-US" smtClean="0">
+                <a:latin typeface="Consolas" panose="020B0609020204030204" pitchFamily="49" charset="0"/>
+                <a:cs typeface="Consolas" panose="020B0609020204030204" pitchFamily="49" charset="0"/>
+              </a:rPr>
+              <a:t>–recursive</a:t>
+            </a:r>
+          </a:p>
+          <a:p>
+            <a:pPr lvl="1"/>
+            <a:endParaRPr lang="en-US"/>
+          </a:p>
+          <a:p>
+            <a:pPr indent="-168275"/>
+            <a:r>
+              <a:rPr lang="en-US" b="1" smtClean="0"/>
+              <a:t>µC-Beispielprojekte können nicht kopiert werden</a:t>
+            </a:r>
+          </a:p>
+          <a:p>
+            <a:pPr lvl="1"/>
+            <a:r>
+              <a:rPr lang="en-US" smtClean="0"/>
+              <a:t>Nutzen relative Pfade im exercises-Repo</a:t>
+            </a:r>
+          </a:p>
+          <a:p>
+            <a:pPr lvl="1"/>
+            <a:r>
+              <a:rPr lang="en-US" smtClean="0"/>
+              <a:t>Alternative 1: Kopieren und manuell das Makefile anpassen</a:t>
+            </a:r>
+          </a:p>
+          <a:p>
+            <a:pPr lvl="1"/>
+            <a:r>
+              <a:rPr lang="en-US" smtClean="0"/>
+              <a:t>Alternative 2: Über "Create project" ein neues "FX16 project" anlegen.</a:t>
+            </a:r>
+            <a:endParaRPr lang="de-DE" smtClean="0"/>
+          </a:p>
+        </p:txBody>
+      </p:sp>
+    </p:spTree>
+    <p:extLst>
+      <p:ext uri="{BB962C8B-B14F-4D97-AF65-F5344CB8AC3E}">
+        <p14:creationId xmlns:p14="http://schemas.microsoft.com/office/powerpoint/2010/main" val="89436420"/>
       </p:ext>
     </p:extLst>
   </p:cSld>

</xml_diff>